<commit_message>
Updated the event table in AES diagrams ppt
</commit_message>
<xml_diff>
--- a/Documentation/Research Paper/AES diagrams.pptx
+++ b/Documentation/Research Paper/AES diagrams.pptx
@@ -268,7 +268,7 @@
           <a:p>
             <a:fld id="{F07C20CE-7E6E-46AA-9B32-76D88BCAE5C9}" type="datetimeFigureOut">
               <a:rPr lang="en-PH" smtClean="0"/>
-              <a:t>02/09/2016</a:t>
+              <a:t>01/12/2016</a:t>
             </a:fld>
             <a:endParaRPr lang="en-PH"/>
           </a:p>
@@ -438,7 +438,7 @@
           <a:p>
             <a:fld id="{F07C20CE-7E6E-46AA-9B32-76D88BCAE5C9}" type="datetimeFigureOut">
               <a:rPr lang="en-PH" smtClean="0"/>
-              <a:t>02/09/2016</a:t>
+              <a:t>01/12/2016</a:t>
             </a:fld>
             <a:endParaRPr lang="en-PH"/>
           </a:p>
@@ -618,7 +618,7 @@
           <a:p>
             <a:fld id="{F07C20CE-7E6E-46AA-9B32-76D88BCAE5C9}" type="datetimeFigureOut">
               <a:rPr lang="en-PH" smtClean="0"/>
-              <a:t>02/09/2016</a:t>
+              <a:t>01/12/2016</a:t>
             </a:fld>
             <a:endParaRPr lang="en-PH"/>
           </a:p>
@@ -788,7 +788,7 @@
           <a:p>
             <a:fld id="{F07C20CE-7E6E-46AA-9B32-76D88BCAE5C9}" type="datetimeFigureOut">
               <a:rPr lang="en-PH" smtClean="0"/>
-              <a:t>02/09/2016</a:t>
+              <a:t>01/12/2016</a:t>
             </a:fld>
             <a:endParaRPr lang="en-PH"/>
           </a:p>
@@ -1034,7 +1034,7 @@
           <a:p>
             <a:fld id="{F07C20CE-7E6E-46AA-9B32-76D88BCAE5C9}" type="datetimeFigureOut">
               <a:rPr lang="en-PH" smtClean="0"/>
-              <a:t>02/09/2016</a:t>
+              <a:t>01/12/2016</a:t>
             </a:fld>
             <a:endParaRPr lang="en-PH"/>
           </a:p>
@@ -1266,7 +1266,7 @@
           <a:p>
             <a:fld id="{F07C20CE-7E6E-46AA-9B32-76D88BCAE5C9}" type="datetimeFigureOut">
               <a:rPr lang="en-PH" smtClean="0"/>
-              <a:t>02/09/2016</a:t>
+              <a:t>01/12/2016</a:t>
             </a:fld>
             <a:endParaRPr lang="en-PH"/>
           </a:p>
@@ -1633,7 +1633,7 @@
           <a:p>
             <a:fld id="{F07C20CE-7E6E-46AA-9B32-76D88BCAE5C9}" type="datetimeFigureOut">
               <a:rPr lang="en-PH" smtClean="0"/>
-              <a:t>02/09/2016</a:t>
+              <a:t>01/12/2016</a:t>
             </a:fld>
             <a:endParaRPr lang="en-PH"/>
           </a:p>
@@ -1751,7 +1751,7 @@
           <a:p>
             <a:fld id="{F07C20CE-7E6E-46AA-9B32-76D88BCAE5C9}" type="datetimeFigureOut">
               <a:rPr lang="en-PH" smtClean="0"/>
-              <a:t>02/09/2016</a:t>
+              <a:t>01/12/2016</a:t>
             </a:fld>
             <a:endParaRPr lang="en-PH"/>
           </a:p>
@@ -1846,7 +1846,7 @@
           <a:p>
             <a:fld id="{F07C20CE-7E6E-46AA-9B32-76D88BCAE5C9}" type="datetimeFigureOut">
               <a:rPr lang="en-PH" smtClean="0"/>
-              <a:t>02/09/2016</a:t>
+              <a:t>01/12/2016</a:t>
             </a:fld>
             <a:endParaRPr lang="en-PH"/>
           </a:p>
@@ -2123,7 +2123,7 @@
           <a:p>
             <a:fld id="{F07C20CE-7E6E-46AA-9B32-76D88BCAE5C9}" type="datetimeFigureOut">
               <a:rPr lang="en-PH" smtClean="0"/>
-              <a:t>02/09/2016</a:t>
+              <a:t>01/12/2016</a:t>
             </a:fld>
             <a:endParaRPr lang="en-PH"/>
           </a:p>
@@ -2376,7 +2376,7 @@
           <a:p>
             <a:fld id="{F07C20CE-7E6E-46AA-9B32-76D88BCAE5C9}" type="datetimeFigureOut">
               <a:rPr lang="en-PH" smtClean="0"/>
-              <a:t>02/09/2016</a:t>
+              <a:t>01/12/2016</a:t>
             </a:fld>
             <a:endParaRPr lang="en-PH"/>
           </a:p>
@@ -2589,7 +2589,7 @@
           <a:p>
             <a:fld id="{F07C20CE-7E6E-46AA-9B32-76D88BCAE5C9}" type="datetimeFigureOut">
               <a:rPr lang="en-PH" smtClean="0"/>
-              <a:t>02/09/2016</a:t>
+              <a:t>01/12/2016</a:t>
             </a:fld>
             <a:endParaRPr lang="en-PH"/>
           </a:p>
@@ -3026,14 +3026,14 @@
             <p:ph idx="1"/>
             <p:extLst>
               <p:ext uri="{D42A27DB-BD31-4B8C-83A1-F6EECF244321}">
-                <p14:modId xmlns:p14="http://schemas.microsoft.com/office/powerpoint/2010/main" val="1310521324"/>
+                <p14:modId xmlns:p14="http://schemas.microsoft.com/office/powerpoint/2010/main" val="859201712"/>
               </p:ext>
             </p:extLst>
           </p:nvPr>
         </p:nvGraphicFramePr>
         <p:xfrm>
-          <a:off x="2116455" y="1578642"/>
-          <a:ext cx="7367180" cy="2901918"/>
+          <a:off x="1095154" y="1440419"/>
+          <a:ext cx="8399114" cy="5270441"/>
         </p:xfrm>
         <a:graphic>
           <a:graphicData uri="http://schemas.openxmlformats.org/drawingml/2006/table">
@@ -3042,35 +3042,35 @@
                 <a:tableStyleId>{9DCAF9ED-07DC-4A11-8D7F-57B35C25682E}</a:tableStyleId>
               </a:tblPr>
               <a:tblGrid>
-                <a:gridCol w="1536515">
+                <a:gridCol w="2636874">
                   <a:extLst>
                     <a:ext uri="{9D8B030D-6E8A-4147-A177-3AD203B41FA5}">
                       <a16:colId xmlns:a16="http://schemas.microsoft.com/office/drawing/2014/main" val="3879394027"/>
                     </a:ext>
                   </a:extLst>
                 </a:gridCol>
-                <a:gridCol w="919581">
+                <a:gridCol w="851156">
                   <a:extLst>
                     <a:ext uri="{9D8B030D-6E8A-4147-A177-3AD203B41FA5}">
                       <a16:colId xmlns:a16="http://schemas.microsoft.com/office/drawing/2014/main" val="928243485"/>
                     </a:ext>
                   </a:extLst>
                 </a:gridCol>
-                <a:gridCol w="1227771">
+                <a:gridCol w="1200928">
                   <a:extLst>
                     <a:ext uri="{9D8B030D-6E8A-4147-A177-3AD203B41FA5}">
                       <a16:colId xmlns:a16="http://schemas.microsoft.com/office/drawing/2014/main" val="2028073001"/>
                     </a:ext>
                   </a:extLst>
                 </a:gridCol>
-                <a:gridCol w="1264354">
+                <a:gridCol w="1297172">
                   <a:extLst>
                     <a:ext uri="{9D8B030D-6E8A-4147-A177-3AD203B41FA5}">
                       <a16:colId xmlns:a16="http://schemas.microsoft.com/office/drawing/2014/main" val="196038456"/>
                     </a:ext>
                   </a:extLst>
                 </a:gridCol>
-                <a:gridCol w="1191188">
+                <a:gridCol w="1185213">
                   <a:extLst>
                     <a:ext uri="{9D8B030D-6E8A-4147-A177-3AD203B41FA5}">
                       <a16:colId xmlns:a16="http://schemas.microsoft.com/office/drawing/2014/main" val="4020037094"/>
@@ -3085,7 +3085,7 @@
                   </a:extLst>
                 </a:gridCol>
               </a:tblGrid>
-              <a:tr h="263389">
+              <a:tr h="224245">
                 <a:tc>
                   <a:txBody>
                     <a:bodyPr/>
@@ -3284,7 +3284,7 @@
                   </a:ext>
                 </a:extLst>
               </a:tr>
-              <a:tr h="623662">
+              <a:tr h="537168">
                 <a:tc>
                   <a:txBody>
                     <a:bodyPr/>
@@ -3304,20 +3304,38 @@
                       <a:r>
                         <a:rPr lang="en-PH" sz="900" dirty="0">
                           <a:effectLst/>
-                          <a:latin typeface="+mn-lt"/>
-                          <a:ea typeface="+mn-ea"/>
-                          <a:cs typeface="+mn-cs"/>
-                        </a:rPr>
-                        <a:t>CCS,</a:t>
+                          <a:latin typeface="Calibri" panose="020F0502020204030204" pitchFamily="34" charset="0"/>
+                          <a:ea typeface="Calibri" panose="020F0502020204030204" pitchFamily="34" charset="0"/>
+                          <a:cs typeface="Times New Roman" panose="02020603050405020304" pitchFamily="18" charset="0"/>
+                        </a:rPr>
+                        <a:t>VCM and Server</a:t>
                       </a:r>
                       <a:r>
                         <a:rPr lang="en-PH" sz="900" baseline="0" dirty="0">
                           <a:effectLst/>
-                          <a:latin typeface="+mn-lt"/>
-                          <a:ea typeface="+mn-ea"/>
-                          <a:cs typeface="+mn-cs"/>
-                        </a:rPr>
-                        <a:t> Central Server and Transparency Server sends encrypted data to VCM using the VCM’s public key</a:t>
+                          <a:latin typeface="Calibri" panose="020F0502020204030204" pitchFamily="34" charset="0"/>
+                          <a:ea typeface="Calibri" panose="020F0502020204030204" pitchFamily="34" charset="0"/>
+                          <a:cs typeface="Times New Roman" panose="02020603050405020304" pitchFamily="18" charset="0"/>
+                        </a:rPr>
+                        <a:t> Key generates key using </a:t>
+                      </a:r>
+                      <a:r>
+                        <a:rPr lang="en-PH" sz="900" baseline="0" dirty="0" err="1">
+                          <a:effectLst/>
+                          <a:latin typeface="Calibri" panose="020F0502020204030204" pitchFamily="34" charset="0"/>
+                          <a:ea typeface="Calibri" panose="020F0502020204030204" pitchFamily="34" charset="0"/>
+                          <a:cs typeface="Times New Roman" panose="02020603050405020304" pitchFamily="18" charset="0"/>
+                        </a:rPr>
+                        <a:t>Diffie</a:t>
+                      </a:r>
+                      <a:r>
+                        <a:rPr lang="en-PH" sz="900" baseline="0" dirty="0">
+                          <a:effectLst/>
+                          <a:latin typeface="Calibri" panose="020F0502020204030204" pitchFamily="34" charset="0"/>
+                          <a:ea typeface="Calibri" panose="020F0502020204030204" pitchFamily="34" charset="0"/>
+                          <a:cs typeface="Times New Roman" panose="02020603050405020304" pitchFamily="18" charset="0"/>
+                        </a:rPr>
+                        <a:t>-Hellman Algorithm</a:t>
                       </a:r>
                       <a:endParaRPr lang="en-PH" sz="900" dirty="0">
                         <a:effectLst/>
@@ -3352,7 +3370,7 @@
                           <a:ea typeface="Calibri" panose="020F0502020204030204" pitchFamily="34" charset="0"/>
                           <a:cs typeface="Times New Roman" panose="02020603050405020304" pitchFamily="18" charset="0"/>
                         </a:rPr>
-                        <a:t>End</a:t>
+                        <a:t>Server</a:t>
                       </a:r>
                       <a:r>
                         <a:rPr lang="en-PH" sz="900" baseline="0" dirty="0">
@@ -3361,7 +3379,7 @@
                           <a:ea typeface="Calibri" panose="020F0502020204030204" pitchFamily="34" charset="0"/>
                           <a:cs typeface="Times New Roman" panose="02020603050405020304" pitchFamily="18" charset="0"/>
                         </a:rPr>
-                        <a:t> of voting period</a:t>
+                        <a:t> Key collects all public keys of VCMs</a:t>
                       </a:r>
                       <a:endParaRPr lang="en-PH" sz="900" dirty="0">
                         <a:effectLst/>
@@ -3392,33 +3410,67 @@
                       <a:r>
                         <a:rPr lang="en-PH" sz="900" dirty="0">
                           <a:effectLst/>
-                        </a:rPr>
-                        <a:t>CCS, Central</a:t>
+                          <a:latin typeface="Calibri" panose="020F0502020204030204" pitchFamily="34" charset="0"/>
+                          <a:ea typeface="Calibri" panose="020F0502020204030204" pitchFamily="34" charset="0"/>
+                          <a:cs typeface="Times New Roman" panose="02020603050405020304" pitchFamily="18" charset="0"/>
+                        </a:rPr>
+                        <a:t>VCM and Server Key</a:t>
+                      </a:r>
+                    </a:p>
+                  </a:txBody>
+                  <a:tcPr marL="53848" marR="53848" marT="0" marB="0" anchor="ctr"/>
+                </a:tc>
+                <a:tc>
+                  <a:txBody>
+                    <a:bodyPr/>
+                    <a:lstStyle/>
+                    <a:p>
+                      <a:pPr marL="0" marR="0" algn="ctr">
+                        <a:lnSpc>
+                          <a:spcPct val="115000"/>
+                        </a:lnSpc>
+                        <a:spcBef>
+                          <a:spcPts val="0"/>
+                        </a:spcBef>
+                        <a:spcAft>
+                          <a:spcPts val="0"/>
+                        </a:spcAft>
+                      </a:pPr>
+                      <a:r>
+                        <a:rPr lang="en-PH" sz="900" dirty="0">
+                          <a:effectLst/>
+                          <a:latin typeface="Calibri" panose="020F0502020204030204" pitchFamily="34" charset="0"/>
+                          <a:ea typeface="Calibri" panose="020F0502020204030204" pitchFamily="34" charset="0"/>
+                          <a:cs typeface="Times New Roman" panose="02020603050405020304" pitchFamily="18" charset="0"/>
+                        </a:rPr>
+                        <a:t>Generate key</a:t>
                       </a:r>
                       <a:r>
                         <a:rPr lang="en-PH" sz="900" baseline="0" dirty="0">
                           <a:effectLst/>
-                        </a:rPr>
-                        <a:t> Server, </a:t>
-                      </a:r>
-                    </a:p>
-                    <a:p>
-                      <a:pPr marL="0" marR="0" algn="ctr">
-                        <a:lnSpc>
-                          <a:spcPct val="115000"/>
-                        </a:lnSpc>
-                        <a:spcBef>
-                          <a:spcPts val="0"/>
-                        </a:spcBef>
-                        <a:spcAft>
-                          <a:spcPts val="0"/>
-                        </a:spcAft>
-                      </a:pPr>
+                          <a:latin typeface="Calibri" panose="020F0502020204030204" pitchFamily="34" charset="0"/>
+                          <a:ea typeface="Calibri" panose="020F0502020204030204" pitchFamily="34" charset="0"/>
+                          <a:cs typeface="Times New Roman" panose="02020603050405020304" pitchFamily="18" charset="0"/>
+                        </a:rPr>
+                        <a:t> using </a:t>
+                      </a:r>
+                      <a:r>
+                        <a:rPr lang="en-PH" sz="900" baseline="0" dirty="0" err="1">
+                          <a:effectLst/>
+                          <a:latin typeface="Calibri" panose="020F0502020204030204" pitchFamily="34" charset="0"/>
+                          <a:ea typeface="Calibri" panose="020F0502020204030204" pitchFamily="34" charset="0"/>
+                          <a:cs typeface="Times New Roman" panose="02020603050405020304" pitchFamily="18" charset="0"/>
+                        </a:rPr>
+                        <a:t>Diffie</a:t>
+                      </a:r>
                       <a:r>
                         <a:rPr lang="en-PH" sz="900" baseline="0" dirty="0">
                           <a:effectLst/>
-                        </a:rPr>
-                        <a:t>and Transparency Server</a:t>
+                          <a:latin typeface="Calibri" panose="020F0502020204030204" pitchFamily="34" charset="0"/>
+                          <a:ea typeface="Calibri" panose="020F0502020204030204" pitchFamily="34" charset="0"/>
+                          <a:cs typeface="Times New Roman" panose="02020603050405020304" pitchFamily="18" charset="0"/>
+                        </a:rPr>
+                        <a:t>-Hellman Algorithm</a:t>
                       </a:r>
                       <a:endParaRPr lang="en-PH" sz="900" dirty="0">
                         <a:effectLst/>
@@ -3449,14 +3501,20 @@
                       <a:r>
                         <a:rPr lang="en-PH" sz="900" dirty="0">
                           <a:effectLst/>
-                        </a:rPr>
-                        <a:t>Sends encrypted</a:t>
+                          <a:latin typeface="Calibri" panose="020F0502020204030204" pitchFamily="34" charset="0"/>
+                          <a:ea typeface="Calibri" panose="020F0502020204030204" pitchFamily="34" charset="0"/>
+                          <a:cs typeface="Times New Roman" panose="02020603050405020304" pitchFamily="18" charset="0"/>
+                        </a:rPr>
+                        <a:t>Generated</a:t>
                       </a:r>
                       <a:r>
                         <a:rPr lang="en-PH" sz="900" baseline="0" dirty="0">
                           <a:effectLst/>
-                        </a:rPr>
-                        <a:t> data</a:t>
+                          <a:latin typeface="Calibri" panose="020F0502020204030204" pitchFamily="34" charset="0"/>
+                          <a:ea typeface="Calibri" panose="020F0502020204030204" pitchFamily="34" charset="0"/>
+                          <a:cs typeface="Times New Roman" panose="02020603050405020304" pitchFamily="18" charset="0"/>
+                        </a:rPr>
+                        <a:t> Key</a:t>
                       </a:r>
                       <a:endParaRPr lang="en-PH" sz="900" dirty="0">
                         <a:effectLst/>
@@ -3487,8 +3545,103 @@
                       <a:r>
                         <a:rPr lang="en-PH" sz="900" dirty="0">
                           <a:effectLst/>
-                        </a:rPr>
-                        <a:t>Sent encrypted data</a:t>
+                          <a:latin typeface="Calibri" panose="020F0502020204030204" pitchFamily="34" charset="0"/>
+                          <a:ea typeface="Calibri" panose="020F0502020204030204" pitchFamily="34" charset="0"/>
+                          <a:cs typeface="Times New Roman" panose="02020603050405020304" pitchFamily="18" charset="0"/>
+                        </a:rPr>
+                        <a:t>VCM</a:t>
+                      </a:r>
+                    </a:p>
+                  </a:txBody>
+                  <a:tcPr marL="53848" marR="53848" marT="0" marB="0" anchor="ctr"/>
+                </a:tc>
+                <a:extLst>
+                  <a:ext uri="{0D108BD9-81ED-4DB2-BD59-A6C34878D82A}">
+                    <a16:rowId xmlns:a16="http://schemas.microsoft.com/office/drawing/2014/main" val="3435550610"/>
+                  </a:ext>
+                </a:extLst>
+              </a:tr>
+              <a:tr h="537168">
+                <a:tc>
+                  <a:txBody>
+                    <a:bodyPr/>
+                    <a:lstStyle/>
+                    <a:p>
+                      <a:pPr marL="0" marR="0" algn="ctr">
+                        <a:lnSpc>
+                          <a:spcPct val="115000"/>
+                        </a:lnSpc>
+                        <a:spcBef>
+                          <a:spcPts val="0"/>
+                        </a:spcBef>
+                        <a:spcAft>
+                          <a:spcPts val="0"/>
+                        </a:spcAft>
+                      </a:pPr>
+                      <a:r>
+                        <a:rPr lang="en-PH" sz="900" dirty="0">
+                          <a:effectLst/>
+                          <a:latin typeface="Calibri" panose="020F0502020204030204" pitchFamily="34" charset="0"/>
+                          <a:ea typeface="Calibri" panose="020F0502020204030204" pitchFamily="34" charset="0"/>
+                          <a:cs typeface="Times New Roman" panose="02020603050405020304" pitchFamily="18" charset="0"/>
+                        </a:rPr>
+                        <a:t>VCM encrypts ER using VCM’s private key</a:t>
+                      </a:r>
+                    </a:p>
+                  </a:txBody>
+                  <a:tcPr marL="53848" marR="53848" marT="0" marB="0" anchor="ctr"/>
+                </a:tc>
+                <a:tc>
+                  <a:txBody>
+                    <a:bodyPr/>
+                    <a:lstStyle/>
+                    <a:p>
+                      <a:pPr marL="0" marR="0" algn="ctr">
+                        <a:lnSpc>
+                          <a:spcPct val="115000"/>
+                        </a:lnSpc>
+                        <a:spcBef>
+                          <a:spcPts val="0"/>
+                        </a:spcBef>
+                        <a:spcAft>
+                          <a:spcPts val="0"/>
+                        </a:spcAft>
+                      </a:pPr>
+                      <a:r>
+                        <a:rPr lang="en-PH" sz="900" dirty="0">
+                          <a:effectLst/>
+                          <a:latin typeface="Calibri" panose="020F0502020204030204" pitchFamily="34" charset="0"/>
+                          <a:ea typeface="Calibri" panose="020F0502020204030204" pitchFamily="34" charset="0"/>
+                          <a:cs typeface="Times New Roman" panose="02020603050405020304" pitchFamily="18" charset="0"/>
+                        </a:rPr>
+                        <a:t>Generated</a:t>
+                      </a:r>
+                      <a:r>
+                        <a:rPr lang="en-PH" sz="900" baseline="0" dirty="0">
+                          <a:effectLst/>
+                          <a:latin typeface="Calibri" panose="020F0502020204030204" pitchFamily="34" charset="0"/>
+                          <a:ea typeface="Calibri" panose="020F0502020204030204" pitchFamily="34" charset="0"/>
+                          <a:cs typeface="Times New Roman" panose="02020603050405020304" pitchFamily="18" charset="0"/>
+                        </a:rPr>
+                        <a:t> key using </a:t>
+                      </a:r>
+                      <a:r>
+                        <a:rPr lang="en-PH" sz="900" baseline="0" dirty="0" err="1">
+                          <a:effectLst/>
+                          <a:latin typeface="Calibri" panose="020F0502020204030204" pitchFamily="34" charset="0"/>
+                          <a:ea typeface="Calibri" panose="020F0502020204030204" pitchFamily="34" charset="0"/>
+                          <a:cs typeface="Times New Roman" panose="02020603050405020304" pitchFamily="18" charset="0"/>
+                        </a:rPr>
+                        <a:t>Diffie</a:t>
+                      </a:r>
+                      <a:r>
+                        <a:rPr lang="en-PH" sz="900" baseline="0" dirty="0">
+                          <a:effectLst/>
+                          <a:latin typeface="Calibri" panose="020F0502020204030204" pitchFamily="34" charset="0"/>
+                          <a:ea typeface="Calibri" panose="020F0502020204030204" pitchFamily="34" charset="0"/>
+                          <a:cs typeface="Times New Roman" panose="02020603050405020304" pitchFamily="18" charset="0"/>
+                        </a:rPr>
+                        <a:t>-Hellman Algorithm</a:t>
                       </a:r>
                       <a:endParaRPr lang="en-PH" sz="900" dirty="0">
                         <a:effectLst/>
@@ -3519,8 +3672,49 @@
                       <a:r>
                         <a:rPr lang="en-PH" sz="900" dirty="0">
                           <a:effectLst/>
+                          <a:latin typeface="Calibri" panose="020F0502020204030204" pitchFamily="34" charset="0"/>
+                          <a:ea typeface="Calibri" panose="020F0502020204030204" pitchFamily="34" charset="0"/>
+                          <a:cs typeface="Times New Roman" panose="02020603050405020304" pitchFamily="18" charset="0"/>
                         </a:rPr>
                         <a:t>VCM</a:t>
+                      </a:r>
+                    </a:p>
+                  </a:txBody>
+                  <a:tcPr marL="53848" marR="53848" marT="0" marB="0" anchor="ctr"/>
+                </a:tc>
+                <a:tc>
+                  <a:txBody>
+                    <a:bodyPr/>
+                    <a:lstStyle/>
+                    <a:p>
+                      <a:pPr marL="0" marR="0" algn="ctr">
+                        <a:lnSpc>
+                          <a:spcPct val="115000"/>
+                        </a:lnSpc>
+                        <a:spcBef>
+                          <a:spcPts val="0"/>
+                        </a:spcBef>
+                        <a:spcAft>
+                          <a:spcPts val="0"/>
+                        </a:spcAft>
+                      </a:pPr>
+                      <a:r>
+                        <a:rPr lang="en-PH" sz="900" dirty="0">
+                          <a:effectLst/>
+                          <a:latin typeface="Calibri" panose="020F0502020204030204" pitchFamily="34" charset="0"/>
+                          <a:ea typeface="Calibri" panose="020F0502020204030204" pitchFamily="34" charset="0"/>
+                          <a:cs typeface="Times New Roman" panose="02020603050405020304" pitchFamily="18" charset="0"/>
+                        </a:rPr>
+                        <a:t>Encrypt</a:t>
+                      </a:r>
+                      <a:r>
+                        <a:rPr lang="en-PH" sz="900" baseline="0" dirty="0">
+                          <a:effectLst/>
+                          <a:latin typeface="Calibri" panose="020F0502020204030204" pitchFamily="34" charset="0"/>
+                          <a:ea typeface="Calibri" panose="020F0502020204030204" pitchFamily="34" charset="0"/>
+                          <a:cs typeface="Times New Roman" panose="02020603050405020304" pitchFamily="18" charset="0"/>
+                        </a:rPr>
+                        <a:t> ER using private key</a:t>
                       </a:r>
                       <a:endParaRPr lang="en-PH" sz="900" dirty="0">
                         <a:effectLst/>
@@ -3532,13 +3726,6 @@
                   </a:txBody>
                   <a:tcPr marL="53848" marR="53848" marT="0" marB="0" anchor="ctr"/>
                 </a:tc>
-                <a:extLst>
-                  <a:ext uri="{0D108BD9-81ED-4DB2-BD59-A6C34878D82A}">
-                    <a16:rowId xmlns:a16="http://schemas.microsoft.com/office/drawing/2014/main" val="3435550610"/>
-                  </a:ext>
-                </a:extLst>
-              </a:tr>
-              <a:tr h="307180">
                 <a:tc>
                   <a:txBody>
                     <a:bodyPr/>
@@ -3562,7 +3749,7 @@
                           <a:ea typeface="Calibri" panose="020F0502020204030204" pitchFamily="34" charset="0"/>
                           <a:cs typeface="Times New Roman" panose="02020603050405020304" pitchFamily="18" charset="0"/>
                         </a:rPr>
-                        <a:t>VCM</a:t>
+                        <a:t>Encrypted</a:t>
                       </a:r>
                       <a:r>
                         <a:rPr lang="en-PH" sz="900" baseline="0" dirty="0">
@@ -3571,7 +3758,7 @@
                           <a:ea typeface="Calibri" panose="020F0502020204030204" pitchFamily="34" charset="0"/>
                           <a:cs typeface="Times New Roman" panose="02020603050405020304" pitchFamily="18" charset="0"/>
                         </a:rPr>
-                        <a:t> decrypts the data using its private keys</a:t>
+                        <a:t> ER</a:t>
                       </a:r>
                       <a:endParaRPr lang="en-PH" sz="900" dirty="0">
                         <a:effectLst/>
@@ -3602,14 +3789,56 @@
                       <a:r>
                         <a:rPr lang="en-PH" sz="900" dirty="0">
                           <a:effectLst/>
-                        </a:rPr>
-                        <a:t>Received encrypted</a:t>
+                          <a:latin typeface="+mn-lt"/>
+                          <a:ea typeface="+mn-ea"/>
+                          <a:cs typeface="+mn-cs"/>
+                        </a:rPr>
+                        <a:t>VCM</a:t>
+                      </a:r>
+                    </a:p>
+                  </a:txBody>
+                  <a:tcPr marL="53848" marR="53848" marT="0" marB="0" anchor="ctr"/>
+                </a:tc>
+                <a:extLst>
+                  <a:ext uri="{0D108BD9-81ED-4DB2-BD59-A6C34878D82A}">
+                    <a16:rowId xmlns:a16="http://schemas.microsoft.com/office/drawing/2014/main" val="83763036"/>
+                  </a:ext>
+                </a:extLst>
+              </a:tr>
+              <a:tr h="440232">
+                <a:tc>
+                  <a:txBody>
+                    <a:bodyPr/>
+                    <a:lstStyle/>
+                    <a:p>
+                      <a:pPr marL="0" marR="0" algn="ctr">
+                        <a:lnSpc>
+                          <a:spcPct val="115000"/>
+                        </a:lnSpc>
+                        <a:spcBef>
+                          <a:spcPts val="0"/>
+                        </a:spcBef>
+                        <a:spcAft>
+                          <a:spcPts val="0"/>
+                        </a:spcAft>
+                      </a:pPr>
+                      <a:r>
+                        <a:rPr lang="en-PH" sz="900" dirty="0">
+                          <a:effectLst/>
+                          <a:latin typeface="Calibri" panose="020F0502020204030204" pitchFamily="34" charset="0"/>
+                          <a:ea typeface="Calibri" panose="020F0502020204030204" pitchFamily="34" charset="0"/>
+                          <a:cs typeface="Times New Roman" panose="02020603050405020304" pitchFamily="18" charset="0"/>
+                        </a:rPr>
+                        <a:t>VCM gets hash value</a:t>
                       </a:r>
                       <a:r>
                         <a:rPr lang="en-PH" sz="900" baseline="0" dirty="0">
                           <a:effectLst/>
-                        </a:rPr>
-                        <a:t> data</a:t>
+                          <a:latin typeface="Calibri" panose="020F0502020204030204" pitchFamily="34" charset="0"/>
+                          <a:ea typeface="Calibri" panose="020F0502020204030204" pitchFamily="34" charset="0"/>
+                          <a:cs typeface="Times New Roman" panose="02020603050405020304" pitchFamily="18" charset="0"/>
+                        </a:rPr>
+                        <a:t> of ER using three hash function</a:t>
                       </a:r>
                       <a:endParaRPr lang="en-PH" sz="900" dirty="0">
                         <a:effectLst/>
@@ -3640,8 +3869,78 @@
                       <a:r>
                         <a:rPr lang="en-PH" sz="900" dirty="0">
                           <a:effectLst/>
-                        </a:rPr>
-                        <a:t>Private Key</a:t>
+                          <a:latin typeface="Calibri" panose="020F0502020204030204" pitchFamily="34" charset="0"/>
+                          <a:ea typeface="Calibri" panose="020F0502020204030204" pitchFamily="34" charset="0"/>
+                          <a:cs typeface="Times New Roman" panose="02020603050405020304" pitchFamily="18" charset="0"/>
+                        </a:rPr>
+                        <a:t>Encrypted ER</a:t>
+                      </a:r>
+                    </a:p>
+                  </a:txBody>
+                  <a:tcPr marL="53848" marR="53848" marT="0" marB="0" anchor="ctr"/>
+                </a:tc>
+                <a:tc>
+                  <a:txBody>
+                    <a:bodyPr/>
+                    <a:lstStyle/>
+                    <a:p>
+                      <a:pPr marL="0" marR="0" algn="ctr">
+                        <a:lnSpc>
+                          <a:spcPct val="115000"/>
+                        </a:lnSpc>
+                        <a:spcBef>
+                          <a:spcPts val="0"/>
+                        </a:spcBef>
+                        <a:spcAft>
+                          <a:spcPts val="0"/>
+                        </a:spcAft>
+                      </a:pPr>
+                      <a:r>
+                        <a:rPr lang="en-PH" sz="900" dirty="0">
+                          <a:effectLst/>
+                          <a:latin typeface="Calibri" panose="020F0502020204030204" pitchFamily="34" charset="0"/>
+                          <a:ea typeface="Calibri" panose="020F0502020204030204" pitchFamily="34" charset="0"/>
+                          <a:cs typeface="Times New Roman" panose="02020603050405020304" pitchFamily="18" charset="0"/>
+                        </a:rPr>
+                        <a:t>VCM</a:t>
+                      </a:r>
+                    </a:p>
+                  </a:txBody>
+                  <a:tcPr marL="53848" marR="53848" marT="0" marB="0" anchor="ctr"/>
+                </a:tc>
+                <a:tc>
+                  <a:txBody>
+                    <a:bodyPr/>
+                    <a:lstStyle/>
+                    <a:p>
+                      <a:pPr marL="0" marR="0" algn="ctr">
+                        <a:lnSpc>
+                          <a:spcPct val="115000"/>
+                        </a:lnSpc>
+                        <a:spcBef>
+                          <a:spcPts val="0"/>
+                        </a:spcBef>
+                        <a:spcAft>
+                          <a:spcPts val="0"/>
+                        </a:spcAft>
+                      </a:pPr>
+                      <a:r>
+                        <a:rPr lang="en-PH" sz="900" dirty="0">
+                          <a:effectLst/>
+                          <a:latin typeface="Calibri" panose="020F0502020204030204" pitchFamily="34" charset="0"/>
+                          <a:ea typeface="Calibri" panose="020F0502020204030204" pitchFamily="34" charset="0"/>
+                          <a:cs typeface="Times New Roman" panose="02020603050405020304" pitchFamily="18" charset="0"/>
+                        </a:rPr>
+                        <a:t>Hash the</a:t>
+                      </a:r>
+                      <a:r>
+                        <a:rPr lang="en-PH" sz="900" baseline="0" dirty="0">
+                          <a:effectLst/>
+                          <a:latin typeface="Calibri" panose="020F0502020204030204" pitchFamily="34" charset="0"/>
+                          <a:ea typeface="Calibri" panose="020F0502020204030204" pitchFamily="34" charset="0"/>
+                          <a:cs typeface="Times New Roman" panose="02020603050405020304" pitchFamily="18" charset="0"/>
+                        </a:rPr>
+                        <a:t> ER</a:t>
                       </a:r>
                       <a:endParaRPr lang="en-PH" sz="900" dirty="0">
                         <a:effectLst/>
@@ -3672,8 +3971,20 @@
                       <a:r>
                         <a:rPr lang="en-PH" sz="900" dirty="0">
                           <a:effectLst/>
-                        </a:rPr>
-                        <a:t>Decrypts the data</a:t>
+                          <a:latin typeface="Calibri" panose="020F0502020204030204" pitchFamily="34" charset="0"/>
+                          <a:ea typeface="Calibri" panose="020F0502020204030204" pitchFamily="34" charset="0"/>
+                          <a:cs typeface="Times New Roman" panose="02020603050405020304" pitchFamily="18" charset="0"/>
+                        </a:rPr>
+                        <a:t>Three</a:t>
+                      </a:r>
+                      <a:r>
+                        <a:rPr lang="en-PH" sz="900" baseline="0" dirty="0">
+                          <a:effectLst/>
+                          <a:latin typeface="Calibri" panose="020F0502020204030204" pitchFamily="34" charset="0"/>
+                          <a:ea typeface="Calibri" panose="020F0502020204030204" pitchFamily="34" charset="0"/>
+                          <a:cs typeface="Times New Roman" panose="02020603050405020304" pitchFamily="18" charset="0"/>
+                        </a:rPr>
+                        <a:t> hash values of ER</a:t>
                       </a:r>
                       <a:endParaRPr lang="en-PH" sz="900" dirty="0">
                         <a:effectLst/>
@@ -3704,8 +4015,74 @@
                       <a:r>
                         <a:rPr lang="en-PH" sz="900" dirty="0">
                           <a:effectLst/>
-                        </a:rPr>
-                        <a:t>Decrypted the data</a:t>
+                          <a:latin typeface="Calibri" panose="020F0502020204030204" pitchFamily="34" charset="0"/>
+                          <a:ea typeface="Calibri" panose="020F0502020204030204" pitchFamily="34" charset="0"/>
+                          <a:cs typeface="Times New Roman" panose="02020603050405020304" pitchFamily="18" charset="0"/>
+                        </a:rPr>
+                        <a:t>VCM</a:t>
+                      </a:r>
+                    </a:p>
+                  </a:txBody>
+                  <a:tcPr marL="53848" marR="53848" marT="0" marB="0" anchor="ctr"/>
+                </a:tc>
+                <a:extLst>
+                  <a:ext uri="{0D108BD9-81ED-4DB2-BD59-A6C34878D82A}">
+                    <a16:rowId xmlns:a16="http://schemas.microsoft.com/office/drawing/2014/main" val="2419685281"/>
+                  </a:ext>
+                </a:extLst>
+              </a:tr>
+              <a:tr h="402876">
+                <a:tc>
+                  <a:txBody>
+                    <a:bodyPr/>
+                    <a:lstStyle/>
+                    <a:p>
+                      <a:pPr marL="0" marR="0" algn="ctr">
+                        <a:lnSpc>
+                          <a:spcPct val="115000"/>
+                        </a:lnSpc>
+                        <a:spcBef>
+                          <a:spcPts val="0"/>
+                        </a:spcBef>
+                        <a:spcAft>
+                          <a:spcPts val="0"/>
+                        </a:spcAft>
+                      </a:pPr>
+                      <a:r>
+                        <a:rPr lang="en-PH" sz="900" dirty="0">
+                          <a:effectLst/>
+                          <a:latin typeface="Calibri" panose="020F0502020204030204" pitchFamily="34" charset="0"/>
+                          <a:ea typeface="Calibri" panose="020F0502020204030204" pitchFamily="34" charset="0"/>
+                          <a:cs typeface="Times New Roman" panose="02020603050405020304" pitchFamily="18" charset="0"/>
+                        </a:rPr>
+                        <a:t>VCM encrypts</a:t>
+                      </a:r>
+                      <a:r>
+                        <a:rPr lang="en-PH" sz="900" baseline="0" dirty="0">
+                          <a:effectLst/>
+                          <a:latin typeface="Calibri" panose="020F0502020204030204" pitchFamily="34" charset="0"/>
+                          <a:ea typeface="Calibri" panose="020F0502020204030204" pitchFamily="34" charset="0"/>
+                          <a:cs typeface="Times New Roman" panose="02020603050405020304" pitchFamily="18" charset="0"/>
+                        </a:rPr>
+                        <a:t> the encrypted ER and hash values together using the generated key in the </a:t>
+                      </a:r>
+                      <a:r>
+                        <a:rPr lang="en-PH" sz="900" baseline="0" dirty="0" err="1">
+                          <a:effectLst/>
+                          <a:latin typeface="Calibri" panose="020F0502020204030204" pitchFamily="34" charset="0"/>
+                          <a:ea typeface="Calibri" panose="020F0502020204030204" pitchFamily="34" charset="0"/>
+                          <a:cs typeface="Times New Roman" panose="02020603050405020304" pitchFamily="18" charset="0"/>
+                        </a:rPr>
+                        <a:t>Diffie</a:t>
+                      </a:r>
+                      <a:r>
+                        <a:rPr lang="en-PH" sz="900" baseline="0" dirty="0">
+                          <a:effectLst/>
+                          <a:latin typeface="Calibri" panose="020F0502020204030204" pitchFamily="34" charset="0"/>
+                          <a:ea typeface="Calibri" panose="020F0502020204030204" pitchFamily="34" charset="0"/>
+                          <a:cs typeface="Times New Roman" panose="02020603050405020304" pitchFamily="18" charset="0"/>
+                        </a:rPr>
+                        <a:t>-Hellman Algorithm</a:t>
                       </a:r>
                       <a:endParaRPr lang="en-PH" sz="900" dirty="0">
                         <a:effectLst/>
@@ -3736,77 +4113,20 @@
                       <a:r>
                         <a:rPr lang="en-PH" sz="900" dirty="0">
                           <a:effectLst/>
-                          <a:latin typeface="+mn-lt"/>
-                          <a:ea typeface="+mn-ea"/>
-                          <a:cs typeface="+mn-cs"/>
-                        </a:rPr>
-                        <a:t>CCS,</a:t>
+                          <a:latin typeface="Calibri" panose="020F0502020204030204" pitchFamily="34" charset="0"/>
+                          <a:ea typeface="Calibri" panose="020F0502020204030204" pitchFamily="34" charset="0"/>
+                          <a:cs typeface="Times New Roman" panose="02020603050405020304" pitchFamily="18" charset="0"/>
+                        </a:rPr>
+                        <a:t>Hash values  of</a:t>
                       </a:r>
                       <a:r>
                         <a:rPr lang="en-PH" sz="900" baseline="0" dirty="0">
                           <a:effectLst/>
-                          <a:latin typeface="+mn-lt"/>
-                          <a:ea typeface="+mn-ea"/>
-                          <a:cs typeface="+mn-cs"/>
-                        </a:rPr>
-                        <a:t> Central Server, and Transparency Server</a:t>
-                      </a:r>
-                      <a:endParaRPr lang="en-PH" sz="900" dirty="0">
-                        <a:effectLst/>
-                        <a:latin typeface="+mn-lt"/>
-                        <a:ea typeface="+mn-ea"/>
-                        <a:cs typeface="+mn-cs"/>
-                      </a:endParaRPr>
-                    </a:p>
-                  </a:txBody>
-                  <a:tcPr marL="53848" marR="53848" marT="0" marB="0" anchor="ctr"/>
-                </a:tc>
-                <a:extLst>
-                  <a:ext uri="{0D108BD9-81ED-4DB2-BD59-A6C34878D82A}">
-                    <a16:rowId xmlns:a16="http://schemas.microsoft.com/office/drawing/2014/main" val="83763036"/>
-                  </a:ext>
-                </a:extLst>
-              </a:tr>
-              <a:tr h="465421">
-                <a:tc>
-                  <a:txBody>
-                    <a:bodyPr/>
-                    <a:lstStyle/>
-                    <a:p>
-                      <a:pPr marL="0" marR="0" algn="ctr">
-                        <a:lnSpc>
-                          <a:spcPct val="115000"/>
-                        </a:lnSpc>
-                        <a:spcBef>
-                          <a:spcPts val="0"/>
-                        </a:spcBef>
-                        <a:spcAft>
-                          <a:spcPts val="0"/>
-                        </a:spcAft>
-                      </a:pPr>
-                      <a:r>
-                        <a:rPr lang="en-PH" sz="900" dirty="0">
-                          <a:effectLst/>
-                        </a:rPr>
-                        <a:t>VCM &amp; 3 Servers</a:t>
-                      </a:r>
-                      <a:r>
-                        <a:rPr lang="en-PH" sz="900" baseline="0" dirty="0">
-                          <a:effectLst/>
-                        </a:rPr>
-                        <a:t> create key exchange using the </a:t>
-                      </a:r>
-                      <a:r>
-                        <a:rPr lang="en-PH" sz="900" baseline="0" dirty="0" err="1">
-                          <a:effectLst/>
-                        </a:rPr>
-                        <a:t>Diffie</a:t>
-                      </a:r>
-                      <a:r>
-                        <a:rPr lang="en-PH" sz="900" baseline="0" dirty="0">
-                          <a:effectLst/>
-                        </a:rPr>
-                        <a:t>-Hellman algorithm</a:t>
+                          <a:latin typeface="Calibri" panose="020F0502020204030204" pitchFamily="34" charset="0"/>
+                          <a:ea typeface="Calibri" panose="020F0502020204030204" pitchFamily="34" charset="0"/>
+                          <a:cs typeface="Times New Roman" panose="02020603050405020304" pitchFamily="18" charset="0"/>
+                        </a:rPr>
+                        <a:t> ER</a:t>
                       </a:r>
                       <a:endParaRPr lang="en-PH" sz="900" dirty="0">
                         <a:effectLst/>
@@ -3835,16 +4155,51 @@
                         </a:spcAft>
                       </a:pPr>
                       <a:r>
-                        <a:rPr lang="en-PH" sz="900" dirty="0" err="1">
-                          <a:effectLst/>
-                        </a:rPr>
-                        <a:t>Succesfully</a:t>
+                        <a:rPr lang="en-PH" sz="900" dirty="0">
+                          <a:effectLst/>
+                          <a:latin typeface="Calibri" panose="020F0502020204030204" pitchFamily="34" charset="0"/>
+                          <a:ea typeface="Calibri" panose="020F0502020204030204" pitchFamily="34" charset="0"/>
+                          <a:cs typeface="Times New Roman" panose="02020603050405020304" pitchFamily="18" charset="0"/>
+                        </a:rPr>
+                        <a:t>VCM</a:t>
+                      </a:r>
+                    </a:p>
+                  </a:txBody>
+                  <a:tcPr marL="53848" marR="53848" marT="0" marB="0" anchor="ctr"/>
+                </a:tc>
+                <a:tc>
+                  <a:txBody>
+                    <a:bodyPr/>
+                    <a:lstStyle/>
+                    <a:p>
+                      <a:pPr marL="0" marR="0" algn="ctr">
+                        <a:lnSpc>
+                          <a:spcPct val="115000"/>
+                        </a:lnSpc>
+                        <a:spcBef>
+                          <a:spcPts val="0"/>
+                        </a:spcBef>
+                        <a:spcAft>
+                          <a:spcPts val="0"/>
+                        </a:spcAft>
+                      </a:pPr>
+                      <a:r>
+                        <a:rPr lang="en-PH" sz="900" dirty="0">
+                          <a:effectLst/>
+                          <a:latin typeface="Calibri" panose="020F0502020204030204" pitchFamily="34" charset="0"/>
+                          <a:ea typeface="Calibri" panose="020F0502020204030204" pitchFamily="34" charset="0"/>
+                          <a:cs typeface="Times New Roman" panose="02020603050405020304" pitchFamily="18" charset="0"/>
+                        </a:rPr>
+                        <a:t>Encrypt</a:t>
                       </a:r>
                       <a:r>
                         <a:rPr lang="en-PH" sz="900" baseline="0" dirty="0">
                           <a:effectLst/>
-                        </a:rPr>
-                        <a:t> decrypted data</a:t>
+                          <a:latin typeface="Calibri" panose="020F0502020204030204" pitchFamily="34" charset="0"/>
+                          <a:ea typeface="Calibri" panose="020F0502020204030204" pitchFamily="34" charset="0"/>
+                          <a:cs typeface="Times New Roman" panose="02020603050405020304" pitchFamily="18" charset="0"/>
+                        </a:rPr>
+                        <a:t> the encrypted ER and its hash values together</a:t>
                       </a:r>
                       <a:endParaRPr lang="en-PH" sz="900" dirty="0">
                         <a:effectLst/>
@@ -3873,16 +4228,31 @@
                         </a:spcAft>
                       </a:pPr>
                       <a:r>
+                        <a:rPr lang="en-PH" sz="900" dirty="0">
+                          <a:effectLst/>
+                          <a:latin typeface="Calibri" panose="020F0502020204030204" pitchFamily="34" charset="0"/>
+                          <a:ea typeface="Calibri" panose="020F0502020204030204" pitchFamily="34" charset="0"/>
+                          <a:cs typeface="Times New Roman" panose="02020603050405020304" pitchFamily="18" charset="0"/>
+                        </a:rPr>
+                        <a:t>Encrypted </a:t>
+                      </a:r>
+                      <a:r>
                         <a:rPr lang="en-PH" sz="900" dirty="0" err="1">
                           <a:effectLst/>
-                        </a:rPr>
-                        <a:t>VCm</a:t>
-                      </a:r>
-                      <a:r>
-                        <a:rPr lang="en-PH" sz="900" dirty="0">
-                          <a:effectLst/>
-                        </a:rPr>
-                        <a:t> &amp; 3 Servers</a:t>
+                          <a:latin typeface="Calibri" panose="020F0502020204030204" pitchFamily="34" charset="0"/>
+                          <a:ea typeface="Calibri" panose="020F0502020204030204" pitchFamily="34" charset="0"/>
+                          <a:cs typeface="Times New Roman" panose="02020603050405020304" pitchFamily="18" charset="0"/>
+                        </a:rPr>
+                        <a:t>encrypted</a:t>
+                      </a:r>
+                      <a:r>
+                        <a:rPr lang="en-PH" sz="900" baseline="0" dirty="0">
+                          <a:effectLst/>
+                          <a:latin typeface="Calibri" panose="020F0502020204030204" pitchFamily="34" charset="0"/>
+                          <a:ea typeface="Calibri" panose="020F0502020204030204" pitchFamily="34" charset="0"/>
+                          <a:cs typeface="Times New Roman" panose="02020603050405020304" pitchFamily="18" charset="0"/>
+                        </a:rPr>
+                        <a:t> ER and hash values</a:t>
                       </a:r>
                       <a:endParaRPr lang="en-PH" sz="900" dirty="0">
                         <a:effectLst/>
@@ -3913,8 +4283,74 @@
                       <a:r>
                         <a:rPr lang="en-PH" sz="900" dirty="0">
                           <a:effectLst/>
-                        </a:rPr>
-                        <a:t>Creates key exchange</a:t>
+                          <a:latin typeface="Calibri" panose="020F0502020204030204" pitchFamily="34" charset="0"/>
+                          <a:ea typeface="Calibri" panose="020F0502020204030204" pitchFamily="34" charset="0"/>
+                          <a:cs typeface="Times New Roman" panose="02020603050405020304" pitchFamily="18" charset="0"/>
+                        </a:rPr>
+                        <a:t>VCM</a:t>
+                      </a:r>
+                    </a:p>
+                  </a:txBody>
+                  <a:tcPr marL="53848" marR="53848" marT="0" marB="0" anchor="ctr"/>
+                </a:tc>
+                <a:extLst>
+                  <a:ext uri="{0D108BD9-81ED-4DB2-BD59-A6C34878D82A}">
+                    <a16:rowId xmlns:a16="http://schemas.microsoft.com/office/drawing/2014/main" val="3219376895"/>
+                  </a:ext>
+                </a:extLst>
+              </a:tr>
+              <a:tr h="770719">
+                <a:tc>
+                  <a:txBody>
+                    <a:bodyPr/>
+                    <a:lstStyle/>
+                    <a:p>
+                      <a:pPr marL="0" marR="0" algn="ctr">
+                        <a:lnSpc>
+                          <a:spcPct val="115000"/>
+                        </a:lnSpc>
+                        <a:spcBef>
+                          <a:spcPts val="0"/>
+                        </a:spcBef>
+                        <a:spcAft>
+                          <a:spcPts val="0"/>
+                        </a:spcAft>
+                      </a:pPr>
+                      <a:r>
+                        <a:rPr lang="en-PH" sz="900" dirty="0">
+                          <a:effectLst/>
+                          <a:latin typeface="Calibri" panose="020F0502020204030204" pitchFamily="34" charset="0"/>
+                          <a:ea typeface="Calibri" panose="020F0502020204030204" pitchFamily="34" charset="0"/>
+                          <a:cs typeface="Times New Roman" panose="02020603050405020304" pitchFamily="18" charset="0"/>
+                        </a:rPr>
+                        <a:t>VCM sends both the encrypted </a:t>
+                      </a:r>
+                      <a:r>
+                        <a:rPr lang="en-PH" sz="900" dirty="0" err="1">
+                          <a:effectLst/>
+                          <a:latin typeface="Calibri" panose="020F0502020204030204" pitchFamily="34" charset="0"/>
+                          <a:ea typeface="Calibri" panose="020F0502020204030204" pitchFamily="34" charset="0"/>
+                          <a:cs typeface="Times New Roman" panose="02020603050405020304" pitchFamily="18" charset="0"/>
+                        </a:rPr>
+                        <a:t>encrypted</a:t>
+                      </a:r>
+                      <a:r>
+                        <a:rPr lang="en-PH" sz="900" dirty="0">
+                          <a:effectLst/>
+                          <a:latin typeface="Calibri" panose="020F0502020204030204" pitchFamily="34" charset="0"/>
+                          <a:ea typeface="Calibri" panose="020F0502020204030204" pitchFamily="34" charset="0"/>
+                          <a:cs typeface="Times New Roman" panose="02020603050405020304" pitchFamily="18" charset="0"/>
+                        </a:rPr>
+                        <a:t> ER and its three</a:t>
+                      </a:r>
+                      <a:r>
+                        <a:rPr lang="en-PH" sz="900" baseline="0" dirty="0">
+                          <a:effectLst/>
+                          <a:latin typeface="Calibri" panose="020F0502020204030204" pitchFamily="34" charset="0"/>
+                          <a:ea typeface="Calibri" panose="020F0502020204030204" pitchFamily="34" charset="0"/>
+                          <a:cs typeface="Times New Roman" panose="02020603050405020304" pitchFamily="18" charset="0"/>
+                        </a:rPr>
+                        <a:t> hash values to Server Key</a:t>
                       </a:r>
                       <a:endParaRPr lang="en-PH" sz="900" dirty="0">
                         <a:effectLst/>
@@ -3931,6 +4367,101 @@
                     <a:bodyPr/>
                     <a:lstStyle/>
                     <a:p>
+                      <a:pPr marL="0" marR="0" algn="ctr" defTabSz="914400" rtl="0" eaLnBrk="1" latinLnBrk="0" hangingPunct="1">
+                        <a:lnSpc>
+                          <a:spcPct val="115000"/>
+                        </a:lnSpc>
+                        <a:spcBef>
+                          <a:spcPts val="0"/>
+                        </a:spcBef>
+                        <a:spcAft>
+                          <a:spcPts val="0"/>
+                        </a:spcAft>
+                      </a:pPr>
+                      <a:endParaRPr lang="en-PH" sz="900" kern="1200" dirty="0">
+                        <a:solidFill>
+                          <a:schemeClr val="dk1"/>
+                        </a:solidFill>
+                        <a:effectLst/>
+                        <a:latin typeface="Calibri" panose="020F0502020204030204" pitchFamily="34" charset="0"/>
+                        <a:ea typeface="Calibri" panose="020F0502020204030204" pitchFamily="34" charset="0"/>
+                        <a:cs typeface="Times New Roman" panose="02020603050405020304" pitchFamily="18" charset="0"/>
+                      </a:endParaRPr>
+                    </a:p>
+                    <a:p>
+                      <a:pPr marL="0" marR="0" algn="ctr" defTabSz="914400" rtl="0" eaLnBrk="1" latinLnBrk="0" hangingPunct="1">
+                        <a:lnSpc>
+                          <a:spcPct val="115000"/>
+                        </a:lnSpc>
+                        <a:spcBef>
+                          <a:spcPts val="0"/>
+                        </a:spcBef>
+                        <a:spcAft>
+                          <a:spcPts val="0"/>
+                        </a:spcAft>
+                      </a:pPr>
+                      <a:r>
+                        <a:rPr lang="en-PH" sz="900" kern="1200" dirty="0">
+                          <a:solidFill>
+                            <a:schemeClr val="dk1"/>
+                          </a:solidFill>
+                          <a:effectLst/>
+                          <a:latin typeface="Calibri" panose="020F0502020204030204" pitchFamily="34" charset="0"/>
+                          <a:ea typeface="Calibri" panose="020F0502020204030204" pitchFamily="34" charset="0"/>
+                          <a:cs typeface="Times New Roman" panose="02020603050405020304" pitchFamily="18" charset="0"/>
+                        </a:rPr>
+                        <a:t>Encrypted </a:t>
+                      </a:r>
+                      <a:r>
+                        <a:rPr lang="en-PH" sz="900" kern="1200" dirty="0" err="1">
+                          <a:solidFill>
+                            <a:schemeClr val="dk1"/>
+                          </a:solidFill>
+                          <a:effectLst/>
+                          <a:latin typeface="Calibri" panose="020F0502020204030204" pitchFamily="34" charset="0"/>
+                          <a:ea typeface="Calibri" panose="020F0502020204030204" pitchFamily="34" charset="0"/>
+                          <a:cs typeface="Times New Roman" panose="02020603050405020304" pitchFamily="18" charset="0"/>
+                        </a:rPr>
+                        <a:t>encrypted</a:t>
+                      </a:r>
+                      <a:r>
+                        <a:rPr lang="en-PH" sz="900" kern="1200" dirty="0">
+                          <a:solidFill>
+                            <a:schemeClr val="dk1"/>
+                          </a:solidFill>
+                          <a:effectLst/>
+                          <a:latin typeface="Calibri" panose="020F0502020204030204" pitchFamily="34" charset="0"/>
+                          <a:ea typeface="Calibri" panose="020F0502020204030204" pitchFamily="34" charset="0"/>
+                          <a:cs typeface="Times New Roman" panose="02020603050405020304" pitchFamily="18" charset="0"/>
+                        </a:rPr>
+                        <a:t> ER and hash values</a:t>
+                      </a:r>
+                    </a:p>
+                    <a:p>
+                      <a:endParaRPr lang="en-PH" dirty="0"/>
+                    </a:p>
+                  </a:txBody>
+                  <a:tcPr marL="53848" marR="53848" marT="0" marB="0" anchor="ctr"/>
+                </a:tc>
+                <a:tc>
+                  <a:txBody>
+                    <a:bodyPr/>
+                    <a:lstStyle/>
+                    <a:p>
+                      <a:pPr algn="ctr"/>
+                      <a:r>
+                        <a:rPr lang="en-PH" sz="900" dirty="0"/>
+                        <a:t>VCM</a:t>
+                      </a:r>
+                    </a:p>
+                  </a:txBody>
+                  <a:tcPr marL="53848" marR="53848" marT="0" marB="0" anchor="ctr"/>
+                </a:tc>
+                <a:tc>
+                  <a:txBody>
+                    <a:bodyPr/>
+                    <a:lstStyle/>
+                    <a:p>
                       <a:pPr marL="0" marR="0" algn="ctr">
                         <a:lnSpc>
                           <a:spcPct val="115000"/>
@@ -3945,8 +4476,38 @@
                       <a:r>
                         <a:rPr lang="en-PH" sz="900" dirty="0">
                           <a:effectLst/>
-                        </a:rPr>
-                        <a:t>Generated Key</a:t>
+                          <a:latin typeface="Calibri" panose="020F0502020204030204" pitchFamily="34" charset="0"/>
+                          <a:ea typeface="Calibri" panose="020F0502020204030204" pitchFamily="34" charset="0"/>
+                          <a:cs typeface="Times New Roman" panose="02020603050405020304" pitchFamily="18" charset="0"/>
+                        </a:rPr>
+                        <a:t>Se</a:t>
+                      </a:r>
+                      <a:r>
+                        <a:rPr lang="en-PH" sz="900" baseline="0" dirty="0">
+                          <a:effectLst/>
+                          <a:latin typeface="Calibri" panose="020F0502020204030204" pitchFamily="34" charset="0"/>
+                          <a:ea typeface="Calibri" panose="020F0502020204030204" pitchFamily="34" charset="0"/>
+                          <a:cs typeface="Times New Roman" panose="02020603050405020304" pitchFamily="18" charset="0"/>
+                        </a:rPr>
+                        <a:t>nd both the encrypted </a:t>
+                      </a:r>
+                      <a:r>
+                        <a:rPr lang="en-PH" sz="900" baseline="0" dirty="0" err="1">
+                          <a:effectLst/>
+                          <a:latin typeface="Calibri" panose="020F0502020204030204" pitchFamily="34" charset="0"/>
+                          <a:ea typeface="Calibri" panose="020F0502020204030204" pitchFamily="34" charset="0"/>
+                          <a:cs typeface="Times New Roman" panose="02020603050405020304" pitchFamily="18" charset="0"/>
+                        </a:rPr>
+                        <a:t>encrypted</a:t>
+                      </a:r>
+                      <a:r>
+                        <a:rPr lang="en-PH" sz="900" baseline="0" dirty="0">
+                          <a:effectLst/>
+                          <a:latin typeface="Calibri" panose="020F0502020204030204" pitchFamily="34" charset="0"/>
+                          <a:ea typeface="Calibri" panose="020F0502020204030204" pitchFamily="34" charset="0"/>
+                          <a:cs typeface="Times New Roman" panose="02020603050405020304" pitchFamily="18" charset="0"/>
+                        </a:rPr>
+                        <a:t> ER and its hash values</a:t>
                       </a:r>
                       <a:endParaRPr lang="en-PH" sz="900" dirty="0">
                         <a:effectLst/>
@@ -3977,8 +4538,85 @@
                       <a:r>
                         <a:rPr lang="en-PH" sz="900" dirty="0">
                           <a:effectLst/>
-                        </a:rPr>
-                        <a:t>VCM</a:t>
+                          <a:latin typeface="Calibri" panose="020F0502020204030204" pitchFamily="34" charset="0"/>
+                          <a:ea typeface="Calibri" panose="020F0502020204030204" pitchFamily="34" charset="0"/>
+                          <a:cs typeface="Times New Roman" panose="02020603050405020304" pitchFamily="18" charset="0"/>
+                        </a:rPr>
+                        <a:t>Sent </a:t>
+                      </a:r>
+                      <a:r>
+                        <a:rPr lang="en-PH" sz="900" baseline="0" dirty="0">
+                          <a:effectLst/>
+                          <a:latin typeface="Calibri" panose="020F0502020204030204" pitchFamily="34" charset="0"/>
+                          <a:ea typeface="Calibri" panose="020F0502020204030204" pitchFamily="34" charset="0"/>
+                          <a:cs typeface="Times New Roman" panose="02020603050405020304" pitchFamily="18" charset="0"/>
+                        </a:rPr>
+                        <a:t>encrypted </a:t>
+                      </a:r>
+                      <a:r>
+                        <a:rPr lang="en-PH" sz="900" baseline="0" dirty="0" err="1">
+                          <a:effectLst/>
+                          <a:latin typeface="Calibri" panose="020F0502020204030204" pitchFamily="34" charset="0"/>
+                          <a:ea typeface="Calibri" panose="020F0502020204030204" pitchFamily="34" charset="0"/>
+                          <a:cs typeface="Times New Roman" panose="02020603050405020304" pitchFamily="18" charset="0"/>
+                        </a:rPr>
+                        <a:t>encrypted</a:t>
+                      </a:r>
+                      <a:r>
+                        <a:rPr lang="en-PH" sz="900" baseline="0" dirty="0">
+                          <a:effectLst/>
+                          <a:latin typeface="Calibri" panose="020F0502020204030204" pitchFamily="34" charset="0"/>
+                          <a:ea typeface="Calibri" panose="020F0502020204030204" pitchFamily="34" charset="0"/>
+                          <a:cs typeface="Times New Roman" panose="02020603050405020304" pitchFamily="18" charset="0"/>
+                        </a:rPr>
+                        <a:t> ER </a:t>
+                      </a:r>
+                      <a:r>
+                        <a:rPr lang="en-PH" sz="900" dirty="0">
+                          <a:effectLst/>
+                          <a:latin typeface="Calibri" panose="020F0502020204030204" pitchFamily="34" charset="0"/>
+                          <a:ea typeface="Calibri" panose="020F0502020204030204" pitchFamily="34" charset="0"/>
+                          <a:cs typeface="Times New Roman" panose="02020603050405020304" pitchFamily="18" charset="0"/>
+                        </a:rPr>
+                        <a:t> and hash value</a:t>
+                      </a:r>
+                    </a:p>
+                  </a:txBody>
+                  <a:tcPr marL="53848" marR="53848" marT="0" marB="0" anchor="ctr"/>
+                </a:tc>
+                <a:tc>
+                  <a:txBody>
+                    <a:bodyPr/>
+                    <a:lstStyle/>
+                    <a:p>
+                      <a:pPr marL="0" marR="0" algn="ctr">
+                        <a:lnSpc>
+                          <a:spcPct val="115000"/>
+                        </a:lnSpc>
+                        <a:spcBef>
+                          <a:spcPts val="0"/>
+                        </a:spcBef>
+                        <a:spcAft>
+                          <a:spcPts val="0"/>
+                        </a:spcAft>
+                      </a:pPr>
+                      <a:r>
+                        <a:rPr lang="en-PH" sz="900" dirty="0">
+                          <a:effectLst/>
+                          <a:latin typeface="Calibri" panose="020F0502020204030204" pitchFamily="34" charset="0"/>
+                          <a:ea typeface="Calibri" panose="020F0502020204030204" pitchFamily="34" charset="0"/>
+                          <a:cs typeface="Times New Roman" panose="02020603050405020304" pitchFamily="18" charset="0"/>
+                        </a:rPr>
+                        <a:t>Server</a:t>
+                      </a:r>
+                      <a:r>
+                        <a:rPr lang="en-PH" sz="900" baseline="0" dirty="0">
+                          <a:effectLst/>
+                          <a:latin typeface="Calibri" panose="020F0502020204030204" pitchFamily="34" charset="0"/>
+                          <a:ea typeface="Calibri" panose="020F0502020204030204" pitchFamily="34" charset="0"/>
+                          <a:cs typeface="Times New Roman" panose="02020603050405020304" pitchFamily="18" charset="0"/>
+                        </a:rPr>
+                        <a:t> Key</a:t>
                       </a:r>
                       <a:endParaRPr lang="en-PH" sz="900" dirty="0">
                         <a:effectLst/>
@@ -3992,11 +4630,11 @@
                 </a:tc>
                 <a:extLst>
                   <a:ext uri="{0D108BD9-81ED-4DB2-BD59-A6C34878D82A}">
-                    <a16:rowId xmlns:a16="http://schemas.microsoft.com/office/drawing/2014/main" val="2419685281"/>
+                    <a16:rowId xmlns:a16="http://schemas.microsoft.com/office/drawing/2014/main" val="771850208"/>
                   </a:ext>
                 </a:extLst>
               </a:tr>
-              <a:tr h="465421">
+              <a:tr h="661392">
                 <a:tc>
                   <a:txBody>
                     <a:bodyPr/>
@@ -4016,14 +4654,38 @@
                       <a:r>
                         <a:rPr lang="en-PH" sz="900" dirty="0">
                           <a:effectLst/>
-                        </a:rPr>
-                        <a:t>VCM sends</a:t>
+                          <a:latin typeface="Calibri" panose="020F0502020204030204" pitchFamily="34" charset="0"/>
+                          <a:ea typeface="Calibri" panose="020F0502020204030204" pitchFamily="34" charset="0"/>
+                          <a:cs typeface="Times New Roman" panose="02020603050405020304" pitchFamily="18" charset="0"/>
+                        </a:rPr>
+                        <a:t>Server</a:t>
                       </a:r>
                       <a:r>
                         <a:rPr lang="en-PH" sz="900" baseline="0" dirty="0">
                           <a:effectLst/>
-                        </a:rPr>
-                        <a:t> encrypted election returns using the generated key</a:t>
+                          <a:latin typeface="Calibri" panose="020F0502020204030204" pitchFamily="34" charset="0"/>
+                          <a:ea typeface="Calibri" panose="020F0502020204030204" pitchFamily="34" charset="0"/>
+                          <a:cs typeface="Times New Roman" panose="02020603050405020304" pitchFamily="18" charset="0"/>
+                        </a:rPr>
+                        <a:t> Key receives the data and decrypts it using the </a:t>
+                      </a:r>
+                      <a:r>
+                        <a:rPr lang="en-PH" sz="900" baseline="0" dirty="0" err="1">
+                          <a:effectLst/>
+                          <a:latin typeface="Calibri" panose="020F0502020204030204" pitchFamily="34" charset="0"/>
+                          <a:ea typeface="Calibri" panose="020F0502020204030204" pitchFamily="34" charset="0"/>
+                          <a:cs typeface="Times New Roman" panose="02020603050405020304" pitchFamily="18" charset="0"/>
+                        </a:rPr>
+                        <a:t>Diffie</a:t>
+                      </a:r>
+                      <a:r>
+                        <a:rPr lang="en-PH" sz="900" baseline="0" dirty="0">
+                          <a:effectLst/>
+                          <a:latin typeface="Calibri" panose="020F0502020204030204" pitchFamily="34" charset="0"/>
+                          <a:ea typeface="Calibri" panose="020F0502020204030204" pitchFamily="34" charset="0"/>
+                          <a:cs typeface="Times New Roman" panose="02020603050405020304" pitchFamily="18" charset="0"/>
+                        </a:rPr>
+                        <a:t>-Hellman Key and the VCM’s public key</a:t>
                       </a:r>
                       <a:endParaRPr lang="en-PH" sz="900" dirty="0">
                         <a:effectLst/>
@@ -4054,9 +4716,61 @@
                       <a:r>
                         <a:rPr lang="en-PH" sz="900" dirty="0">
                           <a:effectLst/>
-                        </a:rPr>
-                        <a:t>Generated Key</a:t>
-                      </a:r>
+                          <a:latin typeface="Calibri" panose="020F0502020204030204" pitchFamily="34" charset="0"/>
+                          <a:ea typeface="Calibri" panose="020F0502020204030204" pitchFamily="34" charset="0"/>
+                          <a:cs typeface="Times New Roman" panose="02020603050405020304" pitchFamily="18" charset="0"/>
+                        </a:rPr>
+                        <a:t>Sent </a:t>
+                      </a:r>
+                      <a:r>
+                        <a:rPr lang="en-PH" sz="900" baseline="0" dirty="0">
+                          <a:effectLst/>
+                          <a:latin typeface="Calibri" panose="020F0502020204030204" pitchFamily="34" charset="0"/>
+                          <a:ea typeface="Calibri" panose="020F0502020204030204" pitchFamily="34" charset="0"/>
+                          <a:cs typeface="Times New Roman" panose="02020603050405020304" pitchFamily="18" charset="0"/>
+                        </a:rPr>
+                        <a:t>encrypted </a:t>
+                      </a:r>
+                      <a:r>
+                        <a:rPr lang="en-PH" sz="900" baseline="0" dirty="0" err="1">
+                          <a:effectLst/>
+                          <a:latin typeface="Calibri" panose="020F0502020204030204" pitchFamily="34" charset="0"/>
+                          <a:ea typeface="Calibri" panose="020F0502020204030204" pitchFamily="34" charset="0"/>
+                          <a:cs typeface="Times New Roman" panose="02020603050405020304" pitchFamily="18" charset="0"/>
+                        </a:rPr>
+                        <a:t>encrypted</a:t>
+                      </a:r>
+                      <a:r>
+                        <a:rPr lang="en-PH" sz="900" baseline="0" dirty="0">
+                          <a:effectLst/>
+                          <a:latin typeface="Calibri" panose="020F0502020204030204" pitchFamily="34" charset="0"/>
+                          <a:ea typeface="Calibri" panose="020F0502020204030204" pitchFamily="34" charset="0"/>
+                          <a:cs typeface="Times New Roman" panose="02020603050405020304" pitchFamily="18" charset="0"/>
+                        </a:rPr>
+                        <a:t> ER </a:t>
+                      </a:r>
+                      <a:r>
+                        <a:rPr lang="en-PH" sz="900" dirty="0">
+                          <a:effectLst/>
+                          <a:latin typeface="Calibri" panose="020F0502020204030204" pitchFamily="34" charset="0"/>
+                          <a:ea typeface="Calibri" panose="020F0502020204030204" pitchFamily="34" charset="0"/>
+                          <a:cs typeface="Times New Roman" panose="02020603050405020304" pitchFamily="18" charset="0"/>
+                        </a:rPr>
+                        <a:t> and hash value</a:t>
+                      </a:r>
+                    </a:p>
+                    <a:p>
+                      <a:pPr marL="0" marR="0" algn="ctr">
+                        <a:lnSpc>
+                          <a:spcPct val="115000"/>
+                        </a:lnSpc>
+                        <a:spcBef>
+                          <a:spcPts val="0"/>
+                        </a:spcBef>
+                        <a:spcAft>
+                          <a:spcPts val="0"/>
+                        </a:spcAft>
+                      </a:pPr>
                       <a:endParaRPr lang="en-PH" sz="900" dirty="0">
                         <a:effectLst/>
                         <a:latin typeface="Calibri" panose="020F0502020204030204" pitchFamily="34" charset="0"/>
@@ -4086,9 +4800,32 @@
                       <a:r>
                         <a:rPr lang="en-PH" sz="900" dirty="0">
                           <a:effectLst/>
-                        </a:rPr>
-                        <a:t>Key exchange</a:t>
-                      </a:r>
+                          <a:latin typeface="Calibri" panose="020F0502020204030204" pitchFamily="34" charset="0"/>
+                          <a:ea typeface="Calibri" panose="020F0502020204030204" pitchFamily="34" charset="0"/>
+                          <a:cs typeface="Times New Roman" panose="02020603050405020304" pitchFamily="18" charset="0"/>
+                        </a:rPr>
+                        <a:t>Server Key</a:t>
+                      </a:r>
+                    </a:p>
+                  </a:txBody>
+                  <a:tcPr marL="53848" marR="53848" marT="0" marB="0" anchor="ctr"/>
+                </a:tc>
+                <a:tc>
+                  <a:txBody>
+                    <a:bodyPr/>
+                    <a:lstStyle/>
+                    <a:p>
+                      <a:pPr marL="0" marR="0" algn="ctr">
+                        <a:lnSpc>
+                          <a:spcPct val="115000"/>
+                        </a:lnSpc>
+                        <a:spcBef>
+                          <a:spcPts val="0"/>
+                        </a:spcBef>
+                        <a:spcAft>
+                          <a:spcPts val="0"/>
+                        </a:spcAft>
+                      </a:pPr>
                       <a:endParaRPr lang="en-PH" sz="900" dirty="0">
                         <a:effectLst/>
                         <a:latin typeface="Calibri" panose="020F0502020204030204" pitchFamily="34" charset="0"/>
@@ -4096,13 +4833,6 @@
                         <a:cs typeface="Times New Roman" panose="02020603050405020304" pitchFamily="18" charset="0"/>
                       </a:endParaRPr>
                     </a:p>
-                  </a:txBody>
-                  <a:tcPr marL="53848" marR="53848" marT="0" marB="0" anchor="ctr"/>
-                </a:tc>
-                <a:tc>
-                  <a:txBody>
-                    <a:bodyPr/>
-                    <a:lstStyle/>
                     <a:p>
                       <a:pPr marL="0" marR="0" algn="ctr">
                         <a:lnSpc>
@@ -4118,14 +4848,38 @@
                       <a:r>
                         <a:rPr lang="en-PH" sz="900" dirty="0">
                           <a:effectLst/>
-                        </a:rPr>
-                        <a:t>Sends encrypted</a:t>
+                          <a:latin typeface="Calibri" panose="020F0502020204030204" pitchFamily="34" charset="0"/>
+                          <a:ea typeface="Calibri" panose="020F0502020204030204" pitchFamily="34" charset="0"/>
+                          <a:cs typeface="Times New Roman" panose="02020603050405020304" pitchFamily="18" charset="0"/>
+                        </a:rPr>
+                        <a:t>Decrypt data using </a:t>
+                      </a:r>
+                      <a:r>
+                        <a:rPr lang="en-PH" sz="900" dirty="0" err="1">
+                          <a:effectLst/>
+                          <a:latin typeface="Calibri" panose="020F0502020204030204" pitchFamily="34" charset="0"/>
+                          <a:ea typeface="Calibri" panose="020F0502020204030204" pitchFamily="34" charset="0"/>
+                          <a:cs typeface="Times New Roman" panose="02020603050405020304" pitchFamily="18" charset="0"/>
+                        </a:rPr>
+                        <a:t>Diffie</a:t>
+                      </a:r>
+                      <a:r>
+                        <a:rPr lang="en-PH" sz="900" dirty="0">
+                          <a:effectLst/>
+                          <a:latin typeface="Calibri" panose="020F0502020204030204" pitchFamily="34" charset="0"/>
+                          <a:ea typeface="Calibri" panose="020F0502020204030204" pitchFamily="34" charset="0"/>
+                          <a:cs typeface="Times New Roman" panose="02020603050405020304" pitchFamily="18" charset="0"/>
+                        </a:rPr>
+                        <a:t>-Hellman Key and VCM’s public</a:t>
                       </a:r>
                       <a:r>
                         <a:rPr lang="en-PH" sz="900" baseline="0" dirty="0">
                           <a:effectLst/>
-                        </a:rPr>
-                        <a:t> ERs</a:t>
+                          <a:latin typeface="Calibri" panose="020F0502020204030204" pitchFamily="34" charset="0"/>
+                          <a:ea typeface="Calibri" panose="020F0502020204030204" pitchFamily="34" charset="0"/>
+                          <a:cs typeface="Times New Roman" panose="02020603050405020304" pitchFamily="18" charset="0"/>
+                        </a:rPr>
+                        <a:t> key</a:t>
                       </a:r>
                       <a:endParaRPr lang="en-PH" sz="900" dirty="0">
                         <a:effectLst/>
@@ -4156,20 +4910,20 @@
                       <a:r>
                         <a:rPr lang="en-PH" sz="900" dirty="0">
                           <a:effectLst/>
-                          <a:latin typeface="+mn-lt"/>
-                          <a:ea typeface="+mn-ea"/>
-                          <a:cs typeface="+mn-cs"/>
-                        </a:rPr>
-                        <a:t>Sent</a:t>
+                          <a:latin typeface="Calibri" panose="020F0502020204030204" pitchFamily="34" charset="0"/>
+                          <a:ea typeface="Calibri" panose="020F0502020204030204" pitchFamily="34" charset="0"/>
+                          <a:cs typeface="Times New Roman" panose="02020603050405020304" pitchFamily="18" charset="0"/>
+                        </a:rPr>
+                        <a:t>Decrypted</a:t>
                       </a:r>
                       <a:r>
                         <a:rPr lang="en-PH" sz="900" baseline="0" dirty="0">
                           <a:effectLst/>
-                          <a:latin typeface="+mn-lt"/>
-                          <a:ea typeface="+mn-ea"/>
-                          <a:cs typeface="+mn-cs"/>
-                        </a:rPr>
-                        <a:t> encrypted ERs</a:t>
+                          <a:latin typeface="Calibri" panose="020F0502020204030204" pitchFamily="34" charset="0"/>
+                          <a:ea typeface="Calibri" panose="020F0502020204030204" pitchFamily="34" charset="0"/>
+                          <a:cs typeface="Times New Roman" panose="02020603050405020304" pitchFamily="18" charset="0"/>
+                        </a:rPr>
+                        <a:t> ER and its hash function</a:t>
                       </a:r>
                       <a:endParaRPr lang="en-PH" sz="900" dirty="0">
                         <a:effectLst/>
@@ -4200,42 +4954,20 @@
                       <a:r>
                         <a:rPr lang="en-PH" sz="900" dirty="0">
                           <a:effectLst/>
-                          <a:latin typeface="+mn-lt"/>
-                          <a:ea typeface="+mn-ea"/>
-                          <a:cs typeface="+mn-cs"/>
-                        </a:rPr>
-                        <a:t>CCS,</a:t>
+                          <a:latin typeface="Calibri" panose="020F0502020204030204" pitchFamily="34" charset="0"/>
+                          <a:ea typeface="Calibri" panose="020F0502020204030204" pitchFamily="34" charset="0"/>
+                          <a:cs typeface="Times New Roman" panose="02020603050405020304" pitchFamily="18" charset="0"/>
+                        </a:rPr>
+                        <a:t>Server</a:t>
                       </a:r>
                       <a:r>
                         <a:rPr lang="en-PH" sz="900" baseline="0" dirty="0">
                           <a:effectLst/>
-                          <a:latin typeface="+mn-lt"/>
-                          <a:ea typeface="+mn-ea"/>
-                          <a:cs typeface="+mn-cs"/>
-                        </a:rPr>
-                        <a:t> Central Server, </a:t>
-                      </a:r>
-                    </a:p>
-                    <a:p>
-                      <a:pPr marL="0" marR="0" algn="ctr">
-                        <a:lnSpc>
-                          <a:spcPct val="115000"/>
-                        </a:lnSpc>
-                        <a:spcBef>
-                          <a:spcPts val="0"/>
-                        </a:spcBef>
-                        <a:spcAft>
-                          <a:spcPts val="0"/>
-                        </a:spcAft>
-                      </a:pPr>
-                      <a:r>
-                        <a:rPr lang="en-PH" sz="900" baseline="0" dirty="0">
-                          <a:effectLst/>
-                          <a:latin typeface="+mn-lt"/>
-                          <a:ea typeface="+mn-ea"/>
-                          <a:cs typeface="+mn-cs"/>
-                        </a:rPr>
-                        <a:t>and Transparency Server</a:t>
+                          <a:latin typeface="Calibri" panose="020F0502020204030204" pitchFamily="34" charset="0"/>
+                          <a:ea typeface="Calibri" panose="020F0502020204030204" pitchFamily="34" charset="0"/>
+                          <a:cs typeface="Times New Roman" panose="02020603050405020304" pitchFamily="18" charset="0"/>
+                        </a:rPr>
+                        <a:t> Key</a:t>
                       </a:r>
                       <a:endParaRPr lang="en-PH" sz="900" dirty="0">
                         <a:effectLst/>
@@ -4249,11 +4981,11 @@
                 </a:tc>
                 <a:extLst>
                   <a:ext uri="{0D108BD9-81ED-4DB2-BD59-A6C34878D82A}">
-                    <a16:rowId xmlns:a16="http://schemas.microsoft.com/office/drawing/2014/main" val="771850208"/>
+                    <a16:rowId xmlns:a16="http://schemas.microsoft.com/office/drawing/2014/main" val="4049186922"/>
                   </a:ext>
                 </a:extLst>
               </a:tr>
-              <a:tr h="776845">
+              <a:tr h="661392">
                 <a:tc>
                   <a:txBody>
                     <a:bodyPr/>
@@ -4273,20 +5005,49 @@
                       <a:r>
                         <a:rPr lang="en-PH" sz="900" dirty="0">
                           <a:effectLst/>
-                          <a:latin typeface="+mn-lt"/>
-                          <a:ea typeface="+mn-ea"/>
-                          <a:cs typeface="+mn-cs"/>
-                        </a:rPr>
-                        <a:t>CCS,</a:t>
+                          <a:latin typeface="Calibri" panose="020F0502020204030204" pitchFamily="34" charset="0"/>
+                          <a:ea typeface="Calibri" panose="020F0502020204030204" pitchFamily="34" charset="0"/>
+                          <a:cs typeface="Times New Roman" panose="02020603050405020304" pitchFamily="18" charset="0"/>
+                        </a:rPr>
+                        <a:t>Server key hashes the decrypted ER</a:t>
+                      </a:r>
+                    </a:p>
+                  </a:txBody>
+                  <a:tcPr marL="53848" marR="53848" marT="0" marB="0" anchor="ctr"/>
+                </a:tc>
+                <a:tc>
+                  <a:txBody>
+                    <a:bodyPr/>
+                    <a:lstStyle/>
+                    <a:p>
+                      <a:pPr marL="0" marR="0" algn="ctr">
+                        <a:lnSpc>
+                          <a:spcPct val="115000"/>
+                        </a:lnSpc>
+                        <a:spcBef>
+                          <a:spcPts val="0"/>
+                        </a:spcBef>
+                        <a:spcAft>
+                          <a:spcPts val="0"/>
+                        </a:spcAft>
+                      </a:pPr>
+                      <a:r>
+                        <a:rPr lang="en-PH" sz="900" dirty="0">
+                          <a:effectLst/>
+                          <a:latin typeface="Calibri" panose="020F0502020204030204" pitchFamily="34" charset="0"/>
+                          <a:ea typeface="Calibri" panose="020F0502020204030204" pitchFamily="34" charset="0"/>
+                          <a:cs typeface="Times New Roman" panose="02020603050405020304" pitchFamily="18" charset="0"/>
+                        </a:rPr>
+                        <a:t>Decrypted</a:t>
                       </a:r>
                       <a:r>
                         <a:rPr lang="en-PH" sz="900" baseline="0" dirty="0">
                           <a:effectLst/>
-                          <a:latin typeface="+mn-lt"/>
-                          <a:ea typeface="+mn-ea"/>
-                          <a:cs typeface="+mn-cs"/>
-                        </a:rPr>
-                        <a:t> Central Server and, Transparency Server verify hash value of the received election returns</a:t>
+                          <a:latin typeface="Calibri" panose="020F0502020204030204" pitchFamily="34" charset="0"/>
+                          <a:ea typeface="Calibri" panose="020F0502020204030204" pitchFamily="34" charset="0"/>
+                          <a:cs typeface="Times New Roman" panose="02020603050405020304" pitchFamily="18" charset="0"/>
+                        </a:rPr>
+                        <a:t> data</a:t>
                       </a:r>
                       <a:endParaRPr lang="en-PH" sz="900" dirty="0">
                         <a:effectLst/>
@@ -4317,14 +5078,78 @@
                       <a:r>
                         <a:rPr lang="en-PH" sz="900" dirty="0">
                           <a:effectLst/>
-                        </a:rPr>
-                        <a:t>Received</a:t>
+                          <a:latin typeface="Calibri" panose="020F0502020204030204" pitchFamily="34" charset="0"/>
+                          <a:ea typeface="Calibri" panose="020F0502020204030204" pitchFamily="34" charset="0"/>
+                          <a:cs typeface="Times New Roman" panose="02020603050405020304" pitchFamily="18" charset="0"/>
+                        </a:rPr>
+                        <a:t>Server Key</a:t>
+                      </a:r>
+                    </a:p>
+                  </a:txBody>
+                  <a:tcPr marL="53848" marR="53848" marT="0" marB="0" anchor="ctr"/>
+                </a:tc>
+                <a:tc>
+                  <a:txBody>
+                    <a:bodyPr/>
+                    <a:lstStyle/>
+                    <a:p>
+                      <a:pPr marL="0" marR="0" algn="ctr">
+                        <a:lnSpc>
+                          <a:spcPct val="115000"/>
+                        </a:lnSpc>
+                        <a:spcBef>
+                          <a:spcPts val="0"/>
+                        </a:spcBef>
+                        <a:spcAft>
+                          <a:spcPts val="0"/>
+                        </a:spcAft>
+                      </a:pPr>
+                      <a:r>
+                        <a:rPr lang="en-PH" sz="900" dirty="0">
+                          <a:effectLst/>
+                          <a:latin typeface="Calibri" panose="020F0502020204030204" pitchFamily="34" charset="0"/>
+                          <a:ea typeface="Calibri" panose="020F0502020204030204" pitchFamily="34" charset="0"/>
+                          <a:cs typeface="Times New Roman" panose="02020603050405020304" pitchFamily="18" charset="0"/>
+                        </a:rPr>
+                        <a:t>Hash the decrypted ER</a:t>
+                      </a:r>
+                    </a:p>
+                  </a:txBody>
+                  <a:tcPr marL="53848" marR="53848" marT="0" marB="0" anchor="ctr"/>
+                </a:tc>
+                <a:tc>
+                  <a:txBody>
+                    <a:bodyPr/>
+                    <a:lstStyle/>
+                    <a:p>
+                      <a:pPr marL="0" marR="0" algn="ctr">
+                        <a:lnSpc>
+                          <a:spcPct val="115000"/>
+                        </a:lnSpc>
+                        <a:spcBef>
+                          <a:spcPts val="0"/>
+                        </a:spcBef>
+                        <a:spcAft>
+                          <a:spcPts val="0"/>
+                        </a:spcAft>
+                      </a:pPr>
+                      <a:r>
+                        <a:rPr lang="en-PH" sz="900" dirty="0">
+                          <a:effectLst/>
+                          <a:latin typeface="Calibri" panose="020F0502020204030204" pitchFamily="34" charset="0"/>
+                          <a:ea typeface="Calibri" panose="020F0502020204030204" pitchFamily="34" charset="0"/>
+                          <a:cs typeface="Times New Roman" panose="02020603050405020304" pitchFamily="18" charset="0"/>
+                        </a:rPr>
+                        <a:t>Three</a:t>
                       </a:r>
                       <a:r>
                         <a:rPr lang="en-PH" sz="900" baseline="0" dirty="0">
                           <a:effectLst/>
-                        </a:rPr>
-                        <a:t> encrypted election returns</a:t>
+                          <a:latin typeface="Calibri" panose="020F0502020204030204" pitchFamily="34" charset="0"/>
+                          <a:ea typeface="Calibri" panose="020F0502020204030204" pitchFamily="34" charset="0"/>
+                          <a:cs typeface="Times New Roman" panose="02020603050405020304" pitchFamily="18" charset="0"/>
+                        </a:rPr>
+                        <a:t> hash values of the decrypted file</a:t>
                       </a:r>
                       <a:endParaRPr lang="en-PH" sz="900" dirty="0">
                         <a:effectLst/>
@@ -4355,8 +5180,20 @@
                       <a:r>
                         <a:rPr lang="en-PH" sz="900" dirty="0">
                           <a:effectLst/>
-                        </a:rPr>
-                        <a:t>VCM</a:t>
+                          <a:latin typeface="Calibri" panose="020F0502020204030204" pitchFamily="34" charset="0"/>
+                          <a:ea typeface="Calibri" panose="020F0502020204030204" pitchFamily="34" charset="0"/>
+                          <a:cs typeface="Times New Roman" panose="02020603050405020304" pitchFamily="18" charset="0"/>
+                        </a:rPr>
+                        <a:t>Server</a:t>
+                      </a:r>
+                      <a:r>
+                        <a:rPr lang="en-PH" sz="900" baseline="0" dirty="0">
+                          <a:effectLst/>
+                          <a:latin typeface="Calibri" panose="020F0502020204030204" pitchFamily="34" charset="0"/>
+                          <a:ea typeface="Calibri" panose="020F0502020204030204" pitchFamily="34" charset="0"/>
+                          <a:cs typeface="Times New Roman" panose="02020603050405020304" pitchFamily="18" charset="0"/>
+                        </a:rPr>
+                        <a:t> key</a:t>
                       </a:r>
                       <a:endParaRPr lang="en-PH" sz="900" dirty="0">
                         <a:effectLst/>
@@ -4368,6 +5205,13 @@
                   </a:txBody>
                   <a:tcPr marL="53848" marR="53848" marT="0" marB="0" anchor="ctr"/>
                 </a:tc>
+                <a:extLst>
+                  <a:ext uri="{0D108BD9-81ED-4DB2-BD59-A6C34878D82A}">
+                    <a16:rowId xmlns:a16="http://schemas.microsoft.com/office/drawing/2014/main" val="825232271"/>
+                  </a:ext>
+                </a:extLst>
+              </a:tr>
+              <a:tr h="661392">
                 <a:tc>
                   <a:txBody>
                     <a:bodyPr/>
@@ -4387,20 +5231,20 @@
                       <a:r>
                         <a:rPr lang="en-PH" sz="900" dirty="0">
                           <a:effectLst/>
-                          <a:latin typeface="+mn-lt"/>
-                          <a:ea typeface="+mn-ea"/>
-                          <a:cs typeface="+mn-cs"/>
-                        </a:rPr>
-                        <a:t>Verifies</a:t>
+                          <a:latin typeface="Calibri" panose="020F0502020204030204" pitchFamily="34" charset="0"/>
+                          <a:ea typeface="Calibri" panose="020F0502020204030204" pitchFamily="34" charset="0"/>
+                          <a:cs typeface="Times New Roman" panose="02020603050405020304" pitchFamily="18" charset="0"/>
+                        </a:rPr>
+                        <a:t>Server</a:t>
                       </a:r>
                       <a:r>
                         <a:rPr lang="en-PH" sz="900" baseline="0" dirty="0">
                           <a:effectLst/>
-                          <a:latin typeface="+mn-lt"/>
-                          <a:ea typeface="+mn-ea"/>
-                          <a:cs typeface="+mn-cs"/>
-                        </a:rPr>
-                        <a:t> hash value</a:t>
+                          <a:latin typeface="Calibri" panose="020F0502020204030204" pitchFamily="34" charset="0"/>
+                          <a:ea typeface="Calibri" panose="020F0502020204030204" pitchFamily="34" charset="0"/>
+                          <a:cs typeface="Times New Roman" panose="02020603050405020304" pitchFamily="18" charset="0"/>
+                        </a:rPr>
+                        <a:t> key checks if the generated hash values of the file and the hash values sent by the VCM are the same</a:t>
                       </a:r>
                       <a:endParaRPr lang="en-PH" sz="900" dirty="0">
                         <a:effectLst/>
@@ -4417,7 +5261,7 @@
                     <a:bodyPr/>
                     <a:lstStyle/>
                     <a:p>
-                      <a:pPr marL="0" marR="0" algn="ctr">
+                      <a:pPr marL="0" marR="0" lvl="0" indent="0" algn="ctr" defTabSz="914400" rtl="0" eaLnBrk="1" fontAlgn="auto" latinLnBrk="0" hangingPunct="1">
                         <a:lnSpc>
                           <a:spcPct val="115000"/>
                         </a:lnSpc>
@@ -4427,18 +5271,30 @@
                         <a:spcAft>
                           <a:spcPts val="0"/>
                         </a:spcAft>
+                        <a:buClrTx/>
+                        <a:buSzTx/>
+                        <a:buFontTx/>
+                        <a:buNone/>
+                        <a:tabLst/>
+                        <a:defRPr/>
                       </a:pPr>
                       <a:r>
                         <a:rPr lang="en-PH" sz="900" dirty="0">
                           <a:effectLst/>
-                        </a:rPr>
-                        <a:t>Verified hash</a:t>
+                          <a:latin typeface="Calibri" panose="020F0502020204030204" pitchFamily="34" charset="0"/>
+                          <a:ea typeface="Calibri" panose="020F0502020204030204" pitchFamily="34" charset="0"/>
+                          <a:cs typeface="Times New Roman" panose="02020603050405020304" pitchFamily="18" charset="0"/>
+                        </a:rPr>
+                        <a:t>Three</a:t>
                       </a:r>
                       <a:r>
                         <a:rPr lang="en-PH" sz="900" baseline="0" dirty="0">
                           <a:effectLst/>
-                        </a:rPr>
-                        <a:t> value</a:t>
+                          <a:latin typeface="Calibri" panose="020F0502020204030204" pitchFamily="34" charset="0"/>
+                          <a:ea typeface="Calibri" panose="020F0502020204030204" pitchFamily="34" charset="0"/>
+                          <a:cs typeface="Times New Roman" panose="02020603050405020304" pitchFamily="18" charset="0"/>
+                        </a:rPr>
+                        <a:t> hash values of the decrypted file</a:t>
                       </a:r>
                       <a:endParaRPr lang="en-PH" sz="900" dirty="0">
                         <a:effectLst/>
@@ -4447,15 +5303,8 @@
                         <a:cs typeface="Times New Roman" panose="02020603050405020304" pitchFamily="18" charset="0"/>
                       </a:endParaRPr>
                     </a:p>
-                  </a:txBody>
-                  <a:tcPr marL="53848" marR="53848" marT="0" marB="0" anchor="ctr"/>
-                </a:tc>
-                <a:tc>
-                  <a:txBody>
-                    <a:bodyPr/>
-                    <a:lstStyle/>
-                    <a:p>
-                      <a:pPr marL="0" marR="0" indent="0" algn="ctr" defTabSz="914400" rtl="0" eaLnBrk="1" fontAlgn="auto" latinLnBrk="0" hangingPunct="1">
+                    <a:p>
+                      <a:pPr marL="0" marR="0" algn="ctr">
                         <a:lnSpc>
                           <a:spcPct val="115000"/>
                         </a:lnSpc>
@@ -4465,59 +5314,7 @@
                         <a:spcAft>
                           <a:spcPts val="0"/>
                         </a:spcAft>
-                        <a:buClrTx/>
-                        <a:buSzTx/>
-                        <a:buFontTx/>
-                        <a:buNone/>
-                        <a:tabLst/>
-                        <a:defRPr/>
-                      </a:pPr>
-                      <a:r>
-                        <a:rPr lang="en-PH" sz="900" dirty="0">
-                          <a:effectLst/>
-                          <a:latin typeface="+mn-lt"/>
-                          <a:ea typeface="+mn-ea"/>
-                          <a:cs typeface="+mn-cs"/>
-                        </a:rPr>
-                        <a:t>CCS,</a:t>
-                      </a:r>
-                      <a:r>
-                        <a:rPr lang="en-PH" sz="900" baseline="0" dirty="0">
-                          <a:effectLst/>
-                          <a:latin typeface="+mn-lt"/>
-                          <a:ea typeface="+mn-ea"/>
-                          <a:cs typeface="+mn-cs"/>
-                        </a:rPr>
-                        <a:t> Central Server, </a:t>
-                      </a:r>
-                    </a:p>
-                    <a:p>
-                      <a:pPr marL="0" marR="0" indent="0" algn="ctr" defTabSz="914400" rtl="0" eaLnBrk="1" fontAlgn="auto" latinLnBrk="0" hangingPunct="1">
-                        <a:lnSpc>
-                          <a:spcPct val="115000"/>
-                        </a:lnSpc>
-                        <a:spcBef>
-                          <a:spcPts val="0"/>
-                        </a:spcBef>
-                        <a:spcAft>
-                          <a:spcPts val="0"/>
-                        </a:spcAft>
-                        <a:buClrTx/>
-                        <a:buSzTx/>
-                        <a:buFontTx/>
-                        <a:buNone/>
-                        <a:tabLst/>
-                        <a:defRPr/>
-                      </a:pPr>
-                      <a:r>
-                        <a:rPr lang="en-PH" sz="900" baseline="0" dirty="0">
-                          <a:effectLst/>
-                          <a:latin typeface="+mn-lt"/>
-                          <a:ea typeface="+mn-ea"/>
-                          <a:cs typeface="+mn-cs"/>
-                        </a:rPr>
-                        <a:t>and Transparency Server</a:t>
-                      </a:r>
+                      </a:pPr>
                       <a:endParaRPr lang="en-PH" sz="900" dirty="0">
                         <a:effectLst/>
                         <a:latin typeface="Calibri" panose="020F0502020204030204" pitchFamily="34" charset="0"/>
@@ -4525,6 +5322,13 @@
                         <a:cs typeface="Times New Roman" panose="02020603050405020304" pitchFamily="18" charset="0"/>
                       </a:endParaRPr>
                     </a:p>
+                  </a:txBody>
+                  <a:tcPr marL="53848" marR="53848" marT="0" marB="0" anchor="ctr"/>
+                </a:tc>
+                <a:tc>
+                  <a:txBody>
+                    <a:bodyPr/>
+                    <a:lstStyle/>
                     <a:p>
                       <a:pPr marL="0" marR="0" algn="ctr">
                         <a:lnSpc>
@@ -4537,6 +5341,62 @@
                           <a:spcPts val="0"/>
                         </a:spcAft>
                       </a:pPr>
+                      <a:r>
+                        <a:rPr lang="en-PH" sz="900" dirty="0" err="1">
+                          <a:effectLst/>
+                          <a:latin typeface="Calibri" panose="020F0502020204030204" pitchFamily="34" charset="0"/>
+                          <a:ea typeface="Calibri" panose="020F0502020204030204" pitchFamily="34" charset="0"/>
+                          <a:cs typeface="Times New Roman" panose="02020603050405020304" pitchFamily="18" charset="0"/>
+                        </a:rPr>
+                        <a:t>Servery</a:t>
+                      </a:r>
+                      <a:r>
+                        <a:rPr lang="en-PH" sz="900" dirty="0">
+                          <a:effectLst/>
+                          <a:latin typeface="Calibri" panose="020F0502020204030204" pitchFamily="34" charset="0"/>
+                          <a:ea typeface="Calibri" panose="020F0502020204030204" pitchFamily="34" charset="0"/>
+                          <a:cs typeface="Times New Roman" panose="02020603050405020304" pitchFamily="18" charset="0"/>
+                        </a:rPr>
+                        <a:t> Key</a:t>
+                      </a:r>
+                    </a:p>
+                  </a:txBody>
+                  <a:tcPr marL="53848" marR="53848" marT="0" marB="0" anchor="ctr"/>
+                </a:tc>
+                <a:tc>
+                  <a:txBody>
+                    <a:bodyPr/>
+                    <a:lstStyle/>
+                    <a:p>
+                      <a:pPr marL="0" marR="0" algn="ctr">
+                        <a:lnSpc>
+                          <a:spcPct val="115000"/>
+                        </a:lnSpc>
+                        <a:spcBef>
+                          <a:spcPts val="0"/>
+                        </a:spcBef>
+                        <a:spcAft>
+                          <a:spcPts val="0"/>
+                        </a:spcAft>
+                      </a:pPr>
+                      <a:r>
+                        <a:rPr lang="en-PH" sz="900" dirty="0">
+                          <a:effectLst/>
+                          <a:latin typeface="Calibri" panose="020F0502020204030204" pitchFamily="34" charset="0"/>
+                          <a:ea typeface="Calibri" panose="020F0502020204030204" pitchFamily="34" charset="0"/>
+                          <a:cs typeface="Times New Roman" panose="02020603050405020304" pitchFamily="18" charset="0"/>
+                        </a:rPr>
+                        <a:t>Server</a:t>
+                      </a:r>
+                      <a:r>
+                        <a:rPr lang="en-PH" sz="900" baseline="0" dirty="0">
+                          <a:effectLst/>
+                          <a:latin typeface="Calibri" panose="020F0502020204030204" pitchFamily="34" charset="0"/>
+                          <a:ea typeface="Calibri" panose="020F0502020204030204" pitchFamily="34" charset="0"/>
+                          <a:cs typeface="Times New Roman" panose="02020603050405020304" pitchFamily="18" charset="0"/>
+                        </a:rPr>
+                        <a:t> key checks if hash values are the same</a:t>
+                      </a:r>
                       <a:endParaRPr lang="en-PH" sz="900" dirty="0">
                         <a:effectLst/>
                         <a:latin typeface="Calibri" panose="020F0502020204030204" pitchFamily="34" charset="0"/>
@@ -4547,9 +5407,82 @@
                   </a:txBody>
                   <a:tcPr marL="53848" marR="53848" marT="0" marB="0" anchor="ctr"/>
                 </a:tc>
+                <a:tc>
+                  <a:txBody>
+                    <a:bodyPr/>
+                    <a:lstStyle/>
+                    <a:p>
+                      <a:pPr marL="0" marR="0" algn="ctr">
+                        <a:lnSpc>
+                          <a:spcPct val="115000"/>
+                        </a:lnSpc>
+                        <a:spcBef>
+                          <a:spcPts val="0"/>
+                        </a:spcBef>
+                        <a:spcAft>
+                          <a:spcPts val="0"/>
+                        </a:spcAft>
+                      </a:pPr>
+                      <a:r>
+                        <a:rPr lang="en-PH" sz="900" dirty="0">
+                          <a:effectLst/>
+                          <a:latin typeface="Calibri" panose="020F0502020204030204" pitchFamily="34" charset="0"/>
+                          <a:ea typeface="Calibri" panose="020F0502020204030204" pitchFamily="34" charset="0"/>
+                          <a:cs typeface="Times New Roman" panose="02020603050405020304" pitchFamily="18" charset="0"/>
+                        </a:rPr>
+                        <a:t>Verified</a:t>
+                      </a:r>
+                      <a:r>
+                        <a:rPr lang="en-PH" sz="900" baseline="0" dirty="0">
+                          <a:effectLst/>
+                          <a:latin typeface="Calibri" panose="020F0502020204030204" pitchFamily="34" charset="0"/>
+                          <a:ea typeface="Calibri" panose="020F0502020204030204" pitchFamily="34" charset="0"/>
+                          <a:cs typeface="Times New Roman" panose="02020603050405020304" pitchFamily="18" charset="0"/>
+                        </a:rPr>
+                        <a:t> data</a:t>
+                      </a:r>
+                      <a:endParaRPr lang="en-PH" sz="900" dirty="0">
+                        <a:effectLst/>
+                        <a:latin typeface="Calibri" panose="020F0502020204030204" pitchFamily="34" charset="0"/>
+                        <a:ea typeface="Calibri" panose="020F0502020204030204" pitchFamily="34" charset="0"/>
+                        <a:cs typeface="Times New Roman" panose="02020603050405020304" pitchFamily="18" charset="0"/>
+                      </a:endParaRPr>
+                    </a:p>
+                  </a:txBody>
+                  <a:tcPr marL="53848" marR="53848" marT="0" marB="0" anchor="ctr"/>
+                </a:tc>
+                <a:tc>
+                  <a:txBody>
+                    <a:bodyPr/>
+                    <a:lstStyle/>
+                    <a:p>
+                      <a:pPr marL="0" marR="0" algn="ctr">
+                        <a:lnSpc>
+                          <a:spcPct val="115000"/>
+                        </a:lnSpc>
+                        <a:spcBef>
+                          <a:spcPts val="0"/>
+                        </a:spcBef>
+                        <a:spcAft>
+                          <a:spcPts val="0"/>
+                        </a:spcAft>
+                      </a:pPr>
+                      <a:r>
+                        <a:rPr lang="en-PH" sz="900" dirty="0">
+                          <a:effectLst/>
+                          <a:latin typeface="Calibri" panose="020F0502020204030204" pitchFamily="34" charset="0"/>
+                          <a:ea typeface="Calibri" panose="020F0502020204030204" pitchFamily="34" charset="0"/>
+                          <a:cs typeface="Times New Roman" panose="02020603050405020304" pitchFamily="18" charset="0"/>
+                        </a:rPr>
+                        <a:t>Server Key</a:t>
+                      </a:r>
+                    </a:p>
+                  </a:txBody>
+                  <a:tcPr marL="53848" marR="53848" marT="0" marB="0" anchor="ctr"/>
+                </a:tc>
                 <a:extLst>
                   <a:ext uri="{0D108BD9-81ED-4DB2-BD59-A6C34878D82A}">
-                    <a16:rowId xmlns:a16="http://schemas.microsoft.com/office/drawing/2014/main" val="4049186922"/>
+                    <a16:rowId xmlns:a16="http://schemas.microsoft.com/office/drawing/2014/main" val="4061879627"/>
                   </a:ext>
                 </a:extLst>
               </a:tr>

</xml_diff>

<commit_message>
Edited the ff: Use case with description Deployment Diagram Composite Diagram
</commit_message>
<xml_diff>
--- a/Documentation/Research Paper/AES diagrams.pptx
+++ b/Documentation/Research Paper/AES diagrams.pptx
@@ -228,7 +228,7 @@
           <a:p>
             <a:fld id="{F7131382-AC13-41B5-A8DA-139DF5F9CB1B}" type="datetimeFigureOut">
               <a:rPr lang="en-PH" smtClean="0"/>
-              <a:t>12/5/2016</a:t>
+              <a:t>12/8/2016</a:t>
             </a:fld>
             <a:endParaRPr lang="en-PH"/>
           </a:p>
@@ -627,7 +627,7 @@
           <a:p>
             <a:fld id="{F07C20CE-7E6E-46AA-9B32-76D88BCAE5C9}" type="datetimeFigureOut">
               <a:rPr lang="en-PH" smtClean="0"/>
-              <a:t>12/5/2016</a:t>
+              <a:t>12/8/2016</a:t>
             </a:fld>
             <a:endParaRPr lang="en-PH"/>
           </a:p>
@@ -797,7 +797,7 @@
           <a:p>
             <a:fld id="{F07C20CE-7E6E-46AA-9B32-76D88BCAE5C9}" type="datetimeFigureOut">
               <a:rPr lang="en-PH" smtClean="0"/>
-              <a:t>12/5/2016</a:t>
+              <a:t>12/8/2016</a:t>
             </a:fld>
             <a:endParaRPr lang="en-PH"/>
           </a:p>
@@ -977,7 +977,7 @@
           <a:p>
             <a:fld id="{F07C20CE-7E6E-46AA-9B32-76D88BCAE5C9}" type="datetimeFigureOut">
               <a:rPr lang="en-PH" smtClean="0"/>
-              <a:t>12/5/2016</a:t>
+              <a:t>12/8/2016</a:t>
             </a:fld>
             <a:endParaRPr lang="en-PH"/>
           </a:p>
@@ -1147,7 +1147,7 @@
           <a:p>
             <a:fld id="{F07C20CE-7E6E-46AA-9B32-76D88BCAE5C9}" type="datetimeFigureOut">
               <a:rPr lang="en-PH" smtClean="0"/>
-              <a:t>12/5/2016</a:t>
+              <a:t>12/8/2016</a:t>
             </a:fld>
             <a:endParaRPr lang="en-PH"/>
           </a:p>
@@ -1393,7 +1393,7 @@
           <a:p>
             <a:fld id="{F07C20CE-7E6E-46AA-9B32-76D88BCAE5C9}" type="datetimeFigureOut">
               <a:rPr lang="en-PH" smtClean="0"/>
-              <a:t>12/5/2016</a:t>
+              <a:t>12/8/2016</a:t>
             </a:fld>
             <a:endParaRPr lang="en-PH"/>
           </a:p>
@@ -1625,7 +1625,7 @@
           <a:p>
             <a:fld id="{F07C20CE-7E6E-46AA-9B32-76D88BCAE5C9}" type="datetimeFigureOut">
               <a:rPr lang="en-PH" smtClean="0"/>
-              <a:t>12/5/2016</a:t>
+              <a:t>12/8/2016</a:t>
             </a:fld>
             <a:endParaRPr lang="en-PH"/>
           </a:p>
@@ -1992,7 +1992,7 @@
           <a:p>
             <a:fld id="{F07C20CE-7E6E-46AA-9B32-76D88BCAE5C9}" type="datetimeFigureOut">
               <a:rPr lang="en-PH" smtClean="0"/>
-              <a:t>12/5/2016</a:t>
+              <a:t>12/8/2016</a:t>
             </a:fld>
             <a:endParaRPr lang="en-PH"/>
           </a:p>
@@ -2110,7 +2110,7 @@
           <a:p>
             <a:fld id="{F07C20CE-7E6E-46AA-9B32-76D88BCAE5C9}" type="datetimeFigureOut">
               <a:rPr lang="en-PH" smtClean="0"/>
-              <a:t>12/5/2016</a:t>
+              <a:t>12/8/2016</a:t>
             </a:fld>
             <a:endParaRPr lang="en-PH"/>
           </a:p>
@@ -2205,7 +2205,7 @@
           <a:p>
             <a:fld id="{F07C20CE-7E6E-46AA-9B32-76D88BCAE5C9}" type="datetimeFigureOut">
               <a:rPr lang="en-PH" smtClean="0"/>
-              <a:t>12/5/2016</a:t>
+              <a:t>12/8/2016</a:t>
             </a:fld>
             <a:endParaRPr lang="en-PH"/>
           </a:p>
@@ -2482,7 +2482,7 @@
           <a:p>
             <a:fld id="{F07C20CE-7E6E-46AA-9B32-76D88BCAE5C9}" type="datetimeFigureOut">
               <a:rPr lang="en-PH" smtClean="0"/>
-              <a:t>12/5/2016</a:t>
+              <a:t>12/8/2016</a:t>
             </a:fld>
             <a:endParaRPr lang="en-PH"/>
           </a:p>
@@ -2735,7 +2735,7 @@
           <a:p>
             <a:fld id="{F07C20CE-7E6E-46AA-9B32-76D88BCAE5C9}" type="datetimeFigureOut">
               <a:rPr lang="en-PH" smtClean="0"/>
-              <a:t>12/5/2016</a:t>
+              <a:t>12/8/2016</a:t>
             </a:fld>
             <a:endParaRPr lang="en-PH"/>
           </a:p>
@@ -2948,7 +2948,7 @@
           <a:p>
             <a:fld id="{F07C20CE-7E6E-46AA-9B32-76D88BCAE5C9}" type="datetimeFigureOut">
               <a:rPr lang="en-PH" smtClean="0"/>
-              <a:t>12/5/2016</a:t>
+              <a:t>12/8/2016</a:t>
             </a:fld>
             <a:endParaRPr lang="en-PH"/>
           </a:p>
@@ -3390,7 +3390,7 @@
             <p:ph idx="1"/>
             <p:extLst>
               <p:ext uri="{D42A27DB-BD31-4B8C-83A1-F6EECF244321}">
-                <p14:modId xmlns:p14="http://schemas.microsoft.com/office/powerpoint/2010/main" val="2189482847"/>
+                <p14:modId xmlns:p14="http://schemas.microsoft.com/office/powerpoint/2010/main" val="2892334761"/>
               </p:ext>
             </p:extLst>
           </p:nvPr>
@@ -4973,21 +4973,6 @@
                         </a:rPr>
                         <a:t>Server</a:t>
                       </a:r>
-                      <a:r>
-                        <a:rPr lang="en-PH" sz="900" baseline="0" dirty="0">
-                          <a:effectLst/>
-                          <a:latin typeface="Calibri" panose="020F0502020204030204" pitchFamily="34" charset="0"/>
-                          <a:ea typeface="Calibri" panose="020F0502020204030204" pitchFamily="34" charset="0"/>
-                          <a:cs typeface="Times New Roman" panose="02020603050405020304" pitchFamily="18" charset="0"/>
-                        </a:rPr>
-                        <a:t> Key</a:t>
-                      </a:r>
-                      <a:endParaRPr lang="en-PH" sz="900" dirty="0">
-                        <a:effectLst/>
-                        <a:latin typeface="Calibri" panose="020F0502020204030204" pitchFamily="34" charset="0"/>
-                        <a:ea typeface="Calibri" panose="020F0502020204030204" pitchFamily="34" charset="0"/>
-                        <a:cs typeface="Times New Roman" panose="02020603050405020304" pitchFamily="18" charset="0"/>
-                      </a:endParaRPr>
                     </a:p>
                   </a:txBody>
                   <a:tcPr marL="53848" marR="53848" marT="0" marB="0" anchor="ctr"/>
@@ -5331,7 +5316,7 @@
                           <a:ea typeface="Calibri" panose="020F0502020204030204" pitchFamily="34" charset="0"/>
                           <a:cs typeface="Times New Roman" panose="02020603050405020304" pitchFamily="18" charset="0"/>
                         </a:rPr>
-                        <a:t> Key</a:t>
+                        <a:t> </a:t>
                       </a:r>
                       <a:endParaRPr lang="en-PH" sz="900" dirty="0">
                         <a:effectLst/>
@@ -5550,21 +5535,6 @@
                         </a:rPr>
                         <a:t>Server</a:t>
                       </a:r>
-                      <a:r>
-                        <a:rPr lang="en-PH" sz="900" baseline="0" dirty="0">
-                          <a:effectLst/>
-                          <a:latin typeface="Calibri" panose="020F0502020204030204" pitchFamily="34" charset="0"/>
-                          <a:ea typeface="Calibri" panose="020F0502020204030204" pitchFamily="34" charset="0"/>
-                          <a:cs typeface="Times New Roman" panose="02020603050405020304" pitchFamily="18" charset="0"/>
-                        </a:rPr>
-                        <a:t> key</a:t>
-                      </a:r>
-                      <a:endParaRPr lang="en-PH" sz="900" dirty="0">
-                        <a:effectLst/>
-                        <a:latin typeface="Calibri" panose="020F0502020204030204" pitchFamily="34" charset="0"/>
-                        <a:ea typeface="Calibri" panose="020F0502020204030204" pitchFamily="34" charset="0"/>
-                        <a:cs typeface="Times New Roman" panose="02020603050405020304" pitchFamily="18" charset="0"/>
-                      </a:endParaRPr>
                     </a:p>
                   </a:txBody>
                   <a:tcPr marL="53848" marR="53848" marT="0" marB="0" anchor="ctr"/>
@@ -5838,7 +5808,7 @@
                           <a:ea typeface="Calibri" panose="020F0502020204030204" pitchFamily="34" charset="0"/>
                           <a:cs typeface="Times New Roman" panose="02020603050405020304" pitchFamily="18" charset="0"/>
                         </a:rPr>
-                        <a:t>Server Key</a:t>
+                        <a:t>Server</a:t>
                       </a:r>
                     </a:p>
                   </a:txBody>
@@ -6384,7 +6354,7 @@
         </p:nvSpPr>
         <p:spPr>
           <a:xfrm>
-            <a:off x="459377" y="-129586"/>
+            <a:off x="402346" y="-274836"/>
             <a:ext cx="10515600" cy="1325563"/>
           </a:xfrm>
         </p:spPr>
@@ -6467,7 +6437,7 @@
         </p:nvSpPr>
         <p:spPr>
           <a:xfrm>
-            <a:off x="4733276" y="4197928"/>
+            <a:off x="4733276" y="3791528"/>
             <a:ext cx="2166425" cy="883524"/>
           </a:xfrm>
           <a:prstGeom prst="ellipse">
@@ -6529,7 +6499,7 @@
         </p:nvSpPr>
         <p:spPr>
           <a:xfrm>
-            <a:off x="1393340" y="3274932"/>
+            <a:off x="1393340" y="2868532"/>
             <a:ext cx="2349304" cy="891170"/>
           </a:xfrm>
           <a:prstGeom prst="rect">
@@ -6586,7 +6556,7 @@
         </p:nvSpPr>
         <p:spPr>
           <a:xfrm>
-            <a:off x="7797754" y="3429868"/>
+            <a:off x="7797754" y="3023468"/>
             <a:ext cx="2349304" cy="897449"/>
           </a:xfrm>
           <a:prstGeom prst="rect">
@@ -6643,7 +6613,7 @@
         </p:nvSpPr>
         <p:spPr>
           <a:xfrm>
-            <a:off x="4641836" y="2174587"/>
+            <a:off x="4641836" y="1768187"/>
             <a:ext cx="2349304" cy="859753"/>
           </a:xfrm>
           <a:prstGeom prst="rect">
@@ -6700,7 +6670,7 @@
         </p:nvSpPr>
         <p:spPr>
           <a:xfrm>
-            <a:off x="838200" y="1123406"/>
+            <a:off x="838200" y="717006"/>
             <a:ext cx="9505604" cy="5835305"/>
           </a:xfrm>
           <a:prstGeom prst="ellipse">
@@ -6753,7 +6723,7 @@
         </p:nvCxnSpPr>
         <p:spPr>
           <a:xfrm>
-            <a:off x="2230263" y="1977967"/>
+            <a:off x="2230263" y="1571567"/>
             <a:ext cx="6721478" cy="0"/>
           </a:xfrm>
           <a:prstGeom prst="line">
@@ -6792,7 +6762,7 @@
         </p:nvSpPr>
         <p:spPr>
           <a:xfrm>
-            <a:off x="4015420" y="1319683"/>
+            <a:off x="4015420" y="913283"/>
             <a:ext cx="3151163" cy="461665"/>
           </a:xfrm>
           <a:prstGeom prst="rect">
@@ -6826,7 +6796,7 @@
         </p:nvCxnSpPr>
         <p:spPr>
           <a:xfrm>
-            <a:off x="3742644" y="3720517"/>
+            <a:off x="3742644" y="3314117"/>
             <a:ext cx="1307898" cy="606800"/>
           </a:xfrm>
           <a:prstGeom prst="line">
@@ -6868,7 +6838,7 @@
         </p:nvCxnSpPr>
         <p:spPr>
           <a:xfrm>
-            <a:off x="5816488" y="3034340"/>
+            <a:off x="5816488" y="2627940"/>
             <a:ext cx="1" cy="1163588"/>
           </a:xfrm>
           <a:prstGeom prst="line">
@@ -6910,7 +6880,7 @@
         </p:nvCxnSpPr>
         <p:spPr>
           <a:xfrm flipH="1">
-            <a:off x="6582435" y="3878593"/>
+            <a:off x="6582435" y="3472193"/>
             <a:ext cx="1215319" cy="448724"/>
           </a:xfrm>
           <a:prstGeom prst="line">
@@ -6949,7 +6919,7 @@
         </p:nvSpPr>
         <p:spPr>
           <a:xfrm>
-            <a:off x="4641836" y="5841374"/>
+            <a:off x="4641836" y="5434974"/>
             <a:ext cx="2349304" cy="773136"/>
           </a:xfrm>
           <a:prstGeom prst="rect">
@@ -7006,7 +6976,7 @@
         </p:nvCxnSpPr>
         <p:spPr>
           <a:xfrm flipH="1">
-            <a:off x="5816488" y="5064354"/>
+            <a:off x="5816488" y="4657954"/>
             <a:ext cx="16579" cy="849946"/>
           </a:xfrm>
           <a:prstGeom prst="line">
@@ -9845,14 +9815,14 @@
           <p:nvPr>
             <p:extLst>
               <p:ext uri="{D42A27DB-BD31-4B8C-83A1-F6EECF244321}">
-                <p14:modId xmlns:p14="http://schemas.microsoft.com/office/powerpoint/2010/main" val="1480116952"/>
+                <p14:modId xmlns:p14="http://schemas.microsoft.com/office/powerpoint/2010/main" val="3847771693"/>
               </p:ext>
             </p:extLst>
           </p:nvPr>
         </p:nvGraphicFramePr>
         <p:xfrm>
           <a:off x="2696192" y="1876218"/>
-          <a:ext cx="5937250" cy="3983676"/>
+          <a:ext cx="5937250" cy="3007361"/>
         </p:xfrm>
         <a:graphic>
           <a:graphicData uri="http://schemas.openxmlformats.org/drawingml/2006/table">
@@ -10041,12 +10011,42 @@
                         </a:spcAft>
                       </a:pPr>
                       <a:r>
-                        <a:rPr lang="en-PH" sz="1100">
-                          <a:effectLst/>
-                        </a:rPr>
-                        <a:t>CCS, Central Server and Transparency Server sends encrypted data to VCM using the VCM’s public key</a:t>
-                      </a:r>
-                      <a:endParaRPr lang="en-PH" sz="1100">
+                        <a:rPr lang="en-PH" sz="1100" dirty="0">
+                          <a:effectLst/>
+                          <a:latin typeface="+mn-lt"/>
+                          <a:ea typeface="+mn-ea"/>
+                          <a:cs typeface="+mn-cs"/>
+                        </a:rPr>
+                        <a:t>VCM</a:t>
+                      </a:r>
+                      <a:r>
+                        <a:rPr lang="en-PH" sz="1100" baseline="0" dirty="0">
+                          <a:effectLst/>
+                          <a:latin typeface="+mn-lt"/>
+                          <a:ea typeface="+mn-ea"/>
+                          <a:cs typeface="+mn-cs"/>
+                        </a:rPr>
+                        <a:t> and Server will generate key using </a:t>
+                      </a:r>
+                      <a:r>
+                        <a:rPr lang="en-PH" sz="1100" baseline="0" dirty="0" err="1">
+                          <a:effectLst/>
+                          <a:latin typeface="+mn-lt"/>
+                          <a:ea typeface="+mn-ea"/>
+                          <a:cs typeface="+mn-cs"/>
+                        </a:rPr>
+                        <a:t>Diffie</a:t>
+                      </a:r>
+                      <a:r>
+                        <a:rPr lang="en-PH" sz="1100" baseline="0" dirty="0">
+                          <a:effectLst/>
+                          <a:latin typeface="+mn-lt"/>
+                          <a:ea typeface="+mn-ea"/>
+                          <a:cs typeface="+mn-cs"/>
+                        </a:rPr>
+                        <a:t>-Hellman Algorithm</a:t>
+                      </a:r>
+                      <a:endParaRPr lang="en-PH" sz="1100" dirty="0">
                         <a:effectLst/>
                         <a:latin typeface="Calibri" panose="020F0502020204030204" pitchFamily="34" charset="0"/>
                         <a:ea typeface="Calibri" panose="020F0502020204030204" pitchFamily="34" charset="0"/>
@@ -10191,12 +10191,24 @@
                         </a:spcAft>
                       </a:pPr>
                       <a:r>
-                        <a:rPr lang="en-PH" sz="1100">
-                          <a:effectLst/>
-                        </a:rPr>
-                        <a:t>The three main servers send a message to the VCM that is encrypted using the VCM’s public key</a:t>
-                      </a:r>
-                      <a:endParaRPr lang="en-PH" sz="1100">
+                        <a:rPr lang="en-PH" sz="1100" dirty="0">
+                          <a:effectLst/>
+                          <a:latin typeface="Calibri" panose="020F0502020204030204" pitchFamily="34" charset="0"/>
+                          <a:ea typeface="Calibri" panose="020F0502020204030204" pitchFamily="34" charset="0"/>
+                          <a:cs typeface="Times New Roman" panose="02020603050405020304" pitchFamily="18" charset="0"/>
+                        </a:rPr>
+                        <a:t>All</a:t>
+                      </a:r>
+                      <a:r>
+                        <a:rPr lang="en-PH" sz="1100" baseline="0" dirty="0">
+                          <a:effectLst/>
+                          <a:latin typeface="Calibri" panose="020F0502020204030204" pitchFamily="34" charset="0"/>
+                          <a:ea typeface="Calibri" panose="020F0502020204030204" pitchFamily="34" charset="0"/>
+                          <a:cs typeface="Times New Roman" panose="02020603050405020304" pitchFamily="18" charset="0"/>
+                        </a:rPr>
+                        <a:t> VCM public keys are collected by the servers</a:t>
+                      </a:r>
+                      <a:endParaRPr lang="en-PH" sz="1100" dirty="0">
                         <a:effectLst/>
                         <a:latin typeface="Calibri" panose="020F0502020204030204" pitchFamily="34" charset="0"/>
                         <a:ea typeface="Calibri" panose="020F0502020204030204" pitchFamily="34" charset="0"/>
@@ -10416,7 +10428,7 @@
                         </a:spcAft>
                       </a:pPr>
                       <a:r>
-                        <a:rPr lang="en-PH" sz="1100">
+                        <a:rPr lang="en-PH" sz="1100" dirty="0">
                           <a:effectLst/>
                         </a:rPr>
                         <a:t>The VCM will receive the data sent by the servers</a:t>
@@ -10432,12 +10444,12 @@
                         </a:spcAft>
                       </a:pPr>
                       <a:r>
-                        <a:rPr lang="en-PH" sz="1100">
+                        <a:rPr lang="en-PH" sz="1100" dirty="0">
                           <a:effectLst/>
                         </a:rPr>
                         <a:t>The three servers will have to send the encrypted data </a:t>
                       </a:r>
-                      <a:endParaRPr lang="en-PH" sz="1100">
+                      <a:endParaRPr lang="en-PH" sz="1100" dirty="0">
                         <a:effectLst/>
                         <a:latin typeface="Calibri" panose="020F0502020204030204" pitchFamily="34" charset="0"/>
                         <a:ea typeface="Calibri" panose="020F0502020204030204" pitchFamily="34" charset="0"/>
@@ -10582,12 +10594,24 @@
                         </a:spcAft>
                       </a:pPr>
                       <a:r>
-                        <a:rPr lang="en-PH" sz="1100">
-                          <a:effectLst/>
-                        </a:rPr>
-                        <a:t>Sent encrypted data</a:t>
-                      </a:r>
-                      <a:endParaRPr lang="en-PH" sz="1100">
+                        <a:rPr lang="en-PH" sz="1100" dirty="0">
+                          <a:effectLst/>
+                          <a:latin typeface="+mn-lt"/>
+                          <a:ea typeface="+mn-ea"/>
+                          <a:cs typeface="+mn-cs"/>
+                        </a:rPr>
+                        <a:t>Generated</a:t>
+                      </a:r>
+                      <a:r>
+                        <a:rPr lang="en-PH" sz="1100" baseline="0" dirty="0">
+                          <a:effectLst/>
+                          <a:latin typeface="+mn-lt"/>
+                          <a:ea typeface="+mn-ea"/>
+                          <a:cs typeface="+mn-cs"/>
+                        </a:rPr>
+                        <a:t> a key</a:t>
+                      </a:r>
+                      <a:endParaRPr lang="en-PH" sz="1100" dirty="0">
                         <a:effectLst/>
                         <a:latin typeface="Calibri" panose="020F0502020204030204" pitchFamily="34" charset="0"/>
                         <a:ea typeface="Calibri" panose="020F0502020204030204" pitchFamily="34" charset="0"/>
@@ -10657,7 +10681,7 @@
                         </a:spcAft>
                       </a:pPr>
                       <a:r>
-                        <a:rPr lang="en-PH" sz="1100">
+                        <a:rPr lang="en-PH" sz="1100" dirty="0">
                           <a:effectLst/>
                         </a:rPr>
                         <a:t>Actor:</a:t>
@@ -10673,10 +10697,22 @@
                         </a:spcAft>
                       </a:pPr>
                       <a:r>
-                        <a:rPr lang="en-PH" sz="1100">
-                          <a:effectLst/>
-                        </a:rPr>
-                        <a:t>1. The Comelec closes the voting period</a:t>
+                        <a:rPr lang="en-PH" sz="1100" dirty="0">
+                          <a:effectLst/>
+                        </a:rPr>
+                        <a:t>1. The </a:t>
+                      </a:r>
+                      <a:r>
+                        <a:rPr lang="en-PH" sz="1100" dirty="0" err="1">
+                          <a:effectLst/>
+                        </a:rPr>
+                        <a:t>Comelec</a:t>
+                      </a:r>
+                      <a:r>
+                        <a:rPr lang="en-PH" sz="1100" dirty="0">
+                          <a:effectLst/>
+                        </a:rPr>
+                        <a:t> closes the voting period</a:t>
                       </a:r>
                     </a:p>
                     <a:p>
@@ -10689,7 +10725,7 @@
                         </a:spcAft>
                       </a:pPr>
                       <a:r>
-                        <a:rPr lang="en-PH" sz="1100">
+                        <a:rPr lang="en-PH" sz="1100" dirty="0">
                           <a:effectLst/>
                         </a:rPr>
                         <a:t> </a:t>
@@ -10705,12 +10741,12 @@
                         </a:spcAft>
                       </a:pPr>
                       <a:r>
-                        <a:rPr lang="en-PH" sz="1100">
+                        <a:rPr lang="en-PH" sz="1100" dirty="0">
                           <a:effectLst/>
                         </a:rPr>
                         <a:t> </a:t>
                       </a:r>
-                      <a:endParaRPr lang="en-PH" sz="1100">
+                      <a:endParaRPr lang="en-PH" sz="1100" dirty="0">
                         <a:effectLst/>
                         <a:latin typeface="Calibri" panose="020F0502020204030204" pitchFamily="34" charset="0"/>
                         <a:ea typeface="Calibri" panose="020F0502020204030204" pitchFamily="34" charset="0"/>
@@ -10734,7 +10770,7 @@
                         </a:spcAft>
                       </a:pPr>
                       <a:r>
-                        <a:rPr lang="en-PH" sz="1100">
+                        <a:rPr lang="en-PH" sz="1100" dirty="0">
                           <a:effectLst/>
                         </a:rPr>
                         <a:t>System Response:</a:t>
@@ -10750,11 +10786,32 @@
                         </a:spcAft>
                       </a:pPr>
                       <a:r>
-                        <a:rPr lang="en-PH" sz="1100">
-                          <a:effectLst/>
-                        </a:rPr>
-                        <a:t>1.1 The CCS. Central Server, and the transparency server sends a message to the VCMs to initiate the vote transmissions.</a:t>
-                      </a:r>
+                        <a:rPr lang="en-PH" sz="1100" dirty="0">
+                          <a:effectLst/>
+                        </a:rPr>
+                        <a:t>1.1 The three</a:t>
+                      </a:r>
+                      <a:r>
+                        <a:rPr lang="en-PH" sz="1100" baseline="0" dirty="0">
+                          <a:effectLst/>
+                        </a:rPr>
+                        <a:t> servers(CCS, Central Server and Transparency Server) and the VCM will generate a shared key using the </a:t>
+                      </a:r>
+                      <a:r>
+                        <a:rPr lang="en-PH" sz="1100" baseline="0" dirty="0" err="1">
+                          <a:effectLst/>
+                        </a:rPr>
+                        <a:t>Diffie</a:t>
+                      </a:r>
+                      <a:r>
+                        <a:rPr lang="en-PH" sz="1100" baseline="0" dirty="0">
+                          <a:effectLst/>
+                        </a:rPr>
+                        <a:t>-Hellman</a:t>
+                      </a:r>
+                      <a:endParaRPr lang="en-PH" sz="1100" dirty="0">
+                        <a:effectLst/>
+                      </a:endParaRPr>
                     </a:p>
                     <a:p>
                       <a:pPr>
@@ -10766,60 +10823,12 @@
                         </a:spcAft>
                       </a:pPr>
                       <a:r>
-                        <a:rPr lang="en-PH" sz="1100">
+                        <a:rPr lang="en-PH" sz="1100" dirty="0">
                           <a:effectLst/>
                         </a:rPr>
                         <a:t> </a:t>
                       </a:r>
-                    </a:p>
-                    <a:p>
-                      <a:pPr>
-                        <a:lnSpc>
-                          <a:spcPct val="107000"/>
-                        </a:lnSpc>
-                        <a:spcAft>
-                          <a:spcPts val="0"/>
-                        </a:spcAft>
-                      </a:pPr>
-                      <a:r>
-                        <a:rPr lang="en-PH" sz="1100">
-                          <a:effectLst/>
-                        </a:rPr>
-                        <a:t> </a:t>
-                      </a:r>
-                    </a:p>
-                    <a:p>
-                      <a:pPr>
-                        <a:lnSpc>
-                          <a:spcPct val="107000"/>
-                        </a:lnSpc>
-                        <a:spcAft>
-                          <a:spcPts val="0"/>
-                        </a:spcAft>
-                      </a:pPr>
-                      <a:r>
-                        <a:rPr lang="en-PH" sz="1100">
-                          <a:effectLst/>
-                        </a:rPr>
-                        <a:t> </a:t>
-                      </a:r>
-                    </a:p>
-                    <a:p>
-                      <a:pPr>
-                        <a:lnSpc>
-                          <a:spcPct val="107000"/>
-                        </a:lnSpc>
-                        <a:spcAft>
-                          <a:spcPts val="0"/>
-                        </a:spcAft>
-                      </a:pPr>
-                      <a:r>
-                        <a:rPr lang="en-PH" sz="1100">
-                          <a:effectLst/>
-                        </a:rPr>
-                        <a:t> </a:t>
-                      </a:r>
-                      <a:endParaRPr lang="en-PH" sz="1100">
+                      <a:endParaRPr lang="en-PH" sz="1100" dirty="0">
                         <a:effectLst/>
                         <a:latin typeface="Calibri" panose="020F0502020204030204" pitchFamily="34" charset="0"/>
                         <a:ea typeface="Calibri" panose="020F0502020204030204" pitchFamily="34" charset="0"/>
@@ -11035,14 +11044,14 @@
           <p:nvPr>
             <p:extLst>
               <p:ext uri="{D42A27DB-BD31-4B8C-83A1-F6EECF244321}">
-                <p14:modId xmlns:p14="http://schemas.microsoft.com/office/powerpoint/2010/main" val="1030242142"/>
+                <p14:modId xmlns:p14="http://schemas.microsoft.com/office/powerpoint/2010/main" val="1949397248"/>
               </p:ext>
             </p:extLst>
           </p:nvPr>
         </p:nvGraphicFramePr>
         <p:xfrm>
-          <a:off x="3127375" y="2207417"/>
-          <a:ext cx="5937250" cy="3601152"/>
+          <a:off x="3127375" y="1861428"/>
+          <a:ext cx="5937250" cy="3055052"/>
         </p:xfrm>
         <a:graphic>
           <a:graphicData uri="http://schemas.openxmlformats.org/drawingml/2006/table">
@@ -11207,12 +11216,12 @@
                         </a:spcAft>
                       </a:pPr>
                       <a:r>
-                        <a:rPr lang="en-PH" sz="1100">
-                          <a:effectLst/>
-                        </a:rPr>
-                        <a:t>VCM decrypts the data using its private keys</a:t>
-                      </a:r>
-                      <a:endParaRPr lang="en-PH" sz="1100">
+                        <a:rPr lang="en-PH" sz="1100" dirty="0">
+                          <a:effectLst/>
+                        </a:rPr>
+                        <a:t>VCM encrypts the data using its private keys</a:t>
+                      </a:r>
+                      <a:endParaRPr lang="en-PH" sz="1100" dirty="0">
                         <a:effectLst/>
                         <a:latin typeface="Calibri" panose="020F0502020204030204" pitchFamily="34" charset="0"/>
                         <a:ea typeface="Calibri" panose="020F0502020204030204" pitchFamily="34" charset="0"/>
@@ -11282,12 +11291,18 @@
                         </a:spcAft>
                       </a:pPr>
                       <a:r>
-                        <a:rPr lang="en-PH" sz="1100">
-                          <a:effectLst/>
-                        </a:rPr>
-                        <a:t>Received encrypted data</a:t>
-                      </a:r>
-                      <a:endParaRPr lang="en-PH" sz="1100">
+                        <a:rPr lang="en-PH" sz="1100" dirty="0">
+                          <a:effectLst/>
+                        </a:rPr>
+                        <a:t>Received generated</a:t>
+                      </a:r>
+                      <a:r>
+                        <a:rPr lang="en-PH" sz="1100" baseline="0" dirty="0">
+                          <a:effectLst/>
+                        </a:rPr>
+                        <a:t> key</a:t>
+                      </a:r>
+                      <a:endParaRPr lang="en-PH" sz="1100" dirty="0">
                         <a:effectLst/>
                         <a:latin typeface="Calibri" panose="020F0502020204030204" pitchFamily="34" charset="0"/>
                         <a:ea typeface="Calibri" panose="020F0502020204030204" pitchFamily="34" charset="0"/>
@@ -11360,7 +11375,7 @@
                         <a:rPr lang="en-PH" sz="1100" dirty="0">
                           <a:effectLst/>
                         </a:rPr>
-                        <a:t>In order for the VCM to read the data sent by the servers, it has to decrypt it using its very own private key.</a:t>
+                        <a:t>In order for the VCM to send the data, it has to encrypt it using its very own private key.</a:t>
                       </a:r>
                       <a:endParaRPr lang="en-PH" sz="1100" dirty="0">
                         <a:effectLst/>
@@ -11621,12 +11636,12 @@
                         </a:spcAft>
                       </a:pPr>
                       <a:r>
-                        <a:rPr lang="en-PH" sz="1100">
-                          <a:effectLst/>
-                        </a:rPr>
-                        <a:t>The VCMs must decrypt the data using the private key assigned to it</a:t>
-                      </a:r>
-                      <a:endParaRPr lang="en-PH" sz="1100">
+                        <a:rPr lang="en-PH" sz="1100" dirty="0">
+                          <a:effectLst/>
+                        </a:rPr>
+                        <a:t>The VCMs must encrypt the data using the private key assigned to it</a:t>
+                      </a:r>
+                      <a:endParaRPr lang="en-PH" sz="1100" dirty="0">
                         <a:effectLst/>
                         <a:latin typeface="Calibri" panose="020F0502020204030204" pitchFamily="34" charset="0"/>
                         <a:ea typeface="Calibri" panose="020F0502020204030204" pitchFamily="34" charset="0"/>
@@ -11696,12 +11711,24 @@
                         </a:spcAft>
                       </a:pPr>
                       <a:r>
-                        <a:rPr lang="en-PH" sz="1100">
-                          <a:effectLst/>
-                        </a:rPr>
-                        <a:t>Sent encrypted data</a:t>
-                      </a:r>
-                      <a:endParaRPr lang="en-PH" sz="1100">
+                        <a:rPr lang="en-PH" sz="1100" dirty="0">
+                          <a:effectLst/>
+                          <a:latin typeface="Calibri" panose="020F0502020204030204" pitchFamily="34" charset="0"/>
+                          <a:ea typeface="Calibri" panose="020F0502020204030204" pitchFamily="34" charset="0"/>
+                          <a:cs typeface="Times New Roman" panose="02020603050405020304" pitchFamily="18" charset="0"/>
+                        </a:rPr>
+                        <a:t>Collects</a:t>
+                      </a:r>
+                      <a:r>
+                        <a:rPr lang="en-PH" sz="1100" baseline="0" dirty="0">
+                          <a:effectLst/>
+                          <a:latin typeface="Calibri" panose="020F0502020204030204" pitchFamily="34" charset="0"/>
+                          <a:ea typeface="Calibri" panose="020F0502020204030204" pitchFamily="34" charset="0"/>
+                          <a:cs typeface="Times New Roman" panose="02020603050405020304" pitchFamily="18" charset="0"/>
+                        </a:rPr>
+                        <a:t> all ERs</a:t>
+                      </a:r>
+                      <a:endParaRPr lang="en-PH" sz="1100" dirty="0">
                         <a:effectLst/>
                         <a:latin typeface="Calibri" panose="020F0502020204030204" pitchFamily="34" charset="0"/>
                         <a:ea typeface="Calibri" panose="020F0502020204030204" pitchFamily="34" charset="0"/>
@@ -11771,12 +11798,12 @@
                         </a:spcAft>
                       </a:pPr>
                       <a:r>
-                        <a:rPr lang="en-PH" sz="1100">
-                          <a:effectLst/>
-                        </a:rPr>
-                        <a:t>Decrypted the data</a:t>
-                      </a:r>
-                      <a:endParaRPr lang="en-PH" sz="1100">
+                        <a:rPr lang="en-PH" sz="1100" dirty="0">
+                          <a:effectLst/>
+                        </a:rPr>
+                        <a:t>Encrypted the data</a:t>
+                      </a:r>
+                      <a:endParaRPr lang="en-PH" sz="1100" dirty="0">
                         <a:effectLst/>
                         <a:latin typeface="Calibri" panose="020F0502020204030204" pitchFamily="34" charset="0"/>
                         <a:ea typeface="Calibri" panose="020F0502020204030204" pitchFamily="34" charset="0"/>
@@ -11846,7 +11873,7 @@
                         </a:spcAft>
                       </a:pPr>
                       <a:r>
-                        <a:rPr lang="en-PH" sz="1100">
+                        <a:rPr lang="en-PH" sz="1100" dirty="0">
                           <a:effectLst/>
                         </a:rPr>
                         <a:t>Actor:</a:t>
@@ -11862,28 +11889,24 @@
                         </a:spcAft>
                       </a:pPr>
                       <a:r>
-                        <a:rPr lang="en-PH" sz="1100">
-                          <a:effectLst/>
-                        </a:rPr>
-                        <a:t>1. Poll watchers ensure that no one will intervene the transmission process.</a:t>
-                      </a:r>
-                    </a:p>
-                    <a:p>
-                      <a:pPr>
-                        <a:lnSpc>
-                          <a:spcPct val="107000"/>
-                        </a:lnSpc>
-                        <a:spcAft>
-                          <a:spcPts val="0"/>
-                        </a:spcAft>
-                      </a:pPr>
-                      <a:r>
-                        <a:rPr lang="en-PH" sz="1100">
+                        <a:rPr lang="en-PH" sz="1100" dirty="0">
+                          <a:effectLst/>
+                        </a:rPr>
+                        <a:t>1. The</a:t>
+                      </a:r>
+                      <a:r>
+                        <a:rPr lang="en-PH" sz="1100" baseline="0" dirty="0">
+                          <a:effectLst/>
+                        </a:rPr>
+                        <a:t> VCM will ensure the encryption of election return using its private key</a:t>
+                      </a:r>
+                      <a:r>
+                        <a:rPr lang="en-PH" sz="1100" dirty="0">
                           <a:effectLst/>
                         </a:rPr>
                         <a:t> </a:t>
                       </a:r>
-                      <a:endParaRPr lang="en-PH" sz="1100">
+                      <a:endParaRPr lang="en-PH" sz="1100" dirty="0">
                         <a:effectLst/>
                         <a:latin typeface="Calibri" panose="020F0502020204030204" pitchFamily="34" charset="0"/>
                         <a:ea typeface="Calibri" panose="020F0502020204030204" pitchFamily="34" charset="0"/>
@@ -11907,7 +11930,7 @@
                         </a:spcAft>
                       </a:pPr>
                       <a:r>
-                        <a:rPr lang="en-PH" sz="1100">
+                        <a:rPr lang="en-PH" sz="1100" dirty="0">
                           <a:effectLst/>
                         </a:rPr>
                         <a:t>System Response:</a:t>
@@ -11923,10 +11946,22 @@
                         </a:spcAft>
                       </a:pPr>
                       <a:r>
-                        <a:rPr lang="en-PH" sz="1100">
-                          <a:effectLst/>
-                        </a:rPr>
-                        <a:t>1.1 The System will decrypt the data that was encrypted and interpret it into a language that is understandable.</a:t>
+                        <a:rPr lang="en-PH" sz="1100" dirty="0">
+                          <a:effectLst/>
+                        </a:rPr>
+                        <a:t>1.1 The System will</a:t>
+                      </a:r>
+                      <a:r>
+                        <a:rPr lang="en-PH" sz="1100" baseline="0" dirty="0">
+                          <a:effectLst/>
+                        </a:rPr>
+                        <a:t> encrypt the data.  </a:t>
+                      </a:r>
+                      <a:r>
+                        <a:rPr lang="en-PH" sz="1100" dirty="0">
+                          <a:effectLst/>
+                        </a:rPr>
+                        <a:t> </a:t>
                       </a:r>
                     </a:p>
                     <a:p>
@@ -11939,7 +11974,7 @@
                         </a:spcAft>
                       </a:pPr>
                       <a:r>
-                        <a:rPr lang="en-PH" sz="1100">
+                        <a:rPr lang="en-PH" sz="1100" dirty="0">
                           <a:effectLst/>
                         </a:rPr>
                         <a:t> </a:t>
@@ -11955,7 +11990,7 @@
                         </a:spcAft>
                       </a:pPr>
                       <a:r>
-                        <a:rPr lang="en-PH" sz="1100">
+                        <a:rPr lang="en-PH" sz="1100" dirty="0">
                           <a:effectLst/>
                         </a:rPr>
                         <a:t> </a:t>
@@ -11971,28 +12006,12 @@
                         </a:spcAft>
                       </a:pPr>
                       <a:r>
-                        <a:rPr lang="en-PH" sz="1100">
+                        <a:rPr lang="en-PH" sz="1100" dirty="0">
                           <a:effectLst/>
                         </a:rPr>
                         <a:t> </a:t>
                       </a:r>
-                    </a:p>
-                    <a:p>
-                      <a:pPr>
-                        <a:lnSpc>
-                          <a:spcPct val="107000"/>
-                        </a:lnSpc>
-                        <a:spcAft>
-                          <a:spcPts val="0"/>
-                        </a:spcAft>
-                      </a:pPr>
-                      <a:r>
-                        <a:rPr lang="en-PH" sz="1100">
-                          <a:effectLst/>
-                        </a:rPr>
-                        <a:t> </a:t>
-                      </a:r>
-                      <a:endParaRPr lang="en-PH" sz="1100">
+                      <a:endParaRPr lang="en-PH" sz="1100" dirty="0">
                         <a:effectLst/>
                         <a:latin typeface="Calibri" panose="020F0502020204030204" pitchFamily="34" charset="0"/>
                         <a:ea typeface="Calibri" panose="020F0502020204030204" pitchFamily="34" charset="0"/>
@@ -12224,14 +12243,14 @@
           <p:nvPr>
             <p:extLst>
               <p:ext uri="{D42A27DB-BD31-4B8C-83A1-F6EECF244321}">
-                <p14:modId xmlns:p14="http://schemas.microsoft.com/office/powerpoint/2010/main" val="3030000667"/>
+                <p14:modId xmlns:p14="http://schemas.microsoft.com/office/powerpoint/2010/main" val="295544669"/>
               </p:ext>
             </p:extLst>
           </p:nvPr>
         </p:nvGraphicFramePr>
         <p:xfrm>
           <a:off x="3429007" y="1745284"/>
-          <a:ext cx="5333986" cy="4565904"/>
+          <a:ext cx="5333986" cy="4069461"/>
         </p:xfrm>
         <a:graphic>
           <a:graphicData uri="http://schemas.openxmlformats.org/drawingml/2006/table">
@@ -12405,7 +12424,19 @@
                         <a:rPr lang="en-PH" sz="1000" dirty="0">
                           <a:effectLst/>
                         </a:rPr>
-                        <a:t>VCM &amp; 3 Servers create key exchange using the </a:t>
+                        <a:t>VCM </a:t>
+                      </a:r>
+                      <a:r>
+                        <a:rPr lang="en-PH" sz="1000" baseline="0" dirty="0">
+                          <a:effectLst/>
+                        </a:rPr>
+                        <a:t> hash the ER using </a:t>
+                      </a:r>
+                      <a:r>
+                        <a:rPr lang="en-PH" sz="1000" dirty="0">
+                          <a:effectLst/>
+                        </a:rPr>
+                        <a:t>the </a:t>
                       </a:r>
                       <a:r>
                         <a:rPr lang="en-PH" sz="1000" dirty="0" err="1">
@@ -12492,7 +12523,7 @@
                         <a:rPr lang="en-PH" sz="1000" dirty="0">
                           <a:effectLst/>
                         </a:rPr>
-                        <a:t>Successfully decrypted data</a:t>
+                        <a:t>Successfully encrypted data</a:t>
                       </a:r>
                       <a:endParaRPr lang="en-PH" sz="1000" dirty="0">
                         <a:effectLst/>
@@ -12564,12 +12595,18 @@
                         </a:spcAft>
                       </a:pPr>
                       <a:r>
-                        <a:rPr lang="en-PH" sz="1000">
-                          <a:effectLst/>
-                        </a:rPr>
-                        <a:t>A security algorithm is used by the VCM and servers in order to generate their own key.</a:t>
-                      </a:r>
-                      <a:endParaRPr lang="en-PH" sz="1000">
+                        <a:rPr lang="en-PH" sz="1000" dirty="0">
+                          <a:effectLst/>
+                        </a:rPr>
+                        <a:t>A security algorithm is used by the VCM in order to hash</a:t>
+                      </a:r>
+                      <a:r>
+                        <a:rPr lang="en-PH" sz="1000" baseline="0" dirty="0">
+                          <a:effectLst/>
+                        </a:rPr>
+                        <a:t> the three hash values of the ER</a:t>
+                      </a:r>
+                      <a:endParaRPr lang="en-PH" sz="1000" dirty="0">
                         <a:effectLst/>
                         <a:latin typeface="Calibri" panose="020F0502020204030204" pitchFamily="34" charset="0"/>
                         <a:ea typeface="Calibri" panose="020F0502020204030204" pitchFamily="34" charset="0"/>
@@ -12871,12 +12908,18 @@
                         </a:spcAft>
                       </a:pPr>
                       <a:r>
-                        <a:rPr lang="en-PH" sz="1000">
-                          <a:effectLst/>
-                        </a:rPr>
-                        <a:t>The VCM and servers must create a key</a:t>
-                      </a:r>
-                      <a:endParaRPr lang="en-PH" sz="1000">
+                        <a:rPr lang="en-PH" sz="1000" dirty="0">
+                          <a:effectLst/>
+                        </a:rPr>
+                        <a:t>The VCM</a:t>
+                      </a:r>
+                      <a:r>
+                        <a:rPr lang="en-PH" sz="1000" baseline="0" dirty="0">
+                          <a:effectLst/>
+                        </a:rPr>
+                        <a:t> must be able to hash the ER </a:t>
+                      </a:r>
+                      <a:endParaRPr lang="en-PH" sz="1000" dirty="0">
                         <a:effectLst/>
                         <a:latin typeface="Calibri" panose="020F0502020204030204" pitchFamily="34" charset="0"/>
                         <a:ea typeface="Calibri" panose="020F0502020204030204" pitchFamily="34" charset="0"/>
@@ -12946,12 +12989,12 @@
                         </a:spcAft>
                       </a:pPr>
                       <a:r>
-                        <a:rPr lang="en-PH" sz="1000">
-                          <a:effectLst/>
-                        </a:rPr>
-                        <a:t>Decrypted the data</a:t>
-                      </a:r>
-                      <a:endParaRPr lang="en-PH" sz="1000">
+                        <a:rPr lang="en-PH" sz="1000" dirty="0">
+                          <a:effectLst/>
+                        </a:rPr>
+                        <a:t>Encrypted ER</a:t>
+                      </a:r>
+                      <a:endParaRPr lang="en-PH" sz="1000" dirty="0">
                         <a:effectLst/>
                         <a:latin typeface="Calibri" panose="020F0502020204030204" pitchFamily="34" charset="0"/>
                         <a:ea typeface="Calibri" panose="020F0502020204030204" pitchFamily="34" charset="0"/>
@@ -13021,10 +13064,68 @@
                         </a:spcAft>
                       </a:pPr>
                       <a:r>
+                        <a:rPr lang="en-PH" sz="1000" dirty="0">
+                          <a:effectLst/>
+                          <a:latin typeface="+mn-lt"/>
+                          <a:ea typeface="+mn-ea"/>
+                          <a:cs typeface="+mn-cs"/>
+                        </a:rPr>
+                        <a:t>Hashed</a:t>
+                      </a:r>
+                      <a:r>
+                        <a:rPr lang="en-PH" sz="1000" baseline="0" dirty="0">
+                          <a:effectLst/>
+                          <a:latin typeface="+mn-lt"/>
+                          <a:ea typeface="+mn-ea"/>
+                          <a:cs typeface="+mn-cs"/>
+                        </a:rPr>
+                        <a:t> ER</a:t>
+                      </a:r>
+                      <a:endParaRPr lang="en-PH" sz="1000" dirty="0">
+                        <a:effectLst/>
+                        <a:latin typeface="Calibri" panose="020F0502020204030204" pitchFamily="34" charset="0"/>
+                        <a:ea typeface="Calibri" panose="020F0502020204030204" pitchFamily="34" charset="0"/>
+                        <a:cs typeface="Times New Roman" panose="02020603050405020304" pitchFamily="18" charset="0"/>
+                      </a:endParaRPr>
+                    </a:p>
+                  </a:txBody>
+                  <a:tcPr marL="61612" marR="61612" marT="0" marB="0"/>
+                </a:tc>
+                <a:tc hMerge="1">
+                  <a:txBody>
+                    <a:bodyPr/>
+                    <a:lstStyle/>
+                    <a:p>
+                      <a:endParaRPr lang="en-PH"/>
+                    </a:p>
+                  </a:txBody>
+                  <a:tcPr/>
+                </a:tc>
+                <a:extLst>
+                  <a:ext uri="{0D108BD9-81ED-4DB2-BD59-A6C34878D82A}">
+                    <a16:rowId xmlns:a16="http://schemas.microsoft.com/office/drawing/2014/main" val="1403422523"/>
+                  </a:ext>
+                </a:extLst>
+              </a:tr>
+              <a:tr h="892291">
+                <a:tc>
+                  <a:txBody>
+                    <a:bodyPr/>
+                    <a:lstStyle/>
+                    <a:p>
+                      <a:pPr>
+                        <a:lnSpc>
+                          <a:spcPct val="107000"/>
+                        </a:lnSpc>
+                        <a:spcAft>
+                          <a:spcPts val="0"/>
+                        </a:spcAft>
+                      </a:pPr>
+                      <a:r>
                         <a:rPr lang="en-PH" sz="1000">
                           <a:effectLst/>
                         </a:rPr>
-                        <a:t>Generated Key</a:t>
+                        <a:t>Basic Flow:</a:t>
                       </a:r>
                       <a:endParaRPr lang="en-PH" sz="1000">
                         <a:effectLst/>
@@ -13036,23 +13137,6 @@
                   </a:txBody>
                   <a:tcPr marL="61612" marR="61612" marT="0" marB="0"/>
                 </a:tc>
-                <a:tc hMerge="1">
-                  <a:txBody>
-                    <a:bodyPr/>
-                    <a:lstStyle/>
-                    <a:p>
-                      <a:endParaRPr lang="en-PH"/>
-                    </a:p>
-                  </a:txBody>
-                  <a:tcPr/>
-                </a:tc>
-                <a:extLst>
-                  <a:ext uri="{0D108BD9-81ED-4DB2-BD59-A6C34878D82A}">
-                    <a16:rowId xmlns:a16="http://schemas.microsoft.com/office/drawing/2014/main" val="1403422523"/>
-                  </a:ext>
-                </a:extLst>
-              </a:tr>
-              <a:tr h="2417408">
                 <a:tc>
                   <a:txBody>
                     <a:bodyPr/>
@@ -13067,16 +13151,35 @@
                         </a:spcAft>
                       </a:pPr>
                       <a:r>
-                        <a:rPr lang="en-PH" sz="1000">
-                          <a:effectLst/>
-                        </a:rPr>
-                        <a:t>Basic Flow:</a:t>
-                      </a:r>
-                      <a:endParaRPr lang="en-PH" sz="1000">
+                        <a:rPr lang="en-PH" sz="1000" dirty="0">
+                          <a:effectLst/>
+                        </a:rPr>
+                        <a:t>Actor:</a:t>
+                      </a:r>
+                    </a:p>
+                    <a:p>
+                      <a:pPr>
+                        <a:lnSpc>
+                          <a:spcPct val="107000"/>
+                        </a:lnSpc>
+                        <a:spcAft>
+                          <a:spcPts val="0"/>
+                        </a:spcAft>
+                      </a:pPr>
+                      <a:r>
+                        <a:rPr lang="en-PH" sz="1000" dirty="0">
+                          <a:effectLst/>
+                        </a:rPr>
+                        <a:t>1.</a:t>
+                      </a:r>
+                      <a:r>
+                        <a:rPr lang="en-PH" sz="1000" baseline="0" dirty="0">
+                          <a:effectLst/>
+                        </a:rPr>
+                        <a:t> To further protect the election return, VCM will use three hash functions</a:t>
+                      </a:r>
+                      <a:endParaRPr lang="en-PH" sz="1000" dirty="0">
                         <a:effectLst/>
-                        <a:latin typeface="Calibri" panose="020F0502020204030204" pitchFamily="34" charset="0"/>
-                        <a:ea typeface="Calibri" panose="020F0502020204030204" pitchFamily="34" charset="0"/>
-                        <a:cs typeface="Times New Roman" panose="02020603050405020304" pitchFamily="18" charset="0"/>
                       </a:endParaRPr>
                     </a:p>
                   </a:txBody>
@@ -13096,10 +13199,10 @@
                         </a:spcAft>
                       </a:pPr>
                       <a:r>
-                        <a:rPr lang="en-PH" sz="1000">
-                          <a:effectLst/>
-                        </a:rPr>
-                        <a:t>Actor:</a:t>
+                        <a:rPr lang="en-PH" sz="1000" dirty="0">
+                          <a:effectLst/>
+                        </a:rPr>
+                        <a:t>System Response:</a:t>
                       </a:r>
                     </a:p>
                     <a:p>
@@ -13112,10 +13215,22 @@
                         </a:spcAft>
                       </a:pPr>
                       <a:r>
-                        <a:rPr lang="en-PH" sz="1000">
-                          <a:effectLst/>
-                        </a:rPr>
-                        <a:t>1. Poll watchers ensure that no one will intervene the transmission process.</a:t>
+                        <a:rPr lang="en-PH" sz="1000" dirty="0">
+                          <a:effectLst/>
+                        </a:rPr>
+                        <a:t>1.1 VCM will</a:t>
+                      </a:r>
+                      <a:r>
+                        <a:rPr lang="en-PH" sz="1000" baseline="0" dirty="0">
+                          <a:effectLst/>
+                        </a:rPr>
+                        <a:t> hash the election returns to be able to get its hash values.</a:t>
+                      </a:r>
+                      <a:r>
+                        <a:rPr lang="en-PH" sz="1000" dirty="0">
+                          <a:effectLst/>
+                        </a:rPr>
+                        <a:t> </a:t>
                       </a:r>
                     </a:p>
                     <a:p>
@@ -13128,25 +13243,12 @@
                         </a:spcAft>
                       </a:pPr>
                       <a:r>
-                        <a:rPr lang="en-PH" sz="1000">
+                        <a:rPr lang="en-PH" sz="1000" dirty="0">
                           <a:effectLst/>
                         </a:rPr>
                         <a:t> </a:t>
                       </a:r>
-                      <a:endParaRPr lang="en-PH" sz="1000">
-                        <a:effectLst/>
-                        <a:latin typeface="Calibri" panose="020F0502020204030204" pitchFamily="34" charset="0"/>
-                        <a:ea typeface="Calibri" panose="020F0502020204030204" pitchFamily="34" charset="0"/>
-                        <a:cs typeface="Times New Roman" panose="02020603050405020304" pitchFamily="18" charset="0"/>
-                      </a:endParaRPr>
-                    </a:p>
-                  </a:txBody>
-                  <a:tcPr marL="61612" marR="61612" marT="0" marB="0"/>
-                </a:tc>
-                <a:tc>
-                  <a:txBody>
-                    <a:bodyPr/>
-                    <a:lstStyle/>
+                    </a:p>
                     <a:p>
                       <a:pPr>
                         <a:lnSpc>
@@ -13157,10 +13259,10 @@
                         </a:spcAft>
                       </a:pPr>
                       <a:r>
-                        <a:rPr lang="en-PH" sz="1000">
-                          <a:effectLst/>
-                        </a:rPr>
-                        <a:t>System Response:</a:t>
+                        <a:rPr lang="en-PH" sz="1000" dirty="0">
+                          <a:effectLst/>
+                        </a:rPr>
+                        <a:t> </a:t>
                       </a:r>
                     </a:p>
                     <a:p>
@@ -13173,10 +13275,10 @@
                         </a:spcAft>
                       </a:pPr>
                       <a:r>
-                        <a:rPr lang="en-PH" sz="1000">
-                          <a:effectLst/>
-                        </a:rPr>
-                        <a:t>1.1 VCM and secret servers will communicate with each other</a:t>
+                        <a:rPr lang="en-PH" sz="1000" dirty="0">
+                          <a:effectLst/>
+                        </a:rPr>
+                        <a:t> </a:t>
                       </a:r>
                     </a:p>
                     <a:p>
@@ -13189,10 +13291,10 @@
                         </a:spcAft>
                       </a:pPr>
                       <a:r>
-                        <a:rPr lang="en-PH" sz="1000">
-                          <a:effectLst/>
-                        </a:rPr>
-                        <a:t>1.2 They will be able to generate a key exchange.</a:t>
+                        <a:rPr lang="en-PH" sz="1000" dirty="0">
+                          <a:effectLst/>
+                        </a:rPr>
+                        <a:t> </a:t>
                       </a:r>
                     </a:p>
                     <a:p>
@@ -13205,7 +13307,7 @@
                         </a:spcAft>
                       </a:pPr>
                       <a:r>
-                        <a:rPr lang="en-PH" sz="1000">
+                        <a:rPr lang="en-PH" sz="1000" dirty="0">
                           <a:effectLst/>
                         </a:rPr>
                         <a:t> </a:t>
@@ -13221,7 +13323,7 @@
                         </a:spcAft>
                       </a:pPr>
                       <a:r>
-                        <a:rPr lang="en-PH" sz="1000">
+                        <a:rPr lang="en-PH" sz="1000" dirty="0">
                           <a:effectLst/>
                         </a:rPr>
                         <a:t> </a:t>
@@ -13237,7 +13339,7 @@
                         </a:spcAft>
                       </a:pPr>
                       <a:r>
-                        <a:rPr lang="en-PH" sz="1000">
+                        <a:rPr lang="en-PH" sz="1000" dirty="0">
                           <a:effectLst/>
                         </a:rPr>
                         <a:t> </a:t>
@@ -13253,7 +13355,7 @@
                         </a:spcAft>
                       </a:pPr>
                       <a:r>
-                        <a:rPr lang="en-PH" sz="1000">
+                        <a:rPr lang="en-PH" sz="1000" dirty="0">
                           <a:effectLst/>
                         </a:rPr>
                         <a:t> </a:t>
@@ -13269,92 +13371,12 @@
                         </a:spcAft>
                       </a:pPr>
                       <a:r>
-                        <a:rPr lang="en-PH" sz="1000">
+                        <a:rPr lang="en-PH" sz="1000" dirty="0">
                           <a:effectLst/>
                         </a:rPr>
                         <a:t> </a:t>
                       </a:r>
-                    </a:p>
-                    <a:p>
-                      <a:pPr>
-                        <a:lnSpc>
-                          <a:spcPct val="107000"/>
-                        </a:lnSpc>
-                        <a:spcAft>
-                          <a:spcPts val="0"/>
-                        </a:spcAft>
-                      </a:pPr>
-                      <a:r>
-                        <a:rPr lang="en-PH" sz="1000">
-                          <a:effectLst/>
-                        </a:rPr>
-                        <a:t> </a:t>
-                      </a:r>
-                    </a:p>
-                    <a:p>
-                      <a:pPr>
-                        <a:lnSpc>
-                          <a:spcPct val="107000"/>
-                        </a:lnSpc>
-                        <a:spcAft>
-                          <a:spcPts val="0"/>
-                        </a:spcAft>
-                      </a:pPr>
-                      <a:r>
-                        <a:rPr lang="en-PH" sz="1000">
-                          <a:effectLst/>
-                        </a:rPr>
-                        <a:t> </a:t>
-                      </a:r>
-                    </a:p>
-                    <a:p>
-                      <a:pPr>
-                        <a:lnSpc>
-                          <a:spcPct val="107000"/>
-                        </a:lnSpc>
-                        <a:spcAft>
-                          <a:spcPts val="0"/>
-                        </a:spcAft>
-                      </a:pPr>
-                      <a:r>
-                        <a:rPr lang="en-PH" sz="1000">
-                          <a:effectLst/>
-                        </a:rPr>
-                        <a:t> </a:t>
-                      </a:r>
-                    </a:p>
-                    <a:p>
-                      <a:pPr>
-                        <a:lnSpc>
-                          <a:spcPct val="107000"/>
-                        </a:lnSpc>
-                        <a:spcAft>
-                          <a:spcPts val="0"/>
-                        </a:spcAft>
-                      </a:pPr>
-                      <a:r>
-                        <a:rPr lang="en-PH" sz="1000">
-                          <a:effectLst/>
-                        </a:rPr>
-                        <a:t> </a:t>
-                      </a:r>
-                    </a:p>
-                    <a:p>
-                      <a:pPr>
-                        <a:lnSpc>
-                          <a:spcPct val="107000"/>
-                        </a:lnSpc>
-                        <a:spcAft>
-                          <a:spcPts val="0"/>
-                        </a:spcAft>
-                      </a:pPr>
-                      <a:r>
-                        <a:rPr lang="en-PH" sz="1000">
-                          <a:effectLst/>
-                        </a:rPr>
-                        <a:t> </a:t>
-                      </a:r>
-                      <a:endParaRPr lang="en-PH" sz="1000">
+                      <a:endParaRPr lang="en-PH" sz="1000" dirty="0">
                         <a:effectLst/>
                         <a:latin typeface="Calibri" panose="020F0502020204030204" pitchFamily="34" charset="0"/>
                         <a:ea typeface="Calibri" panose="020F0502020204030204" pitchFamily="34" charset="0"/>
@@ -13586,14 +13608,14 @@
           <p:nvPr>
             <p:extLst>
               <p:ext uri="{D42A27DB-BD31-4B8C-83A1-F6EECF244321}">
-                <p14:modId xmlns:p14="http://schemas.microsoft.com/office/powerpoint/2010/main" val="3340475039"/>
+                <p14:modId xmlns:p14="http://schemas.microsoft.com/office/powerpoint/2010/main" val="3137404061"/>
               </p:ext>
             </p:extLst>
           </p:nvPr>
         </p:nvGraphicFramePr>
         <p:xfrm>
           <a:off x="3127375" y="2435554"/>
-          <a:ext cx="5937250" cy="3408367"/>
+          <a:ext cx="5937250" cy="4289429"/>
         </p:xfrm>
         <a:graphic>
           <a:graphicData uri="http://schemas.openxmlformats.org/drawingml/2006/table">
@@ -13764,12 +13786,30 @@
                         </a:spcAft>
                       </a:pPr>
                       <a:r>
-                        <a:rPr lang="en-PH" sz="1100">
-                          <a:effectLst/>
-                        </a:rPr>
-                        <a:t>VCM sends encrypted election returns using the generated key</a:t>
-                      </a:r>
-                      <a:endParaRPr lang="en-PH" sz="1100">
+                        <a:rPr lang="en-PH" sz="1100" dirty="0">
+                          <a:effectLst/>
+                        </a:rPr>
+                        <a:t>VCM encrypts</a:t>
+                      </a:r>
+                      <a:r>
+                        <a:rPr lang="en-PH" sz="1100" baseline="0" dirty="0">
+                          <a:effectLst/>
+                        </a:rPr>
+                        <a:t> </a:t>
+                      </a:r>
+                      <a:r>
+                        <a:rPr lang="en-PH" sz="1100" dirty="0">
+                          <a:effectLst/>
+                        </a:rPr>
+                        <a:t>encrypted election returns</a:t>
+                      </a:r>
+                      <a:r>
+                        <a:rPr lang="en-PH" sz="1100" baseline="0" dirty="0">
+                          <a:effectLst/>
+                        </a:rPr>
+                        <a:t> and hash values in a single encrypted file</a:t>
+                      </a:r>
+                      <a:endParaRPr lang="en-PH" sz="1100" dirty="0">
                         <a:effectLst/>
                         <a:latin typeface="Calibri" panose="020F0502020204030204" pitchFamily="34" charset="0"/>
                         <a:ea typeface="Calibri" panose="020F0502020204030204" pitchFamily="34" charset="0"/>
@@ -13839,12 +13879,24 @@
                         </a:spcAft>
                       </a:pPr>
                       <a:r>
-                        <a:rPr lang="en-PH" sz="1100">
-                          <a:effectLst/>
-                        </a:rPr>
-                        <a:t>Generated Key</a:t>
-                      </a:r>
-                      <a:endParaRPr lang="en-PH" sz="1100">
+                        <a:rPr lang="en-PH" sz="1100" dirty="0">
+                          <a:effectLst/>
+                          <a:latin typeface="Calibri" panose="020F0502020204030204" pitchFamily="34" charset="0"/>
+                          <a:ea typeface="Calibri" panose="020F0502020204030204" pitchFamily="34" charset="0"/>
+                          <a:cs typeface="Times New Roman" panose="02020603050405020304" pitchFamily="18" charset="0"/>
+                        </a:rPr>
+                        <a:t>Encrypted</a:t>
+                      </a:r>
+                      <a:r>
+                        <a:rPr lang="en-PH" sz="1100" baseline="0" dirty="0">
+                          <a:effectLst/>
+                          <a:latin typeface="Calibri" panose="020F0502020204030204" pitchFamily="34" charset="0"/>
+                          <a:ea typeface="Calibri" panose="020F0502020204030204" pitchFamily="34" charset="0"/>
+                          <a:cs typeface="Times New Roman" panose="02020603050405020304" pitchFamily="18" charset="0"/>
+                        </a:rPr>
+                        <a:t> ER and its hash values</a:t>
+                      </a:r>
+                      <a:endParaRPr lang="en-PH" sz="1100" dirty="0">
                         <a:effectLst/>
                         <a:latin typeface="Calibri" panose="020F0502020204030204" pitchFamily="34" charset="0"/>
                         <a:ea typeface="Calibri" panose="020F0502020204030204" pitchFamily="34" charset="0"/>
@@ -13914,12 +13966,18 @@
                         </a:spcAft>
                       </a:pPr>
                       <a:r>
-                        <a:rPr lang="en-PH" sz="1100">
-                          <a:effectLst/>
-                        </a:rPr>
-                        <a:t>After the key exchange, the VCM will transmit the ERs that were encrypted using the generated key.</a:t>
-                      </a:r>
-                      <a:endParaRPr lang="en-PH" sz="1100">
+                        <a:rPr lang="en-PH" sz="1100" dirty="0">
+                          <a:effectLst/>
+                        </a:rPr>
+                        <a:t>After the</a:t>
+                      </a:r>
+                      <a:r>
+                        <a:rPr lang="en-PH" sz="1100" baseline="0" dirty="0">
+                          <a:effectLst/>
+                        </a:rPr>
+                        <a:t> VCM hash the ER’s hash value, the VCM will encrypt the encrypted ER and its hash values together</a:t>
+                      </a:r>
+                      <a:endParaRPr lang="en-PH" sz="1100" dirty="0">
                         <a:effectLst/>
                         <a:latin typeface="Calibri" panose="020F0502020204030204" pitchFamily="34" charset="0"/>
                         <a:ea typeface="Calibri" panose="020F0502020204030204" pitchFamily="34" charset="0"/>
@@ -14264,12 +14322,18 @@
                         </a:spcAft>
                       </a:pPr>
                       <a:r>
-                        <a:rPr lang="en-PH" sz="1100">
-                          <a:effectLst/>
-                        </a:rPr>
-                        <a:t>VCM should transmit encrypted ERs to the servers that communicated to it.</a:t>
-                      </a:r>
-                      <a:endParaRPr lang="en-PH" sz="1100">
+                        <a:rPr lang="en-PH" sz="1100" dirty="0">
+                          <a:effectLst/>
+                        </a:rPr>
+                        <a:t>VCM should</a:t>
+                      </a:r>
+                      <a:r>
+                        <a:rPr lang="en-PH" sz="1100" baseline="0" dirty="0">
+                          <a:effectLst/>
+                        </a:rPr>
+                        <a:t> hash the election returns before encrypting it again</a:t>
+                      </a:r>
+                      <a:endParaRPr lang="en-PH" sz="1100" dirty="0">
                         <a:effectLst/>
                         <a:latin typeface="Calibri" panose="020F0502020204030204" pitchFamily="34" charset="0"/>
                         <a:ea typeface="Calibri" panose="020F0502020204030204" pitchFamily="34" charset="0"/>
@@ -14339,12 +14403,18 @@
                         </a:spcAft>
                       </a:pPr>
                       <a:r>
-                        <a:rPr lang="en-PH" sz="1100">
-                          <a:effectLst/>
-                        </a:rPr>
-                        <a:t>Generated Key</a:t>
-                      </a:r>
-                      <a:endParaRPr lang="en-PH" sz="1100">
+                        <a:rPr lang="en-PH" sz="1100" dirty="0">
+                          <a:effectLst/>
+                        </a:rPr>
+                        <a:t>Hash</a:t>
+                      </a:r>
+                      <a:r>
+                        <a:rPr lang="en-PH" sz="1100" baseline="0" dirty="0">
+                          <a:effectLst/>
+                        </a:rPr>
+                        <a:t> values of the ER</a:t>
+                      </a:r>
+                      <a:endParaRPr lang="en-PH" sz="1100" dirty="0">
                         <a:effectLst/>
                         <a:latin typeface="Calibri" panose="020F0502020204030204" pitchFamily="34" charset="0"/>
                         <a:ea typeface="Calibri" panose="020F0502020204030204" pitchFamily="34" charset="0"/>
@@ -14414,12 +14484,42 @@
                         </a:spcAft>
                       </a:pPr>
                       <a:r>
-                        <a:rPr lang="en-PH" sz="1100">
-                          <a:effectLst/>
-                        </a:rPr>
-                        <a:t>Sent encrypted ERs</a:t>
-                      </a:r>
-                      <a:endParaRPr lang="en-PH" sz="1100">
+                        <a:rPr lang="en-PH" sz="1100" dirty="0">
+                          <a:effectLst/>
+                          <a:latin typeface="+mn-lt"/>
+                          <a:ea typeface="+mn-ea"/>
+                          <a:cs typeface="+mn-cs"/>
+                        </a:rPr>
+                        <a:t>Encrypted</a:t>
+                      </a:r>
+                      <a:r>
+                        <a:rPr lang="en-PH" sz="1100" baseline="0" dirty="0">
+                          <a:effectLst/>
+                          <a:latin typeface="+mn-lt"/>
+                          <a:ea typeface="+mn-ea"/>
+                          <a:cs typeface="+mn-cs"/>
+                        </a:rPr>
+                        <a:t> </a:t>
+                      </a:r>
+                      <a:r>
+                        <a:rPr lang="en-PH" sz="1100" baseline="0" dirty="0" err="1">
+                          <a:effectLst/>
+                          <a:latin typeface="+mn-lt"/>
+                          <a:ea typeface="+mn-ea"/>
+                          <a:cs typeface="+mn-cs"/>
+                        </a:rPr>
+                        <a:t>encrypted</a:t>
+                      </a:r>
+                      <a:r>
+                        <a:rPr lang="en-PH" sz="1100" baseline="0" dirty="0">
+                          <a:effectLst/>
+                          <a:latin typeface="+mn-lt"/>
+                          <a:ea typeface="+mn-ea"/>
+                          <a:cs typeface="+mn-cs"/>
+                        </a:rPr>
+                        <a:t> election returns and its hash values</a:t>
+                      </a:r>
+                      <a:endParaRPr lang="en-PH" sz="1100" dirty="0">
                         <a:effectLst/>
                         <a:latin typeface="Calibri" panose="020F0502020204030204" pitchFamily="34" charset="0"/>
                         <a:ea typeface="Calibri" panose="020F0502020204030204" pitchFamily="34" charset="0"/>
@@ -14489,44 +14589,46 @@
                         </a:spcAft>
                       </a:pPr>
                       <a:r>
-                        <a:rPr lang="en-PH" sz="1100">
+                        <a:rPr lang="en-PH" sz="1100" dirty="0">
                           <a:effectLst/>
                         </a:rPr>
                         <a:t>Actor:</a:t>
                       </a:r>
                     </a:p>
                     <a:p>
-                      <a:pPr>
+                      <a:pPr marL="228600" indent="-228600">
                         <a:lnSpc>
                           <a:spcPct val="107000"/>
                         </a:lnSpc>
                         <a:spcAft>
                           <a:spcPts val="0"/>
                         </a:spcAft>
-                      </a:pPr>
-                      <a:r>
-                        <a:rPr lang="en-PH" sz="1100">
-                          <a:effectLst/>
-                        </a:rPr>
-                        <a:t>1. Poll watchers ensure that no one will intervene the transmission process.</a:t>
-                      </a:r>
-                    </a:p>
-                    <a:p>
-                      <a:pPr>
+                        <a:buAutoNum type="arabicPeriod"/>
+                      </a:pPr>
+                      <a:r>
+                        <a:rPr lang="en-PH" sz="1100" dirty="0">
+                          <a:effectLst/>
+                        </a:rPr>
+                        <a:t>The</a:t>
+                      </a:r>
+                      <a:r>
+                        <a:rPr lang="en-PH" sz="1100" baseline="0" dirty="0">
+                          <a:effectLst/>
+                        </a:rPr>
+                        <a:t> VCM will make sure that before the second encryption, the file is already encrypted</a:t>
+                      </a:r>
+                    </a:p>
+                    <a:p>
+                      <a:pPr marL="0" indent="0">
                         <a:lnSpc>
                           <a:spcPct val="107000"/>
                         </a:lnSpc>
                         <a:spcAft>
                           <a:spcPts val="0"/>
                         </a:spcAft>
-                      </a:pPr>
-                      <a:r>
-                        <a:rPr lang="en-PH" sz="1100">
-                          <a:effectLst/>
-                        </a:rPr>
-                        <a:t> </a:t>
-                      </a:r>
-                      <a:endParaRPr lang="en-PH" sz="1100">
+                        <a:buNone/>
+                      </a:pPr>
+                      <a:endParaRPr lang="en-PH" sz="1100" dirty="0">
                         <a:effectLst/>
                         <a:latin typeface="Calibri" panose="020F0502020204030204" pitchFamily="34" charset="0"/>
                         <a:ea typeface="Calibri" panose="020F0502020204030204" pitchFamily="34" charset="0"/>
@@ -14550,7 +14652,7 @@
                         </a:spcAft>
                       </a:pPr>
                       <a:r>
-                        <a:rPr lang="en-PH" sz="1100">
+                        <a:rPr lang="en-PH" sz="1100" dirty="0">
                           <a:effectLst/>
                         </a:rPr>
                         <a:t>System Response:</a:t>
@@ -14566,10 +14668,53 @@
                         </a:spcAft>
                       </a:pPr>
                       <a:r>
-                        <a:rPr lang="en-PH" sz="1100">
-                          <a:effectLst/>
-                        </a:rPr>
-                        <a:t>1.1 The VCM will transmit encrypted votes to the servers.</a:t>
+                        <a:rPr lang="en-PH" sz="1100" dirty="0">
+                          <a:effectLst/>
+                        </a:rPr>
+                        <a:t>1.1 Encrypted</a:t>
+                      </a:r>
+                      <a:r>
+                        <a:rPr lang="en-PH" sz="1100" baseline="0" dirty="0">
+                          <a:effectLst/>
+                        </a:rPr>
+                        <a:t> election returns and its hash values will be encrypted using </a:t>
+                      </a:r>
+                      <a:r>
+                        <a:rPr lang="en-PH" sz="1100" baseline="0" dirty="0" err="1">
+                          <a:effectLst/>
+                        </a:rPr>
+                        <a:t>Diffie</a:t>
+                      </a:r>
+                      <a:r>
+                        <a:rPr lang="en-PH" sz="1100" baseline="0" dirty="0">
+                          <a:effectLst/>
+                        </a:rPr>
+                        <a:t>- Hellman algorithm.</a:t>
+                      </a:r>
+                    </a:p>
+                    <a:p>
+                      <a:pPr marL="0" marR="0" lvl="0" indent="0" algn="l" defTabSz="914400" rtl="0" eaLnBrk="1" fontAlgn="auto" latinLnBrk="0" hangingPunct="1">
+                        <a:lnSpc>
+                          <a:spcPct val="107000"/>
+                        </a:lnSpc>
+                        <a:spcBef>
+                          <a:spcPts val="0"/>
+                        </a:spcBef>
+                        <a:spcAft>
+                          <a:spcPts val="0"/>
+                        </a:spcAft>
+                        <a:buClrTx/>
+                        <a:buSzTx/>
+                        <a:buFontTx/>
+                        <a:buNone/>
+                        <a:tabLst/>
+                        <a:defRPr/>
+                      </a:pPr>
+                      <a:r>
+                        <a:rPr lang="en-PH" sz="1100" dirty="0">
+                          <a:effectLst/>
+                        </a:rPr>
+                        <a:t>1.2 In the event that there was an anomaly in the hash, the servers won’t accept the data thus calling the attention of the administrators.</a:t>
                       </a:r>
                     </a:p>
                     <a:p>
@@ -14581,13 +14726,7 @@
                           <a:spcPts val="0"/>
                         </a:spcAft>
                       </a:pPr>
-                      <a:r>
-                        <a:rPr lang="en-PH" sz="1100">
-                          <a:effectLst/>
-                        </a:rPr>
-                        <a:t>1.2 Servers will receive them</a:t>
-                      </a:r>
-                      <a:endParaRPr lang="en-PH" sz="1100">
+                      <a:endParaRPr lang="en-PH" sz="1100" dirty="0">
                         <a:effectLst/>
                         <a:latin typeface="Calibri" panose="020F0502020204030204" pitchFamily="34" charset="0"/>
                         <a:ea typeface="Calibri" panose="020F0502020204030204" pitchFamily="34" charset="0"/>
@@ -14819,14 +14958,14 @@
           <p:nvPr>
             <p:extLst>
               <p:ext uri="{D42A27DB-BD31-4B8C-83A1-F6EECF244321}">
-                <p14:modId xmlns:p14="http://schemas.microsoft.com/office/powerpoint/2010/main" val="3326566890"/>
+                <p14:modId xmlns:p14="http://schemas.microsoft.com/office/powerpoint/2010/main" val="3337547213"/>
               </p:ext>
             </p:extLst>
           </p:nvPr>
         </p:nvGraphicFramePr>
         <p:xfrm>
           <a:off x="3215648" y="1614662"/>
-          <a:ext cx="5760703" cy="5194305"/>
+          <a:ext cx="5760703" cy="5130551"/>
         </p:xfrm>
         <a:graphic>
           <a:graphicData uri="http://schemas.openxmlformats.org/drawingml/2006/table">
@@ -15017,8 +15156,38 @@
                       <a:r>
                         <a:rPr lang="en-PH" sz="1100" dirty="0">
                           <a:effectLst/>
-                        </a:rPr>
-                        <a:t>CCS, Central Server and, Transparency Server verify hash value of the received election returns</a:t>
+                          <a:latin typeface="Calibri" panose="020F0502020204030204" pitchFamily="34" charset="0"/>
+                          <a:ea typeface="Calibri" panose="020F0502020204030204" pitchFamily="34" charset="0"/>
+                          <a:cs typeface="Times New Roman" panose="02020603050405020304" pitchFamily="18" charset="0"/>
+                        </a:rPr>
+                        <a:t>The</a:t>
+                      </a:r>
+                      <a:r>
+                        <a:rPr lang="en-PH" sz="1100" baseline="0" dirty="0">
+                          <a:effectLst/>
+                          <a:latin typeface="Calibri" panose="020F0502020204030204" pitchFamily="34" charset="0"/>
+                          <a:ea typeface="Calibri" panose="020F0502020204030204" pitchFamily="34" charset="0"/>
+                          <a:cs typeface="Times New Roman" panose="02020603050405020304" pitchFamily="18" charset="0"/>
+                        </a:rPr>
+                        <a:t> encrypted </a:t>
+                      </a:r>
+                      <a:r>
+                        <a:rPr lang="en-PH" sz="1100" baseline="0" dirty="0" err="1">
+                          <a:effectLst/>
+                          <a:latin typeface="Calibri" panose="020F0502020204030204" pitchFamily="34" charset="0"/>
+                          <a:ea typeface="Calibri" panose="020F0502020204030204" pitchFamily="34" charset="0"/>
+                          <a:cs typeface="Times New Roman" panose="02020603050405020304" pitchFamily="18" charset="0"/>
+                        </a:rPr>
+                        <a:t>encrypted</a:t>
+                      </a:r>
+                      <a:r>
+                        <a:rPr lang="en-PH" sz="1100" baseline="0" dirty="0">
+                          <a:effectLst/>
+                          <a:latin typeface="Calibri" panose="020F0502020204030204" pitchFamily="34" charset="0"/>
+                          <a:ea typeface="Calibri" panose="020F0502020204030204" pitchFamily="34" charset="0"/>
+                          <a:cs typeface="Times New Roman" panose="02020603050405020304" pitchFamily="18" charset="0"/>
+                        </a:rPr>
+                        <a:t> ER and its hash values will be sent to the server key</a:t>
                       </a:r>
                       <a:endParaRPr lang="en-PH" sz="1100" dirty="0">
                         <a:effectLst/>
@@ -15090,12 +15259,42 @@
                         </a:spcAft>
                       </a:pPr>
                       <a:r>
-                        <a:rPr lang="en-PH" sz="1100">
-                          <a:effectLst/>
-                        </a:rPr>
-                        <a:t>Completion of Precinct Votes</a:t>
-                      </a:r>
-                      <a:endParaRPr lang="en-PH" sz="1100">
+                        <a:rPr lang="en-PH" sz="1100" dirty="0">
+                          <a:effectLst/>
+                          <a:latin typeface="Calibri" panose="020F0502020204030204" pitchFamily="34" charset="0"/>
+                          <a:ea typeface="Calibri" panose="020F0502020204030204" pitchFamily="34" charset="0"/>
+                          <a:cs typeface="Times New Roman" panose="02020603050405020304" pitchFamily="18" charset="0"/>
+                        </a:rPr>
+                        <a:t>Encrypted</a:t>
+                      </a:r>
+                      <a:r>
+                        <a:rPr lang="en-PH" sz="1100" baseline="0" dirty="0">
+                          <a:effectLst/>
+                          <a:latin typeface="Calibri" panose="020F0502020204030204" pitchFamily="34" charset="0"/>
+                          <a:ea typeface="Calibri" panose="020F0502020204030204" pitchFamily="34" charset="0"/>
+                          <a:cs typeface="Times New Roman" panose="02020603050405020304" pitchFamily="18" charset="0"/>
+                        </a:rPr>
+                        <a:t> </a:t>
+                      </a:r>
+                      <a:r>
+                        <a:rPr lang="en-PH" sz="1100" baseline="0" dirty="0" err="1">
+                          <a:effectLst/>
+                          <a:latin typeface="Calibri" panose="020F0502020204030204" pitchFamily="34" charset="0"/>
+                          <a:ea typeface="Calibri" panose="020F0502020204030204" pitchFamily="34" charset="0"/>
+                          <a:cs typeface="Times New Roman" panose="02020603050405020304" pitchFamily="18" charset="0"/>
+                        </a:rPr>
+                        <a:t>encrypted</a:t>
+                      </a:r>
+                      <a:r>
+                        <a:rPr lang="en-PH" sz="1100" baseline="0" dirty="0">
+                          <a:effectLst/>
+                          <a:latin typeface="Calibri" panose="020F0502020204030204" pitchFamily="34" charset="0"/>
+                          <a:ea typeface="Calibri" panose="020F0502020204030204" pitchFamily="34" charset="0"/>
+                          <a:cs typeface="Times New Roman" panose="02020603050405020304" pitchFamily="18" charset="0"/>
+                        </a:rPr>
+                        <a:t> election returns and hash values</a:t>
+                      </a:r>
+                      <a:endParaRPr lang="en-PH" sz="1100" dirty="0">
                         <a:effectLst/>
                         <a:latin typeface="Calibri" panose="020F0502020204030204" pitchFamily="34" charset="0"/>
                         <a:ea typeface="Calibri" panose="020F0502020204030204" pitchFamily="34" charset="0"/>
@@ -15165,12 +15364,42 @@
                         </a:spcAft>
                       </a:pPr>
                       <a:r>
-                        <a:rPr lang="en-PH" sz="1100">
-                          <a:effectLst/>
-                        </a:rPr>
-                        <a:t>Received encrypted election returns</a:t>
-                      </a:r>
-                      <a:endParaRPr lang="en-PH" sz="1100">
+                        <a:rPr lang="en-PH" sz="1100" dirty="0">
+                          <a:effectLst/>
+                          <a:latin typeface="Calibri" panose="020F0502020204030204" pitchFamily="34" charset="0"/>
+                          <a:ea typeface="Calibri" panose="020F0502020204030204" pitchFamily="34" charset="0"/>
+                          <a:cs typeface="Times New Roman" panose="02020603050405020304" pitchFamily="18" charset="0"/>
+                        </a:rPr>
+                        <a:t>Sent</a:t>
+                      </a:r>
+                      <a:r>
+                        <a:rPr lang="en-PH" sz="1100" baseline="0" dirty="0">
+                          <a:effectLst/>
+                          <a:latin typeface="Calibri" panose="020F0502020204030204" pitchFamily="34" charset="0"/>
+                          <a:ea typeface="Calibri" panose="020F0502020204030204" pitchFamily="34" charset="0"/>
+                          <a:cs typeface="Times New Roman" panose="02020603050405020304" pitchFamily="18" charset="0"/>
+                        </a:rPr>
+                        <a:t> the encrypted </a:t>
+                      </a:r>
+                      <a:r>
+                        <a:rPr lang="en-PH" sz="1100" baseline="0" dirty="0" err="1">
+                          <a:effectLst/>
+                          <a:latin typeface="Calibri" panose="020F0502020204030204" pitchFamily="34" charset="0"/>
+                          <a:ea typeface="Calibri" panose="020F0502020204030204" pitchFamily="34" charset="0"/>
+                          <a:cs typeface="Times New Roman" panose="02020603050405020304" pitchFamily="18" charset="0"/>
+                        </a:rPr>
+                        <a:t>encrypted</a:t>
+                      </a:r>
+                      <a:r>
+                        <a:rPr lang="en-PH" sz="1100" baseline="0" dirty="0">
+                          <a:effectLst/>
+                          <a:latin typeface="Calibri" panose="020F0502020204030204" pitchFamily="34" charset="0"/>
+                          <a:ea typeface="Calibri" panose="020F0502020204030204" pitchFamily="34" charset="0"/>
+                          <a:cs typeface="Times New Roman" panose="02020603050405020304" pitchFamily="18" charset="0"/>
+                        </a:rPr>
+                        <a:t> ER and hash values to the server to be able to decrypt it.</a:t>
+                      </a:r>
+                      <a:endParaRPr lang="en-PH" sz="1100" dirty="0">
                         <a:effectLst/>
                         <a:latin typeface="Calibri" panose="020F0502020204030204" pitchFamily="34" charset="0"/>
                         <a:ea typeface="Calibri" panose="020F0502020204030204" pitchFamily="34" charset="0"/>
@@ -15558,12 +15787,18 @@
                         </a:spcAft>
                       </a:pPr>
                       <a:r>
-                        <a:rPr lang="en-PH" sz="1100">
-                          <a:effectLst/>
-                        </a:rPr>
-                        <a:t>Servers will determine if the hash values are authentic</a:t>
-                      </a:r>
-                      <a:endParaRPr lang="en-PH" sz="1100">
+                        <a:rPr lang="en-PH" sz="1100" dirty="0">
+                          <a:effectLst/>
+                        </a:rPr>
+                        <a:t>Servers</a:t>
+                      </a:r>
+                      <a:r>
+                        <a:rPr lang="en-PH" sz="1100" baseline="0" dirty="0">
+                          <a:effectLst/>
+                        </a:rPr>
+                        <a:t> will receive the encrypted data set by the VCM</a:t>
+                      </a:r>
+                      <a:endParaRPr lang="en-PH" sz="1100" dirty="0">
                         <a:effectLst/>
                         <a:latin typeface="Calibri" panose="020F0502020204030204" pitchFamily="34" charset="0"/>
                         <a:ea typeface="Calibri" panose="020F0502020204030204" pitchFamily="34" charset="0"/>
@@ -15633,12 +15868,18 @@
                         </a:spcAft>
                       </a:pPr>
                       <a:r>
-                        <a:rPr lang="en-PH" sz="1100">
+                        <a:rPr lang="en-PH" sz="1100" dirty="0">
                           <a:effectLst/>
                         </a:rPr>
                         <a:t>Sent encrypted ERs</a:t>
                       </a:r>
-                      <a:endParaRPr lang="en-PH" sz="1100">
+                      <a:r>
+                        <a:rPr lang="en-PH" sz="1100" baseline="0" dirty="0">
+                          <a:effectLst/>
+                        </a:rPr>
+                        <a:t> and hash values</a:t>
+                      </a:r>
+                      <a:endParaRPr lang="en-PH" sz="1100" dirty="0">
                         <a:effectLst/>
                         <a:latin typeface="Calibri" panose="020F0502020204030204" pitchFamily="34" charset="0"/>
                         <a:ea typeface="Calibri" panose="020F0502020204030204" pitchFamily="34" charset="0"/>
@@ -15708,10 +15949,62 @@
                         </a:spcAft>
                       </a:pPr>
                       <a:r>
+                        <a:rPr lang="en-PH" sz="1100" dirty="0">
+                          <a:effectLst/>
+                        </a:rPr>
+                        <a:t>Received encrypted</a:t>
+                      </a:r>
+                      <a:r>
+                        <a:rPr lang="en-PH" sz="1100" baseline="0" dirty="0">
+                          <a:effectLst/>
+                        </a:rPr>
+                        <a:t> ERs and hash values</a:t>
+                      </a:r>
+                      <a:endParaRPr lang="en-PH" sz="1100" dirty="0">
+                        <a:effectLst/>
+                        <a:latin typeface="Calibri" panose="020F0502020204030204" pitchFamily="34" charset="0"/>
+                        <a:ea typeface="Calibri" panose="020F0502020204030204" pitchFamily="34" charset="0"/>
+                        <a:cs typeface="Times New Roman" panose="02020603050405020304" pitchFamily="18" charset="0"/>
+                      </a:endParaRPr>
+                    </a:p>
+                  </a:txBody>
+                  <a:tcPr marL="66541" marR="66541" marT="0" marB="0"/>
+                </a:tc>
+                <a:tc hMerge="1">
+                  <a:txBody>
+                    <a:bodyPr/>
+                    <a:lstStyle/>
+                    <a:p>
+                      <a:endParaRPr lang="en-PH"/>
+                    </a:p>
+                  </a:txBody>
+                  <a:tcPr/>
+                </a:tc>
+                <a:extLst>
+                  <a:ext uri="{0D108BD9-81ED-4DB2-BD59-A6C34878D82A}">
+                    <a16:rowId xmlns:a16="http://schemas.microsoft.com/office/drawing/2014/main" val="1384640326"/>
+                  </a:ext>
+                </a:extLst>
+              </a:tr>
+              <a:tr h="1912969">
+                <a:tc>
+                  <a:txBody>
+                    <a:bodyPr/>
+                    <a:lstStyle/>
+                    <a:p>
+                      <a:pPr>
+                        <a:lnSpc>
+                          <a:spcPct val="107000"/>
+                        </a:lnSpc>
+                        <a:spcAft>
+                          <a:spcPts val="0"/>
+                        </a:spcAft>
+                      </a:pPr>
+                      <a:r>
                         <a:rPr lang="en-PH" sz="1100">
                           <a:effectLst/>
                         </a:rPr>
-                        <a:t>Verified Hash Value</a:t>
+                        <a:t>Basic Flow:</a:t>
                       </a:r>
                       <a:endParaRPr lang="en-PH" sz="1100">
                         <a:effectLst/>
@@ -15723,23 +16016,6 @@
                   </a:txBody>
                   <a:tcPr marL="66541" marR="66541" marT="0" marB="0"/>
                 </a:tc>
-                <a:tc hMerge="1">
-                  <a:txBody>
-                    <a:bodyPr/>
-                    <a:lstStyle/>
-                    <a:p>
-                      <a:endParaRPr lang="en-PH"/>
-                    </a:p>
-                  </a:txBody>
-                  <a:tcPr/>
-                </a:tc>
-                <a:extLst>
-                  <a:ext uri="{0D108BD9-81ED-4DB2-BD59-A6C34878D82A}">
-                    <a16:rowId xmlns:a16="http://schemas.microsoft.com/office/drawing/2014/main" val="1384640326"/>
-                  </a:ext>
-                </a:extLst>
-              </a:tr>
-              <a:tr h="2262694">
                 <a:tc>
                   <a:txBody>
                     <a:bodyPr/>
@@ -15754,12 +16030,50 @@
                         </a:spcAft>
                       </a:pPr>
                       <a:r>
-                        <a:rPr lang="en-PH" sz="1100">
-                          <a:effectLst/>
-                        </a:rPr>
-                        <a:t>Basic Flow:</a:t>
-                      </a:r>
-                      <a:endParaRPr lang="en-PH" sz="1100">
+                        <a:rPr lang="en-PH" sz="1100" dirty="0">
+                          <a:effectLst/>
+                        </a:rPr>
+                        <a:t>Actor:</a:t>
+                      </a:r>
+                    </a:p>
+                    <a:p>
+                      <a:pPr>
+                        <a:lnSpc>
+                          <a:spcPct val="107000"/>
+                        </a:lnSpc>
+                        <a:spcAft>
+                          <a:spcPts val="0"/>
+                        </a:spcAft>
+                      </a:pPr>
+                      <a:r>
+                        <a:rPr lang="en-PH" sz="1100" dirty="0">
+                          <a:effectLst/>
+                        </a:rPr>
+                        <a:t> </a:t>
+                      </a:r>
+                    </a:p>
+                    <a:p>
+                      <a:pPr>
+                        <a:lnSpc>
+                          <a:spcPct val="107000"/>
+                        </a:lnSpc>
+                        <a:spcAft>
+                          <a:spcPts val="0"/>
+                        </a:spcAft>
+                      </a:pPr>
+                      <a:r>
+                        <a:rPr lang="en-PH" sz="1100" dirty="0">
+                          <a:effectLst/>
+                        </a:rPr>
+                        <a:t>1. VCM</a:t>
+                      </a:r>
+                      <a:r>
+                        <a:rPr lang="en-PH" sz="1100" baseline="0" dirty="0">
+                          <a:effectLst/>
+                        </a:rPr>
+                        <a:t> will make sure that there are no intervention in the transmission process</a:t>
+                      </a:r>
+                      <a:endParaRPr lang="en-PH" sz="1100" dirty="0">
                         <a:effectLst/>
                         <a:latin typeface="Calibri" panose="020F0502020204030204" pitchFamily="34" charset="0"/>
                         <a:ea typeface="Calibri" panose="020F0502020204030204" pitchFamily="34" charset="0"/>
@@ -15783,10 +16097,10 @@
                         </a:spcAft>
                       </a:pPr>
                       <a:r>
-                        <a:rPr lang="en-PH" sz="1100">
-                          <a:effectLst/>
-                        </a:rPr>
-                        <a:t>Actor:</a:t>
+                        <a:rPr lang="en-PH" sz="1100" dirty="0">
+                          <a:effectLst/>
+                        </a:rPr>
+                        <a:t>System Response:</a:t>
                       </a:r>
                     </a:p>
                     <a:p>
@@ -15799,7 +16113,7 @@
                         </a:spcAft>
                       </a:pPr>
                       <a:r>
-                        <a:rPr lang="en-PH" sz="1100">
+                        <a:rPr lang="en-PH" sz="1100" dirty="0">
                           <a:effectLst/>
                         </a:rPr>
                         <a:t> </a:t>
@@ -15815,25 +16129,21 @@
                         </a:spcAft>
                       </a:pPr>
                       <a:r>
-                        <a:rPr lang="en-PH" sz="1100">
-                          <a:effectLst/>
-                        </a:rPr>
-                        <a:t>1. Poll watchers ensure that no one will intervene the transmission process.</a:t>
-                      </a:r>
-                      <a:endParaRPr lang="en-PH" sz="1100">
+                        <a:rPr lang="en-PH" sz="1100" dirty="0">
+                          <a:effectLst/>
+                        </a:rPr>
+                        <a:t>1.1 The VCM will send the</a:t>
+                      </a:r>
+                      <a:r>
+                        <a:rPr lang="en-PH" sz="1100" baseline="0" dirty="0">
+                          <a:effectLst/>
+                        </a:rPr>
+                        <a:t> data to the server</a:t>
+                      </a:r>
+                      <a:endParaRPr lang="en-PH" sz="1100" dirty="0">
                         <a:effectLst/>
-                        <a:latin typeface="Calibri" panose="020F0502020204030204" pitchFamily="34" charset="0"/>
-                        <a:ea typeface="Calibri" panose="020F0502020204030204" pitchFamily="34" charset="0"/>
-                        <a:cs typeface="Times New Roman" panose="02020603050405020304" pitchFamily="18" charset="0"/>
                       </a:endParaRPr>
                     </a:p>
-                  </a:txBody>
-                  <a:tcPr marL="66541" marR="66541" marT="0" marB="0"/>
-                </a:tc>
-                <a:tc>
-                  <a:txBody>
-                    <a:bodyPr/>
-                    <a:lstStyle/>
                     <a:p>
                       <a:pPr>
                         <a:lnSpc>
@@ -15844,10 +16154,44 @@
                         </a:spcAft>
                       </a:pPr>
                       <a:r>
-                        <a:rPr lang="en-PH" sz="1100">
-                          <a:effectLst/>
-                        </a:rPr>
-                        <a:t>System Response:</a:t>
+                        <a:rPr lang="en-PH" sz="1100" dirty="0">
+                          <a:effectLst/>
+                        </a:rPr>
+                        <a:t>1.2 Servers will </a:t>
+                      </a:r>
+                      <a:r>
+                        <a:rPr lang="en-PH" sz="1100" baseline="0" dirty="0">
+                          <a:effectLst/>
+                        </a:rPr>
+                        <a:t> receive the encrypted file </a:t>
+                      </a:r>
+                      <a:endParaRPr lang="en-PH" sz="1100" dirty="0">
+                        <a:effectLst/>
+                      </a:endParaRPr>
+                    </a:p>
+                    <a:p>
+                      <a:pPr marL="0" marR="0" lvl="0" indent="0" algn="l" defTabSz="914400" rtl="0" eaLnBrk="1" fontAlgn="auto" latinLnBrk="0" hangingPunct="1">
+                        <a:lnSpc>
+                          <a:spcPct val="107000"/>
+                        </a:lnSpc>
+                        <a:spcBef>
+                          <a:spcPts val="0"/>
+                        </a:spcBef>
+                        <a:spcAft>
+                          <a:spcPts val="0"/>
+                        </a:spcAft>
+                        <a:buClrTx/>
+                        <a:buSzTx/>
+                        <a:buFontTx/>
+                        <a:buNone/>
+                        <a:tabLst/>
+                        <a:defRPr/>
+                      </a:pPr>
+                      <a:r>
+                        <a:rPr lang="en-PH" sz="1100" dirty="0">
+                          <a:effectLst/>
+                        </a:rPr>
+                        <a:t> 1.3 In the event that there was an anomaly in the hash, the servers won’t accept the data thus calling the attention of the administrators.</a:t>
                       </a:r>
                     </a:p>
                     <a:p>
@@ -15859,93 +16203,26 @@
                           <a:spcPts val="0"/>
                         </a:spcAft>
                       </a:pPr>
-                      <a:r>
-                        <a:rPr lang="en-PH" sz="1100">
+                      <a:endParaRPr lang="en-PH" sz="1100" dirty="0">
+                        <a:effectLst/>
+                      </a:endParaRPr>
+                    </a:p>
+                    <a:p>
+                      <a:pPr>
+                        <a:lnSpc>
+                          <a:spcPct val="107000"/>
+                        </a:lnSpc>
+                        <a:spcAft>
+                          <a:spcPts val="0"/>
+                        </a:spcAft>
+                      </a:pPr>
+                      <a:r>
+                        <a:rPr lang="en-PH" sz="1100" dirty="0">
                           <a:effectLst/>
                         </a:rPr>
                         <a:t> </a:t>
                       </a:r>
-                    </a:p>
-                    <a:p>
-                      <a:pPr>
-                        <a:lnSpc>
-                          <a:spcPct val="107000"/>
-                        </a:lnSpc>
-                        <a:spcAft>
-                          <a:spcPts val="0"/>
-                        </a:spcAft>
-                      </a:pPr>
-                      <a:r>
-                        <a:rPr lang="en-PH" sz="1100">
-                          <a:effectLst/>
-                        </a:rPr>
-                        <a:t>1.1 The servers will check the ER’s integrity by looking at the hash code.</a:t>
-                      </a:r>
-                    </a:p>
-                    <a:p>
-                      <a:pPr>
-                        <a:lnSpc>
-                          <a:spcPct val="107000"/>
-                        </a:lnSpc>
-                        <a:spcAft>
-                          <a:spcPts val="0"/>
-                        </a:spcAft>
-                      </a:pPr>
-                      <a:r>
-                        <a:rPr lang="en-PH" sz="1100">
-                          <a:effectLst/>
-                        </a:rPr>
-                        <a:t>1.2 Servers will now include the data in the official count of the votes if the hash codes matches.</a:t>
-                      </a:r>
-                    </a:p>
-                    <a:p>
-                      <a:pPr>
-                        <a:lnSpc>
-                          <a:spcPct val="107000"/>
-                        </a:lnSpc>
-                        <a:spcAft>
-                          <a:spcPts val="0"/>
-                        </a:spcAft>
-                      </a:pPr>
-                      <a:r>
-                        <a:rPr lang="en-PH" sz="1100">
-                          <a:effectLst/>
-                        </a:rPr>
-                        <a:t>1.3 In the event that there was an anomaly in the hash, the servers won’t accept the data thus calling the attention of the administrators.</a:t>
-                      </a:r>
-                    </a:p>
-                    <a:p>
-                      <a:pPr>
-                        <a:lnSpc>
-                          <a:spcPct val="107000"/>
-                        </a:lnSpc>
-                        <a:spcAft>
-                          <a:spcPts val="0"/>
-                        </a:spcAft>
-                      </a:pPr>
-                      <a:r>
-                        <a:rPr lang="en-PH" sz="1100">
-                          <a:effectLst/>
-                        </a:rPr>
-                        <a:t> </a:t>
-                      </a:r>
-                    </a:p>
-                    <a:p>
-                      <a:pPr>
-                        <a:lnSpc>
-                          <a:spcPct val="107000"/>
-                        </a:lnSpc>
-                        <a:spcAft>
-                          <a:spcPts val="0"/>
-                        </a:spcAft>
-                      </a:pPr>
-                      <a:r>
-                        <a:rPr lang="en-PH" sz="1100">
-                          <a:effectLst/>
-                        </a:rPr>
-                        <a:t> </a:t>
-                      </a:r>
-                      <a:endParaRPr lang="en-PH" sz="1100">
+                      <a:endParaRPr lang="en-PH" sz="1100" dirty="0">
                         <a:effectLst/>
                         <a:latin typeface="Calibri" panose="020F0502020204030204" pitchFamily="34" charset="0"/>
                         <a:ea typeface="Calibri" panose="020F0502020204030204" pitchFamily="34" charset="0"/>
@@ -16182,14 +16459,14 @@
           <p:nvPr>
             <p:extLst>
               <p:ext uri="{D42A27DB-BD31-4B8C-83A1-F6EECF244321}">
-                <p14:modId xmlns:p14="http://schemas.microsoft.com/office/powerpoint/2010/main" val="2449958809"/>
+                <p14:modId xmlns:p14="http://schemas.microsoft.com/office/powerpoint/2010/main" val="550153507"/>
               </p:ext>
             </p:extLst>
           </p:nvPr>
         </p:nvGraphicFramePr>
         <p:xfrm>
           <a:off x="3215648" y="1314413"/>
-          <a:ext cx="5760703" cy="5373692"/>
+          <a:ext cx="5760703" cy="5489325"/>
         </p:xfrm>
         <a:graphic>
           <a:graphicData uri="http://schemas.openxmlformats.org/drawingml/2006/table">
@@ -16381,7 +16658,13 @@
                         <a:rPr lang="en-PH" sz="1100" dirty="0">
                           <a:effectLst/>
                         </a:rPr>
-                        <a:t>CCS, Central Server and, Transparency Server verify hash value of the received election returns</a:t>
+                        <a:t>CCS, Central Server and, Transparency  Server</a:t>
+                      </a:r>
+                      <a:r>
+                        <a:rPr lang="en-PH" sz="1100" baseline="0" dirty="0">
+                          <a:effectLst/>
+                        </a:rPr>
+                        <a:t> decrypt the data using the DH key and the VCM’s public key</a:t>
                       </a:r>
                       <a:endParaRPr lang="en-PH" sz="1100" dirty="0">
                         <a:effectLst/>
@@ -16453,12 +16736,24 @@
                         </a:spcAft>
                       </a:pPr>
                       <a:r>
-                        <a:rPr lang="en-PH" sz="1100">
-                          <a:effectLst/>
-                        </a:rPr>
-                        <a:t>Completion of Precinct Votes</a:t>
-                      </a:r>
-                      <a:endParaRPr lang="en-PH" sz="1100">
+                        <a:rPr lang="en-PH" sz="1100" dirty="0">
+                          <a:effectLst/>
+                          <a:latin typeface="Calibri" panose="020F0502020204030204" pitchFamily="34" charset="0"/>
+                          <a:ea typeface="Calibri" panose="020F0502020204030204" pitchFamily="34" charset="0"/>
+                          <a:cs typeface="Times New Roman" panose="02020603050405020304" pitchFamily="18" charset="0"/>
+                        </a:rPr>
+                        <a:t>Receiving</a:t>
+                      </a:r>
+                      <a:r>
+                        <a:rPr lang="en-PH" sz="1100" baseline="0" dirty="0">
+                          <a:effectLst/>
+                          <a:latin typeface="Calibri" panose="020F0502020204030204" pitchFamily="34" charset="0"/>
+                          <a:ea typeface="Calibri" panose="020F0502020204030204" pitchFamily="34" charset="0"/>
+                          <a:cs typeface="Times New Roman" panose="02020603050405020304" pitchFamily="18" charset="0"/>
+                        </a:rPr>
+                        <a:t> of the Encrypted data</a:t>
+                      </a:r>
+                      <a:endParaRPr lang="en-PH" sz="1100" dirty="0">
                         <a:effectLst/>
                         <a:latin typeface="Calibri" panose="020F0502020204030204" pitchFamily="34" charset="0"/>
                         <a:ea typeface="Calibri" panose="020F0502020204030204" pitchFamily="34" charset="0"/>
@@ -16528,12 +16823,24 @@
                         </a:spcAft>
                       </a:pPr>
                       <a:r>
-                        <a:rPr lang="en-PH" sz="1100">
-                          <a:effectLst/>
-                        </a:rPr>
-                        <a:t>Received encrypted election returns</a:t>
-                      </a:r>
-                      <a:endParaRPr lang="en-PH" sz="1100">
+                        <a:rPr lang="en-PH" sz="1100" dirty="0">
+                          <a:effectLst/>
+                          <a:latin typeface="Calibri" panose="020F0502020204030204" pitchFamily="34" charset="0"/>
+                          <a:ea typeface="Calibri" panose="020F0502020204030204" pitchFamily="34" charset="0"/>
+                          <a:cs typeface="Times New Roman" panose="02020603050405020304" pitchFamily="18" charset="0"/>
+                        </a:rPr>
+                        <a:t>Server</a:t>
+                      </a:r>
+                      <a:r>
+                        <a:rPr lang="en-PH" sz="1100" baseline="0" dirty="0">
+                          <a:effectLst/>
+                          <a:latin typeface="Calibri" panose="020F0502020204030204" pitchFamily="34" charset="0"/>
+                          <a:ea typeface="Calibri" panose="020F0502020204030204" pitchFamily="34" charset="0"/>
+                          <a:cs typeface="Times New Roman" panose="02020603050405020304" pitchFamily="18" charset="0"/>
+                        </a:rPr>
+                        <a:t> will decrypt the election returns</a:t>
+                      </a:r>
+                      <a:endParaRPr lang="en-PH" sz="1100" dirty="0">
                         <a:effectLst/>
                         <a:latin typeface="Calibri" panose="020F0502020204030204" pitchFamily="34" charset="0"/>
                         <a:ea typeface="Calibri" panose="020F0502020204030204" pitchFamily="34" charset="0"/>
@@ -16982,12 +17289,18 @@
                         </a:spcAft>
                       </a:pPr>
                       <a:r>
-                        <a:rPr lang="en-PH" sz="1100">
-                          <a:effectLst/>
-                        </a:rPr>
-                        <a:t>Servers will determine if the hash values are authentic</a:t>
-                      </a:r>
-                      <a:endParaRPr lang="en-PH" sz="1100">
+                        <a:rPr lang="en-PH" sz="1100" dirty="0">
+                          <a:effectLst/>
+                        </a:rPr>
+                        <a:t>Servers will decrypt the data using the generated key</a:t>
+                      </a:r>
+                      <a:r>
+                        <a:rPr lang="en-PH" sz="1100" baseline="0" dirty="0">
+                          <a:effectLst/>
+                        </a:rPr>
+                        <a:t> and the public of a certain VCM</a:t>
+                      </a:r>
+                      <a:endParaRPr lang="en-PH" sz="1100" dirty="0">
                         <a:effectLst/>
                         <a:latin typeface="Calibri" panose="020F0502020204030204" pitchFamily="34" charset="0"/>
                         <a:ea typeface="Calibri" panose="020F0502020204030204" pitchFamily="34" charset="0"/>
@@ -17057,12 +17370,12 @@
                         </a:spcAft>
                       </a:pPr>
                       <a:r>
-                        <a:rPr lang="en-PH" sz="1100">
+                        <a:rPr lang="en-PH" sz="1100" dirty="0">
                           <a:effectLst/>
                         </a:rPr>
                         <a:t>Sent encrypted ERs</a:t>
                       </a:r>
-                      <a:endParaRPr lang="en-PH" sz="1100">
+                      <a:endParaRPr lang="en-PH" sz="1100" dirty="0">
                         <a:effectLst/>
                         <a:latin typeface="Calibri" panose="020F0502020204030204" pitchFamily="34" charset="0"/>
                         <a:ea typeface="Calibri" panose="020F0502020204030204" pitchFamily="34" charset="0"/>
@@ -17132,10 +17445,56 @@
                         </a:spcAft>
                       </a:pPr>
                       <a:r>
+                        <a:rPr lang="en-PH" sz="1100" dirty="0">
+                          <a:effectLst/>
+                        </a:rPr>
+                        <a:t>Decrypted ERs</a:t>
+                      </a:r>
+                      <a:endParaRPr lang="en-PH" sz="1100" dirty="0">
+                        <a:effectLst/>
+                        <a:latin typeface="Calibri" panose="020F0502020204030204" pitchFamily="34" charset="0"/>
+                        <a:ea typeface="Calibri" panose="020F0502020204030204" pitchFamily="34" charset="0"/>
+                        <a:cs typeface="Times New Roman" panose="02020603050405020304" pitchFamily="18" charset="0"/>
+                      </a:endParaRPr>
+                    </a:p>
+                  </a:txBody>
+                  <a:tcPr marL="66541" marR="66541" marT="0" marB="0"/>
+                </a:tc>
+                <a:tc hMerge="1">
+                  <a:txBody>
+                    <a:bodyPr/>
+                    <a:lstStyle/>
+                    <a:p>
+                      <a:endParaRPr lang="en-PH"/>
+                    </a:p>
+                  </a:txBody>
+                  <a:tcPr/>
+                </a:tc>
+                <a:extLst>
+                  <a:ext uri="{0D108BD9-81ED-4DB2-BD59-A6C34878D82A}">
+                    <a16:rowId xmlns:a16="http://schemas.microsoft.com/office/drawing/2014/main" val="1384640326"/>
+                  </a:ext>
+                </a:extLst>
+              </a:tr>
+              <a:tr h="1651993">
+                <a:tc>
+                  <a:txBody>
+                    <a:bodyPr/>
+                    <a:lstStyle/>
+                    <a:p>
+                      <a:pPr>
+                        <a:lnSpc>
+                          <a:spcPct val="107000"/>
+                        </a:lnSpc>
+                        <a:spcAft>
+                          <a:spcPts val="0"/>
+                        </a:spcAft>
+                      </a:pPr>
+                      <a:r>
                         <a:rPr lang="en-PH" sz="1100">
                           <a:effectLst/>
                         </a:rPr>
-                        <a:t>Verified Hash Value</a:t>
+                        <a:t>Basic Flow:</a:t>
                       </a:r>
                       <a:endParaRPr lang="en-PH" sz="1100">
                         <a:effectLst/>
@@ -17147,23 +17506,6 @@
                   </a:txBody>
                   <a:tcPr marL="66541" marR="66541" marT="0" marB="0"/>
                 </a:tc>
-                <a:tc hMerge="1">
-                  <a:txBody>
-                    <a:bodyPr/>
-                    <a:lstStyle/>
-                    <a:p>
-                      <a:endParaRPr lang="en-PH"/>
-                    </a:p>
-                  </a:txBody>
-                  <a:tcPr/>
-                </a:tc>
-                <a:extLst>
-                  <a:ext uri="{0D108BD9-81ED-4DB2-BD59-A6C34878D82A}">
-                    <a16:rowId xmlns:a16="http://schemas.microsoft.com/office/drawing/2014/main" val="1384640326"/>
-                  </a:ext>
-                </a:extLst>
-              </a:tr>
-              <a:tr h="2262694">
                 <a:tc>
                   <a:txBody>
                     <a:bodyPr/>
@@ -17178,12 +17520,50 @@
                         </a:spcAft>
                       </a:pPr>
                       <a:r>
-                        <a:rPr lang="en-PH" sz="1100">
-                          <a:effectLst/>
-                        </a:rPr>
-                        <a:t>Basic Flow:</a:t>
-                      </a:r>
-                      <a:endParaRPr lang="en-PH" sz="1100">
+                        <a:rPr lang="en-PH" sz="1100" dirty="0">
+                          <a:effectLst/>
+                        </a:rPr>
+                        <a:t>Actor:</a:t>
+                      </a:r>
+                    </a:p>
+                    <a:p>
+                      <a:pPr>
+                        <a:lnSpc>
+                          <a:spcPct val="107000"/>
+                        </a:lnSpc>
+                        <a:spcAft>
+                          <a:spcPts val="0"/>
+                        </a:spcAft>
+                      </a:pPr>
+                      <a:r>
+                        <a:rPr lang="en-PH" sz="1100" dirty="0">
+                          <a:effectLst/>
+                        </a:rPr>
+                        <a:t> </a:t>
+                      </a:r>
+                    </a:p>
+                    <a:p>
+                      <a:pPr>
+                        <a:lnSpc>
+                          <a:spcPct val="107000"/>
+                        </a:lnSpc>
+                        <a:spcAft>
+                          <a:spcPts val="0"/>
+                        </a:spcAft>
+                      </a:pPr>
+                      <a:r>
+                        <a:rPr lang="en-PH" sz="1100" dirty="0">
+                          <a:effectLst/>
+                        </a:rPr>
+                        <a:t>1. Server</a:t>
+                      </a:r>
+                      <a:r>
+                        <a:rPr lang="en-PH" sz="1100" baseline="0" dirty="0">
+                          <a:effectLst/>
+                        </a:rPr>
+                        <a:t> decrypts the file being sent by the VCM </a:t>
+                      </a:r>
+                      <a:endParaRPr lang="en-PH" sz="1100" dirty="0">
                         <a:effectLst/>
                         <a:latin typeface="Calibri" panose="020F0502020204030204" pitchFamily="34" charset="0"/>
                         <a:ea typeface="Calibri" panose="020F0502020204030204" pitchFamily="34" charset="0"/>
@@ -17207,10 +17587,10 @@
                         </a:spcAft>
                       </a:pPr>
                       <a:r>
-                        <a:rPr lang="en-PH" sz="1100">
-                          <a:effectLst/>
-                        </a:rPr>
-                        <a:t>Actor:</a:t>
+                        <a:rPr lang="en-PH" sz="1100" dirty="0">
+                          <a:effectLst/>
+                        </a:rPr>
+                        <a:t>System Response:</a:t>
                       </a:r>
                     </a:p>
                     <a:p>
@@ -17223,7 +17603,7 @@
                         </a:spcAft>
                       </a:pPr>
                       <a:r>
-                        <a:rPr lang="en-PH" sz="1100">
+                        <a:rPr lang="en-PH" sz="1100" dirty="0">
                           <a:effectLst/>
                         </a:rPr>
                         <a:t> </a:t>
@@ -17239,25 +17619,18 @@
                         </a:spcAft>
                       </a:pPr>
                       <a:r>
-                        <a:rPr lang="en-PH" sz="1100">
-                          <a:effectLst/>
-                        </a:rPr>
-                        <a:t>1. Poll watchers ensure that no one will intervene the transmission process.</a:t>
-                      </a:r>
-                      <a:endParaRPr lang="en-PH" sz="1100">
-                        <a:effectLst/>
-                        <a:latin typeface="Calibri" panose="020F0502020204030204" pitchFamily="34" charset="0"/>
-                        <a:ea typeface="Calibri" panose="020F0502020204030204" pitchFamily="34" charset="0"/>
-                        <a:cs typeface="Times New Roman" panose="02020603050405020304" pitchFamily="18" charset="0"/>
-                      </a:endParaRPr>
-                    </a:p>
-                  </a:txBody>
-                  <a:tcPr marL="66541" marR="66541" marT="0" marB="0"/>
-                </a:tc>
-                <a:tc>
-                  <a:txBody>
-                    <a:bodyPr/>
-                    <a:lstStyle/>
+                        <a:rPr lang="en-PH" sz="1100" dirty="0">
+                          <a:effectLst/>
+                        </a:rPr>
+                        <a:t>1.1 The servers will</a:t>
+                      </a:r>
+                      <a:r>
+                        <a:rPr lang="en-PH" sz="1100" baseline="0" dirty="0">
+                          <a:effectLst/>
+                        </a:rPr>
+                        <a:t> encrypt the file using the generated key and the VCM’s public key</a:t>
+                      </a:r>
+                    </a:p>
                     <a:p>
                       <a:pPr>
                         <a:lnSpc>
@@ -17268,10 +17641,41 @@
                         </a:spcAft>
                       </a:pPr>
                       <a:r>
-                        <a:rPr lang="en-PH" sz="1100">
-                          <a:effectLst/>
-                        </a:rPr>
-                        <a:t>System Response:</a:t>
+                        <a:rPr lang="en-PH" sz="1100" dirty="0">
+                          <a:effectLst/>
+                        </a:rPr>
+                        <a:t>1.2</a:t>
+                      </a:r>
+                      <a:r>
+                        <a:rPr lang="en-PH" sz="1100" baseline="0" dirty="0">
+                          <a:effectLst/>
+                        </a:rPr>
+                        <a:t> If the VCM and the server do not have the same generated key, the server cannot decrypt the file</a:t>
+                      </a:r>
+                    </a:p>
+                    <a:p>
+                      <a:pPr marL="0" marR="0" lvl="0" indent="0" algn="l" defTabSz="914400" rtl="0" eaLnBrk="1" fontAlgn="auto" latinLnBrk="0" hangingPunct="1">
+                        <a:lnSpc>
+                          <a:spcPct val="107000"/>
+                        </a:lnSpc>
+                        <a:spcBef>
+                          <a:spcPts val="0"/>
+                        </a:spcBef>
+                        <a:spcAft>
+                          <a:spcPts val="0"/>
+                        </a:spcAft>
+                        <a:buClrTx/>
+                        <a:buSzTx/>
+                        <a:buFontTx/>
+                        <a:buNone/>
+                        <a:tabLst/>
+                        <a:defRPr/>
+                      </a:pPr>
+                      <a:r>
+                        <a:rPr lang="en-PH" sz="1100" dirty="0">
+                          <a:effectLst/>
+                        </a:rPr>
+                        <a:t>1.3 In the event that there was an anomaly in the hash, the servers won’t accept the data thus calling the attention of the administrators.</a:t>
                       </a:r>
                     </a:p>
                     <a:p>
@@ -17283,93 +17687,7 @@
                           <a:spcPts val="0"/>
                         </a:spcAft>
                       </a:pPr>
-                      <a:r>
-                        <a:rPr lang="en-PH" sz="1100">
-                          <a:effectLst/>
-                        </a:rPr>
-                        <a:t> </a:t>
-                      </a:r>
-                    </a:p>
-                    <a:p>
-                      <a:pPr>
-                        <a:lnSpc>
-                          <a:spcPct val="107000"/>
-                        </a:lnSpc>
-                        <a:spcAft>
-                          <a:spcPts val="0"/>
-                        </a:spcAft>
-                      </a:pPr>
-                      <a:r>
-                        <a:rPr lang="en-PH" sz="1100">
-                          <a:effectLst/>
-                        </a:rPr>
-                        <a:t>1.1 The servers will check the ER’s integrity by looking at the hash code.</a:t>
-                      </a:r>
-                    </a:p>
-                    <a:p>
-                      <a:pPr>
-                        <a:lnSpc>
-                          <a:spcPct val="107000"/>
-                        </a:lnSpc>
-                        <a:spcAft>
-                          <a:spcPts val="0"/>
-                        </a:spcAft>
-                      </a:pPr>
-                      <a:r>
-                        <a:rPr lang="en-PH" sz="1100">
-                          <a:effectLst/>
-                        </a:rPr>
-                        <a:t>1.2 Servers will now include the data in the official count of the votes if the hash codes matches.</a:t>
-                      </a:r>
-                    </a:p>
-                    <a:p>
-                      <a:pPr>
-                        <a:lnSpc>
-                          <a:spcPct val="107000"/>
-                        </a:lnSpc>
-                        <a:spcAft>
-                          <a:spcPts val="0"/>
-                        </a:spcAft>
-                      </a:pPr>
-                      <a:r>
-                        <a:rPr lang="en-PH" sz="1100">
-                          <a:effectLst/>
-                        </a:rPr>
-                        <a:t>1.3 In the event that there was an anomaly in the hash, the servers won’t accept the data thus calling the attention of the administrators.</a:t>
-                      </a:r>
-                    </a:p>
-                    <a:p>
-                      <a:pPr>
-                        <a:lnSpc>
-                          <a:spcPct val="107000"/>
-                        </a:lnSpc>
-                        <a:spcAft>
-                          <a:spcPts val="0"/>
-                        </a:spcAft>
-                      </a:pPr>
-                      <a:r>
-                        <a:rPr lang="en-PH" sz="1100">
-                          <a:effectLst/>
-                        </a:rPr>
-                        <a:t> </a:t>
-                      </a:r>
-                    </a:p>
-                    <a:p>
-                      <a:pPr>
-                        <a:lnSpc>
-                          <a:spcPct val="107000"/>
-                        </a:lnSpc>
-                        <a:spcAft>
-                          <a:spcPts val="0"/>
-                        </a:spcAft>
-                      </a:pPr>
-                      <a:r>
-                        <a:rPr lang="en-PH" sz="1100">
-                          <a:effectLst/>
-                        </a:rPr>
-                        <a:t> </a:t>
-                      </a:r>
-                      <a:endParaRPr lang="en-PH" sz="1100">
+                      <a:endParaRPr lang="en-PH" sz="1100" dirty="0">
                         <a:effectLst/>
                         <a:latin typeface="Calibri" panose="020F0502020204030204" pitchFamily="34" charset="0"/>
                         <a:ea typeface="Calibri" panose="020F0502020204030204" pitchFamily="34" charset="0"/>
@@ -17606,14 +17924,14 @@
           <p:nvPr>
             <p:extLst>
               <p:ext uri="{D42A27DB-BD31-4B8C-83A1-F6EECF244321}">
-                <p14:modId xmlns:p14="http://schemas.microsoft.com/office/powerpoint/2010/main" val="2157515516"/>
+                <p14:modId xmlns:p14="http://schemas.microsoft.com/office/powerpoint/2010/main" val="2545370799"/>
               </p:ext>
             </p:extLst>
           </p:nvPr>
         </p:nvGraphicFramePr>
         <p:xfrm>
           <a:off x="3215647" y="1027809"/>
-          <a:ext cx="5760703" cy="5553080"/>
+          <a:ext cx="5760703" cy="5194304"/>
         </p:xfrm>
         <a:graphic>
           <a:graphicData uri="http://schemas.openxmlformats.org/drawingml/2006/table">
@@ -17769,12 +18087,24 @@
                         </a:spcAft>
                       </a:pPr>
                       <a:r>
-                        <a:rPr lang="en-PH" sz="1100">
-                          <a:effectLst/>
-                        </a:rPr>
-                        <a:t>CCS, Central Server and, Transparency Server verify hash value of the received election returns</a:t>
-                      </a:r>
-                      <a:endParaRPr lang="en-PH" sz="1100">
+                        <a:rPr lang="en-PH" sz="1100" dirty="0">
+                          <a:effectLst/>
+                        </a:rPr>
+                        <a:t>CCS, Central Server and, Transparency Server will</a:t>
+                      </a:r>
+                      <a:r>
+                        <a:rPr lang="en-PH" sz="1100" baseline="0" dirty="0">
+                          <a:effectLst/>
+                        </a:rPr>
+                        <a:t> </a:t>
+                      </a:r>
+                      <a:r>
+                        <a:rPr lang="en-PH" sz="1100" dirty="0">
+                          <a:effectLst/>
+                        </a:rPr>
+                        <a:t>hash value of the received election returns</a:t>
+                      </a:r>
+                      <a:endParaRPr lang="en-PH" sz="1100" dirty="0">
                         <a:effectLst/>
                         <a:latin typeface="Calibri" panose="020F0502020204030204" pitchFamily="34" charset="0"/>
                         <a:ea typeface="Calibri" panose="020F0502020204030204" pitchFamily="34" charset="0"/>
@@ -17844,12 +18174,24 @@
                         </a:spcAft>
                       </a:pPr>
                       <a:r>
-                        <a:rPr lang="en-PH" sz="1100">
-                          <a:effectLst/>
-                        </a:rPr>
-                        <a:t>Completion of Precinct Votes</a:t>
-                      </a:r>
-                      <a:endParaRPr lang="en-PH" sz="1100">
+                        <a:rPr lang="en-PH" sz="1100" dirty="0">
+                          <a:effectLst/>
+                          <a:latin typeface="Calibri" panose="020F0502020204030204" pitchFamily="34" charset="0"/>
+                          <a:ea typeface="Calibri" panose="020F0502020204030204" pitchFamily="34" charset="0"/>
+                          <a:cs typeface="Times New Roman" panose="02020603050405020304" pitchFamily="18" charset="0"/>
+                        </a:rPr>
+                        <a:t>Decrypted</a:t>
+                      </a:r>
+                      <a:r>
+                        <a:rPr lang="en-PH" sz="1100" baseline="0" dirty="0">
+                          <a:effectLst/>
+                          <a:latin typeface="Calibri" panose="020F0502020204030204" pitchFamily="34" charset="0"/>
+                          <a:ea typeface="Calibri" panose="020F0502020204030204" pitchFamily="34" charset="0"/>
+                          <a:cs typeface="Times New Roman" panose="02020603050405020304" pitchFamily="18" charset="0"/>
+                        </a:rPr>
+                        <a:t> election returns</a:t>
+                      </a:r>
+                      <a:endParaRPr lang="en-PH" sz="1100" dirty="0">
                         <a:effectLst/>
                         <a:latin typeface="Calibri" panose="020F0502020204030204" pitchFamily="34" charset="0"/>
                         <a:ea typeface="Calibri" panose="020F0502020204030204" pitchFamily="34" charset="0"/>
@@ -17919,12 +18261,12 @@
                         </a:spcAft>
                       </a:pPr>
                       <a:r>
-                        <a:rPr lang="en-PH" sz="1100">
+                        <a:rPr lang="en-PH" sz="1100" dirty="0">
                           <a:effectLst/>
                         </a:rPr>
                         <a:t>Received encrypted election returns</a:t>
                       </a:r>
-                      <a:endParaRPr lang="en-PH" sz="1100">
+                      <a:endParaRPr lang="en-PH" sz="1100" dirty="0">
                         <a:effectLst/>
                         <a:latin typeface="Calibri" panose="020F0502020204030204" pitchFamily="34" charset="0"/>
                         <a:ea typeface="Calibri" panose="020F0502020204030204" pitchFamily="34" charset="0"/>
@@ -18615,7 +18957,7 @@
                   </a:ext>
                 </a:extLst>
               </a:tr>
-              <a:tr h="2262694">
+              <a:tr h="1767775">
                 <a:tc>
                   <a:txBody>
                     <a:bodyPr/>
@@ -18659,7 +19001,7 @@
                         </a:spcAft>
                       </a:pPr>
                       <a:r>
-                        <a:rPr lang="en-PH" sz="1100">
+                        <a:rPr lang="en-PH" sz="1100" dirty="0">
                           <a:effectLst/>
                         </a:rPr>
                         <a:t>Actor:</a:t>
@@ -18675,7 +19017,7 @@
                         </a:spcAft>
                       </a:pPr>
                       <a:r>
-                        <a:rPr lang="en-PH" sz="1100">
+                        <a:rPr lang="en-PH" sz="1100" dirty="0">
                           <a:effectLst/>
                         </a:rPr>
                         <a:t> </a:t>
@@ -18691,12 +19033,18 @@
                         </a:spcAft>
                       </a:pPr>
                       <a:r>
-                        <a:rPr lang="en-PH" sz="1100">
-                          <a:effectLst/>
-                        </a:rPr>
-                        <a:t>1. Poll watchers ensure that no one will intervene the transmission process.</a:t>
-                      </a:r>
-                      <a:endParaRPr lang="en-PH" sz="1100">
+                        <a:rPr lang="en-PH" sz="1100" dirty="0">
+                          <a:effectLst/>
+                        </a:rPr>
+                        <a:t>1. Server</a:t>
+                      </a:r>
+                      <a:r>
+                        <a:rPr lang="en-PH" sz="1100" baseline="0" dirty="0">
+                          <a:effectLst/>
+                        </a:rPr>
+                        <a:t> will automatically hash the decrypted election returns for verification</a:t>
+                      </a:r>
+                      <a:endParaRPr lang="en-PH" sz="1100" dirty="0">
                         <a:effectLst/>
                         <a:latin typeface="Calibri" panose="020F0502020204030204" pitchFamily="34" charset="0"/>
                         <a:ea typeface="Calibri" panose="020F0502020204030204" pitchFamily="34" charset="0"/>
@@ -18720,7 +19068,7 @@
                         </a:spcAft>
                       </a:pPr>
                       <a:r>
-                        <a:rPr lang="en-PH" sz="1100">
+                        <a:rPr lang="en-PH" sz="1100" dirty="0">
                           <a:effectLst/>
                         </a:rPr>
                         <a:t>System Response:</a:t>
@@ -18736,7 +19084,7 @@
                         </a:spcAft>
                       </a:pPr>
                       <a:r>
-                        <a:rPr lang="en-PH" sz="1100">
+                        <a:rPr lang="en-PH" sz="1100" dirty="0">
                           <a:effectLst/>
                         </a:rPr>
                         <a:t> </a:t>
@@ -18752,10 +19100,16 @@
                         </a:spcAft>
                       </a:pPr>
                       <a:r>
-                        <a:rPr lang="en-PH" sz="1100">
-                          <a:effectLst/>
-                        </a:rPr>
-                        <a:t>1.1 The servers will check the ER’s integrity by looking at the hash code.</a:t>
+                        <a:rPr lang="en-PH" sz="1100" dirty="0">
+                          <a:effectLst/>
+                        </a:rPr>
+                        <a:t>1.1 The servers will check the ER’s integrity by finding the</a:t>
+                      </a:r>
+                      <a:r>
+                        <a:rPr lang="en-PH" sz="1100" baseline="0" dirty="0">
+                          <a:effectLst/>
+                        </a:rPr>
+                        <a:t> hash values.</a:t>
                       </a:r>
                     </a:p>
                     <a:p>
@@ -18767,12 +19121,9 @@
                           <a:spcPts val="0"/>
                         </a:spcAft>
                       </a:pPr>
-                      <a:r>
-                        <a:rPr lang="en-PH" sz="1100">
-                          <a:effectLst/>
-                        </a:rPr>
-                        <a:t>1.2 Servers will now include the data in the official count of the votes if the hash codes matches.</a:t>
-                      </a:r>
+                      <a:endParaRPr lang="en-PH" sz="1100" dirty="0">
+                        <a:effectLst/>
+                      </a:endParaRPr>
                     </a:p>
                     <a:p>
                       <a:pPr>
@@ -18784,10 +19135,10 @@
                         </a:spcAft>
                       </a:pPr>
                       <a:r>
-                        <a:rPr lang="en-PH" sz="1100">
-                          <a:effectLst/>
-                        </a:rPr>
-                        <a:t>1.3 In the event that there was an anomaly in the hash, the servers won’t accept the data thus calling the attention of the administrators.</a:t>
+                        <a:rPr lang="en-PH" sz="1100" dirty="0">
+                          <a:effectLst/>
+                        </a:rPr>
+                        <a:t>1.2 In the event that there was an anomaly in the hash, the servers won’t accept the data thus calling the attention of the administrators.</a:t>
                       </a:r>
                     </a:p>
                     <a:p>
@@ -18800,7 +19151,7 @@
                         </a:spcAft>
                       </a:pPr>
                       <a:r>
-                        <a:rPr lang="en-PH" sz="1100">
+                        <a:rPr lang="en-PH" sz="1100" dirty="0">
                           <a:effectLst/>
                         </a:rPr>
                         <a:t> </a:t>
@@ -18816,12 +19167,12 @@
                         </a:spcAft>
                       </a:pPr>
                       <a:r>
-                        <a:rPr lang="en-PH" sz="1100">
+                        <a:rPr lang="en-PH" sz="1100" dirty="0">
                           <a:effectLst/>
                         </a:rPr>
                         <a:t> </a:t>
                       </a:r>
-                      <a:endParaRPr lang="en-PH" sz="1100">
+                      <a:endParaRPr lang="en-PH" sz="1100" dirty="0">
                         <a:effectLst/>
                         <a:latin typeface="Calibri" panose="020F0502020204030204" pitchFamily="34" charset="0"/>
                         <a:ea typeface="Calibri" panose="020F0502020204030204" pitchFamily="34" charset="0"/>
@@ -19058,14 +19409,14 @@
           <p:nvPr>
             <p:extLst>
               <p:ext uri="{D42A27DB-BD31-4B8C-83A1-F6EECF244321}">
-                <p14:modId xmlns:p14="http://schemas.microsoft.com/office/powerpoint/2010/main" val="3911581978"/>
+                <p14:modId xmlns:p14="http://schemas.microsoft.com/office/powerpoint/2010/main" val="3248783772"/>
               </p:ext>
             </p:extLst>
           </p:nvPr>
         </p:nvGraphicFramePr>
         <p:xfrm>
           <a:off x="3135166" y="1057295"/>
-          <a:ext cx="5760703" cy="5732467"/>
+          <a:ext cx="5760703" cy="5170492"/>
         </p:xfrm>
         <a:graphic>
           <a:graphicData uri="http://schemas.openxmlformats.org/drawingml/2006/table">
@@ -19311,12 +19662,24 @@
                         </a:spcAft>
                       </a:pPr>
                       <a:r>
-                        <a:rPr lang="en-PH" sz="1100">
-                          <a:effectLst/>
-                        </a:rPr>
-                        <a:t>Completion of Precinct Votes</a:t>
-                      </a:r>
-                      <a:endParaRPr lang="en-PH" sz="1100">
+                        <a:rPr lang="en-PH" sz="1100" dirty="0">
+                          <a:effectLst/>
+                          <a:latin typeface="+mn-lt"/>
+                          <a:ea typeface="+mn-ea"/>
+                          <a:cs typeface="+mn-cs"/>
+                        </a:rPr>
+                        <a:t>Hash</a:t>
+                      </a:r>
+                      <a:r>
+                        <a:rPr lang="en-PH" sz="1100" baseline="0" dirty="0">
+                          <a:effectLst/>
+                          <a:latin typeface="+mn-lt"/>
+                          <a:ea typeface="+mn-ea"/>
+                          <a:cs typeface="+mn-cs"/>
+                        </a:rPr>
+                        <a:t> values of decrypted election returns</a:t>
+                      </a:r>
+                      <a:endParaRPr lang="en-PH" sz="1100" dirty="0">
                         <a:effectLst/>
                         <a:latin typeface="Calibri" panose="020F0502020204030204" pitchFamily="34" charset="0"/>
                         <a:ea typeface="Calibri" panose="020F0502020204030204" pitchFamily="34" charset="0"/>
@@ -19386,12 +19749,12 @@
                         </a:spcAft>
                       </a:pPr>
                       <a:r>
-                        <a:rPr lang="en-PH" sz="1100">
+                        <a:rPr lang="en-PH" sz="1100" dirty="0">
                           <a:effectLst/>
                         </a:rPr>
                         <a:t>Received encrypted election returns</a:t>
                       </a:r>
-                      <a:endParaRPr lang="en-PH" sz="1100">
+                      <a:endParaRPr lang="en-PH" sz="1100" dirty="0">
                         <a:effectLst/>
                         <a:latin typeface="Calibri" panose="020F0502020204030204" pitchFamily="34" charset="0"/>
                         <a:ea typeface="Calibri" panose="020F0502020204030204" pitchFamily="34" charset="0"/>
@@ -20104,7 +20467,7 @@
                   </a:ext>
                 </a:extLst>
               </a:tr>
-              <a:tr h="2262694">
+              <a:tr h="1635066">
                 <a:tc>
                   <a:txBody>
                     <a:bodyPr/>
@@ -20148,7 +20511,7 @@
                         </a:spcAft>
                       </a:pPr>
                       <a:r>
-                        <a:rPr lang="en-PH" sz="1100">
+                        <a:rPr lang="en-PH" sz="1100" dirty="0">
                           <a:effectLst/>
                         </a:rPr>
                         <a:t>Actor:</a:t>
@@ -20164,7 +20527,7 @@
                         </a:spcAft>
                       </a:pPr>
                       <a:r>
-                        <a:rPr lang="en-PH" sz="1100">
+                        <a:rPr lang="en-PH" sz="1100" dirty="0">
                           <a:effectLst/>
                         </a:rPr>
                         <a:t> </a:t>
@@ -20180,12 +20543,18 @@
                         </a:spcAft>
                       </a:pPr>
                       <a:r>
-                        <a:rPr lang="en-PH" sz="1100">
-                          <a:effectLst/>
-                        </a:rPr>
-                        <a:t>1. Poll watchers ensure that no one will intervene the transmission process.</a:t>
-                      </a:r>
-                      <a:endParaRPr lang="en-PH" sz="1100">
+                        <a:rPr lang="en-PH" sz="1100" dirty="0">
+                          <a:effectLst/>
+                        </a:rPr>
+                        <a:t>1. After hashing,</a:t>
+                      </a:r>
+                      <a:r>
+                        <a:rPr lang="en-PH" sz="1100" baseline="0" dirty="0">
+                          <a:effectLst/>
+                        </a:rPr>
+                        <a:t> the server will compare the hash values of decrypted fie to the hash values sent by the VCM</a:t>
+                      </a:r>
+                      <a:endParaRPr lang="en-PH" sz="1100" dirty="0">
                         <a:effectLst/>
                         <a:latin typeface="Calibri" panose="020F0502020204030204" pitchFamily="34" charset="0"/>
                         <a:ea typeface="Calibri" panose="020F0502020204030204" pitchFamily="34" charset="0"/>
@@ -20209,7 +20578,7 @@
                         </a:spcAft>
                       </a:pPr>
                       <a:r>
-                        <a:rPr lang="en-PH" sz="1100">
+                        <a:rPr lang="en-PH" sz="1100" dirty="0">
                           <a:effectLst/>
                         </a:rPr>
                         <a:t>System Response:</a:t>
@@ -20225,7 +20594,7 @@
                         </a:spcAft>
                       </a:pPr>
                       <a:r>
-                        <a:rPr lang="en-PH" sz="1100">
+                        <a:rPr lang="en-PH" sz="1100" dirty="0">
                           <a:effectLst/>
                         </a:rPr>
                         <a:t> </a:t>
@@ -20241,11 +20610,20 @@
                         </a:spcAft>
                       </a:pPr>
                       <a:r>
-                        <a:rPr lang="en-PH" sz="1100">
-                          <a:effectLst/>
-                        </a:rPr>
-                        <a:t>1.1 The servers will check the ER’s integrity by looking at the hash code.</a:t>
-                      </a:r>
+                        <a:rPr lang="en-PH" sz="1100" dirty="0">
+                          <a:effectLst/>
+                        </a:rPr>
+                        <a:t>1.1</a:t>
+                      </a:r>
+                      <a:r>
+                        <a:rPr lang="en-PH" sz="1100" baseline="0" dirty="0">
+                          <a:effectLst/>
+                        </a:rPr>
+                        <a:t> If the hash values did not match, it is automatically known to be tampered.</a:t>
+                      </a:r>
+                      <a:endParaRPr lang="en-PH" sz="1100" dirty="0">
+                        <a:effectLst/>
+                      </a:endParaRPr>
                     </a:p>
                     <a:p>
                       <a:pPr>
@@ -20257,10 +20635,10 @@
                         </a:spcAft>
                       </a:pPr>
                       <a:r>
-                        <a:rPr lang="en-PH" sz="1100">
-                          <a:effectLst/>
-                        </a:rPr>
-                        <a:t>1.2 Servers will now include the data in the official count of the votes if the hash codes matches.</a:t>
+                        <a:rPr lang="en-PH" sz="1100" dirty="0">
+                          <a:effectLst/>
+                        </a:rPr>
+                        <a:t>1.2 In the event that there was an anomaly in the hash, the servers won’t accept the data thus calling the attention of the administrators.</a:t>
                       </a:r>
                     </a:p>
                     <a:p>
@@ -20273,10 +20651,10 @@
                         </a:spcAft>
                       </a:pPr>
                       <a:r>
-                        <a:rPr lang="en-PH" sz="1100">
-                          <a:effectLst/>
-                        </a:rPr>
-                        <a:t>1.3 In the event that there was an anomaly in the hash, the servers won’t accept the data thus calling the attention of the administrators.</a:t>
+                        <a:rPr lang="en-PH" sz="1100" dirty="0">
+                          <a:effectLst/>
+                        </a:rPr>
+                        <a:t> </a:t>
                       </a:r>
                     </a:p>
                     <a:p>
@@ -20289,28 +20667,12 @@
                         </a:spcAft>
                       </a:pPr>
                       <a:r>
-                        <a:rPr lang="en-PH" sz="1100">
+                        <a:rPr lang="en-PH" sz="1100" dirty="0">
                           <a:effectLst/>
                         </a:rPr>
                         <a:t> </a:t>
                       </a:r>
-                    </a:p>
-                    <a:p>
-                      <a:pPr>
-                        <a:lnSpc>
-                          <a:spcPct val="107000"/>
-                        </a:lnSpc>
-                        <a:spcAft>
-                          <a:spcPts val="0"/>
-                        </a:spcAft>
-                      </a:pPr>
-                      <a:r>
-                        <a:rPr lang="en-PH" sz="1100">
-                          <a:effectLst/>
-                        </a:rPr>
-                        <a:t> </a:t>
-                      </a:r>
-                      <a:endParaRPr lang="en-PH" sz="1100">
+                      <a:endParaRPr lang="en-PH" sz="1100" dirty="0">
                         <a:effectLst/>
                         <a:latin typeface="Calibri" panose="020F0502020204030204" pitchFamily="34" charset="0"/>
                         <a:ea typeface="Calibri" panose="020F0502020204030204" pitchFamily="34" charset="0"/>
@@ -21014,7 +21376,7 @@
           <p:nvPr>
             <p:extLst>
               <p:ext uri="{D42A27DB-BD31-4B8C-83A1-F6EECF244321}">
-                <p14:modId xmlns:p14="http://schemas.microsoft.com/office/powerpoint/2010/main" val="1441817182"/>
+                <p14:modId xmlns:p14="http://schemas.microsoft.com/office/powerpoint/2010/main" val="2344221857"/>
               </p:ext>
             </p:extLst>
           </p:nvPr>
@@ -21073,7 +21435,7 @@
                           <a:ea typeface="Calibri" panose="020F0502020204030204" pitchFamily="34" charset="0"/>
                           <a:cs typeface="Times New Roman" panose="02020603050405020304" pitchFamily="18" charset="0"/>
                         </a:rPr>
-                        <a:t>checks if the generated hash values of the ER and the hash values sent by the VCM are the same</a:t>
+                        <a:t>checks if the generated hash values of the ER and the hash values sent by the VCM are the same key</a:t>
                       </a:r>
                       <a:endParaRPr lang="en-PH" sz="1400" dirty="0"/>
                     </a:p>
@@ -22360,7 +22722,7 @@
       </p:pic>
       <p:pic>
         <p:nvPicPr>
-          <p:cNvPr id="7" name="Content Placeholder 6"/>
+          <p:cNvPr id="6" name="Content Placeholder 5"/>
           <p:cNvPicPr>
             <a:picLocks noGrp="1" noChangeAspect="1"/>
           </p:cNvPicPr>
@@ -22382,8 +22744,8 @@
         </p:blipFill>
         <p:spPr>
           <a:xfrm>
-            <a:off x="2221647" y="1825625"/>
-            <a:ext cx="7748705" cy="4351338"/>
+            <a:off x="1187604" y="1963236"/>
+            <a:ext cx="10085714" cy="2380952"/>
           </a:xfrm>
         </p:spPr>
       </p:pic>
@@ -24246,7 +24608,7 @@
         </p:nvSpPr>
         <p:spPr>
           <a:xfrm>
-            <a:off x="838200" y="337829"/>
+            <a:off x="771238" y="188706"/>
             <a:ext cx="10515600" cy="1325563"/>
           </a:xfrm>
         </p:spPr>
@@ -25459,7 +25821,7 @@
         </p:nvSpPr>
         <p:spPr>
           <a:xfrm>
-            <a:off x="1946286" y="3727350"/>
+            <a:off x="1946286" y="3448511"/>
             <a:ext cx="1763642" cy="962380"/>
           </a:xfrm>
           <a:prstGeom prst="hexagon">
@@ -25519,7 +25881,7 @@
         </p:nvSpPr>
         <p:spPr>
           <a:xfrm>
-            <a:off x="3709928" y="3727349"/>
+            <a:off x="3709928" y="3448510"/>
             <a:ext cx="1802295" cy="962381"/>
           </a:xfrm>
           <a:prstGeom prst="hexagon">
@@ -25571,7 +25933,7 @@
         </p:nvSpPr>
         <p:spPr>
           <a:xfrm>
-            <a:off x="5512223" y="3724261"/>
+            <a:off x="5512223" y="3445422"/>
             <a:ext cx="1415488" cy="947332"/>
           </a:xfrm>
           <a:prstGeom prst="hexagon">
@@ -25864,7 +26226,7 @@
         </p:nvSpPr>
         <p:spPr>
           <a:xfrm>
-            <a:off x="6930888" y="3721753"/>
+            <a:off x="6930888" y="3442914"/>
             <a:ext cx="2771224" cy="962381"/>
           </a:xfrm>
           <a:prstGeom prst="hexagon">
@@ -25950,7 +26312,7 @@
         </p:nvSpPr>
         <p:spPr>
           <a:xfrm>
-            <a:off x="1946286" y="4798840"/>
+            <a:off x="1946286" y="4466611"/>
             <a:ext cx="9235440" cy="369332"/>
           </a:xfrm>
           <a:prstGeom prst="rect">

</xml_diff>